<commit_message>
Documentation update + bugfix
- Adding figures/docs explaining FxnBlock and Model for #RAD-217
- Removed all references to quadpy to bring into compliance (and fix notebooks that don't run)
- Removed idetc results paper/model which is based on quadpy
</commit_message>
<xml_diff>
--- a/docs/figures/powerpoint_figures.pptx
+++ b/docs/figures/powerpoint_figures.pptx
@@ -5,7 +5,7 @@
     <p:sldMasterId id="2147483648" r:id="rId4"/>
   </p:sldMasterIdLst>
   <p:notesMasterIdLst>
-    <p:notesMasterId r:id="rId16"/>
+    <p:notesMasterId r:id="rId18"/>
   </p:notesMasterIdLst>
   <p:sldIdLst>
     <p:sldId id="261" r:id="rId5"/>
@@ -19,6 +19,8 @@
     <p:sldId id="295" r:id="rId13"/>
     <p:sldId id="296" r:id="rId14"/>
     <p:sldId id="282" r:id="rId15"/>
+    <p:sldId id="500" r:id="rId16"/>
+    <p:sldId id="501" r:id="rId17"/>
   </p:sldIdLst>
   <p:sldSz cx="12192000" cy="6858000"/>
   <p:notesSz cx="6858000" cy="9144000"/>
@@ -207,7 +209,7 @@
           <a:p>
             <a:fld id="{711A52A6-9D8E-41FC-9651-78B3E515F872}" type="datetimeFigureOut">
               <a:rPr lang="en-US" smtClean="0"/>
-              <a:t>6/14/2023</a:t>
+              <a:t>6/21/2023</a:t>
             </a:fld>
             <a:endParaRPr lang="en-US"/>
           </a:p>
@@ -634,7 +636,7 @@
           <a:p>
             <a:fld id="{77F775AD-3704-4F98-A581-F4E052B5E341}" type="datetime1">
               <a:rPr lang="en-US" smtClean="0"/>
-              <a:t>6/14/2023</a:t>
+              <a:t>6/21/2023</a:t>
             </a:fld>
             <a:endParaRPr lang="en-US" dirty="0"/>
           </a:p>
@@ -883,7 +885,7 @@
           <a:p>
             <a:fld id="{B49B97F0-8049-4B63-9B9F-B08800B08AEA}" type="datetime1">
               <a:rPr lang="en-US" smtClean="0"/>
-              <a:t>6/14/2023</a:t>
+              <a:t>6/21/2023</a:t>
             </a:fld>
             <a:endParaRPr lang="en-US"/>
           </a:p>
@@ -1123,7 +1125,7 @@
           <a:p>
             <a:fld id="{76BB3555-78C2-4894-951A-9F28C24107FA}" type="datetime1">
               <a:rPr lang="en-US" smtClean="0"/>
-              <a:t>6/14/2023</a:t>
+              <a:t>6/21/2023</a:t>
             </a:fld>
             <a:endParaRPr lang="en-US"/>
           </a:p>
@@ -1353,7 +1355,7 @@
           <a:p>
             <a:fld id="{37A4B9B3-CD86-4259-A27A-F9B9C6081119}" type="datetime1">
               <a:rPr lang="en-US" smtClean="0"/>
-              <a:t>6/14/2023</a:t>
+              <a:t>6/21/2023</a:t>
             </a:fld>
             <a:endParaRPr lang="en-US"/>
           </a:p>
@@ -1631,7 +1633,7 @@
           <a:p>
             <a:fld id="{66287512-E62E-4968-99B9-D028D358C1D6}" type="datetime1">
               <a:rPr lang="en-US" smtClean="0"/>
-              <a:t>6/14/2023</a:t>
+              <a:t>6/21/2023</a:t>
             </a:fld>
             <a:endParaRPr lang="en-US"/>
           </a:p>
@@ -1954,7 +1956,7 @@
           <a:p>
             <a:fld id="{356AD7E7-9EE9-4D28-82A7-0AE338FFEED9}" type="datetime1">
               <a:rPr lang="en-US" smtClean="0"/>
-              <a:t>6/14/2023</a:t>
+              <a:t>6/21/2023</a:t>
             </a:fld>
             <a:endParaRPr lang="en-US"/>
           </a:p>
@@ -2428,7 +2430,7 @@
           <a:p>
             <a:fld id="{0B5CD5E0-6150-412F-8881-52709F06EC3B}" type="datetime1">
               <a:rPr lang="en-US" smtClean="0"/>
-              <a:t>6/14/2023</a:t>
+              <a:t>6/21/2023</a:t>
             </a:fld>
             <a:endParaRPr lang="en-US"/>
           </a:p>
@@ -2575,7 +2577,7 @@
           <a:p>
             <a:fld id="{9428AFA3-5281-4B53-8B8B-8FD665A2F0D7}" type="datetime1">
               <a:rPr lang="en-US" smtClean="0"/>
-              <a:t>6/14/2023</a:t>
+              <a:t>6/21/2023</a:t>
             </a:fld>
             <a:endParaRPr lang="en-US"/>
           </a:p>
@@ -2688,7 +2690,7 @@
           <a:p>
             <a:fld id="{556D1394-26AC-45DA-9E25-AB3CC25C7422}" type="datetime1">
               <a:rPr lang="en-US" smtClean="0"/>
-              <a:t>6/14/2023</a:t>
+              <a:t>6/21/2023</a:t>
             </a:fld>
             <a:endParaRPr lang="en-US"/>
           </a:p>
@@ -3013,7 +3015,7 @@
           <a:p>
             <a:fld id="{B641D803-18D9-4B72-95D8-021B736F630F}" type="datetime1">
               <a:rPr lang="en-US" smtClean="0"/>
-              <a:t>6/14/2023</a:t>
+              <a:t>6/21/2023</a:t>
             </a:fld>
             <a:endParaRPr lang="en-US"/>
           </a:p>
@@ -3305,7 +3307,7 @@
           <a:p>
             <a:fld id="{9F82DFCB-4787-4629-B4F0-DCD676BE203A}" type="datetime1">
               <a:rPr lang="en-US" smtClean="0"/>
-              <a:t>6/14/2023</a:t>
+              <a:t>6/21/2023</a:t>
             </a:fld>
             <a:endParaRPr lang="en-US"/>
           </a:p>
@@ -3545,7 +3547,7 @@
           <a:p>
             <a:fld id="{300C2ECC-D91C-40D5-A01C-469FC90F0645}" type="datetime1">
               <a:rPr lang="en-US" smtClean="0"/>
-              <a:t>6/14/2023</a:t>
+              <a:t>6/21/2023</a:t>
             </a:fld>
             <a:endParaRPr lang="en-US" dirty="0"/>
           </a:p>
@@ -7526,6 +7528,3854 @@
     <p:extLst>
       <p:ext uri="{BB962C8B-B14F-4D97-AF65-F5344CB8AC3E}">
         <p14:creationId xmlns:p14="http://schemas.microsoft.com/office/powerpoint/2010/main" val="1064696857"/>
+      </p:ext>
+    </p:extLst>
+  </p:cSld>
+  <p:clrMapOvr>
+    <a:masterClrMapping/>
+  </p:clrMapOvr>
+</p:sld>
+</file>
+
+<file path=ppt/slides/slide12.xml><?xml version="1.0" encoding="utf-8"?>
+<p:sld xmlns:a="http://schemas.openxmlformats.org/drawingml/2006/main" xmlns:r="http://schemas.openxmlformats.org/officeDocument/2006/relationships" xmlns:p="http://schemas.openxmlformats.org/presentationml/2006/main">
+  <p:cSld>
+    <p:spTree>
+      <p:nvGrpSpPr>
+        <p:cNvPr id="1" name=""/>
+        <p:cNvGrpSpPr/>
+        <p:nvPr/>
+      </p:nvGrpSpPr>
+      <p:grpSpPr>
+        <a:xfrm>
+          <a:off x="0" y="0"/>
+          <a:ext cx="0" cy="0"/>
+          <a:chOff x="0" y="0"/>
+          <a:chExt cx="0" cy="0"/>
+        </a:xfrm>
+      </p:grpSpPr>
+      <p:sp>
+        <p:nvSpPr>
+          <p:cNvPr id="46" name="Rectangle 45">
+            <a:extLst>
+              <a:ext uri="{FF2B5EF4-FFF2-40B4-BE49-F238E27FC236}">
+                <a16:creationId xmlns:a16="http://schemas.microsoft.com/office/drawing/2014/main" id="{72127004-8A7D-A358-ADEB-B3629DBFE527}"/>
+              </a:ext>
+            </a:extLst>
+          </p:cNvPr>
+          <p:cNvSpPr/>
+          <p:nvPr/>
+        </p:nvSpPr>
+        <p:spPr>
+          <a:xfrm>
+            <a:off x="3860814" y="5838288"/>
+            <a:ext cx="6392648" cy="856947"/>
+          </a:xfrm>
+          <a:prstGeom prst="rect">
+            <a:avLst/>
+          </a:prstGeom>
+          <a:solidFill>
+            <a:srgbClr val="F1D9F1"/>
+          </a:solidFill>
+          <a:ln>
+            <a:noFill/>
+          </a:ln>
+        </p:spPr>
+        <p:style>
+          <a:lnRef idx="2">
+            <a:schemeClr val="accent1">
+              <a:shade val="15000"/>
+            </a:schemeClr>
+          </a:lnRef>
+          <a:fillRef idx="1">
+            <a:schemeClr val="accent1"/>
+          </a:fillRef>
+          <a:effectRef idx="0">
+            <a:schemeClr val="accent1"/>
+          </a:effectRef>
+          <a:fontRef idx="minor">
+            <a:schemeClr val="lt1"/>
+          </a:fontRef>
+        </p:style>
+        <p:txBody>
+          <a:bodyPr rtlCol="0" anchor="ctr"/>
+          <a:lstStyle/>
+          <a:p>
+            <a:pPr algn="ctr"/>
+            <a:endParaRPr lang="en-US" sz="1400" b="1" dirty="0">
+              <a:solidFill>
+                <a:schemeClr val="tx1"/>
+              </a:solidFill>
+            </a:endParaRPr>
+          </a:p>
+        </p:txBody>
+      </p:sp>
+      <p:sp>
+        <p:nvSpPr>
+          <p:cNvPr id="12" name="Rectangle 11">
+            <a:extLst>
+              <a:ext uri="{FF2B5EF4-FFF2-40B4-BE49-F238E27FC236}">
+                <a16:creationId xmlns:a16="http://schemas.microsoft.com/office/drawing/2014/main" id="{E3774B39-3B4C-D81E-872A-828DD7656DFD}"/>
+              </a:ext>
+            </a:extLst>
+          </p:cNvPr>
+          <p:cNvSpPr/>
+          <p:nvPr/>
+        </p:nvSpPr>
+        <p:spPr>
+          <a:xfrm>
+            <a:off x="3830098" y="5073270"/>
+            <a:ext cx="6430023" cy="768917"/>
+          </a:xfrm>
+          <a:prstGeom prst="rect">
+            <a:avLst/>
+          </a:prstGeom>
+          <a:solidFill>
+            <a:schemeClr val="accent6">
+              <a:lumMod val="20000"/>
+              <a:lumOff val="80000"/>
+            </a:schemeClr>
+          </a:solidFill>
+          <a:ln>
+            <a:noFill/>
+          </a:ln>
+        </p:spPr>
+        <p:style>
+          <a:lnRef idx="2">
+            <a:schemeClr val="accent1">
+              <a:shade val="15000"/>
+            </a:schemeClr>
+          </a:lnRef>
+          <a:fillRef idx="1">
+            <a:schemeClr val="accent1"/>
+          </a:fillRef>
+          <a:effectRef idx="0">
+            <a:schemeClr val="accent1"/>
+          </a:effectRef>
+          <a:fontRef idx="minor">
+            <a:schemeClr val="lt1"/>
+          </a:fontRef>
+        </p:style>
+        <p:txBody>
+          <a:bodyPr rtlCol="0" anchor="ctr"/>
+          <a:lstStyle/>
+          <a:p>
+            <a:pPr algn="ctr"/>
+            <a:endParaRPr lang="en-US" sz="1400" dirty="0">
+              <a:solidFill>
+                <a:schemeClr val="tx1"/>
+              </a:solidFill>
+            </a:endParaRPr>
+          </a:p>
+        </p:txBody>
+      </p:sp>
+      <p:sp>
+        <p:nvSpPr>
+          <p:cNvPr id="36" name="Rectangle 35">
+            <a:extLst>
+              <a:ext uri="{FF2B5EF4-FFF2-40B4-BE49-F238E27FC236}">
+                <a16:creationId xmlns:a16="http://schemas.microsoft.com/office/drawing/2014/main" id="{A9639FBB-FEB5-DA38-1257-27E1770ED7AB}"/>
+              </a:ext>
+            </a:extLst>
+          </p:cNvPr>
+          <p:cNvSpPr/>
+          <p:nvPr/>
+        </p:nvSpPr>
+        <p:spPr>
+          <a:xfrm>
+            <a:off x="3823439" y="2886436"/>
+            <a:ext cx="6430023" cy="2192036"/>
+          </a:xfrm>
+          <a:prstGeom prst="rect">
+            <a:avLst/>
+          </a:prstGeom>
+          <a:solidFill>
+            <a:schemeClr val="accent1">
+              <a:lumMod val="20000"/>
+              <a:lumOff val="80000"/>
+            </a:schemeClr>
+          </a:solidFill>
+          <a:ln>
+            <a:noFill/>
+          </a:ln>
+        </p:spPr>
+        <p:style>
+          <a:lnRef idx="2">
+            <a:schemeClr val="accent1">
+              <a:shade val="15000"/>
+            </a:schemeClr>
+          </a:lnRef>
+          <a:fillRef idx="1">
+            <a:schemeClr val="accent1"/>
+          </a:fillRef>
+          <a:effectRef idx="0">
+            <a:schemeClr val="accent1"/>
+          </a:effectRef>
+          <a:fontRef idx="minor">
+            <a:schemeClr val="lt1"/>
+          </a:fontRef>
+        </p:style>
+        <p:txBody>
+          <a:bodyPr rtlCol="0" anchor="ctr"/>
+          <a:lstStyle/>
+          <a:p>
+            <a:pPr algn="ctr"/>
+            <a:endParaRPr lang="en-US"/>
+          </a:p>
+        </p:txBody>
+      </p:sp>
+      <p:sp>
+        <p:nvSpPr>
+          <p:cNvPr id="16" name="Rectangle 15">
+            <a:extLst>
+              <a:ext uri="{FF2B5EF4-FFF2-40B4-BE49-F238E27FC236}">
+                <a16:creationId xmlns:a16="http://schemas.microsoft.com/office/drawing/2014/main" id="{72C539D4-1CBA-B5E5-2E88-785897940B49}"/>
+              </a:ext>
+            </a:extLst>
+          </p:cNvPr>
+          <p:cNvSpPr/>
+          <p:nvPr/>
+        </p:nvSpPr>
+        <p:spPr>
+          <a:xfrm>
+            <a:off x="4036872" y="2386227"/>
+            <a:ext cx="3639847" cy="488526"/>
+          </a:xfrm>
+          <a:prstGeom prst="rect">
+            <a:avLst/>
+          </a:prstGeom>
+          <a:solidFill>
+            <a:schemeClr val="bg2">
+              <a:lumMod val="90000"/>
+            </a:schemeClr>
+          </a:solidFill>
+          <a:ln>
+            <a:noFill/>
+          </a:ln>
+        </p:spPr>
+        <p:style>
+          <a:lnRef idx="2">
+            <a:schemeClr val="accent1">
+              <a:shade val="15000"/>
+            </a:schemeClr>
+          </a:lnRef>
+          <a:fillRef idx="1">
+            <a:schemeClr val="accent1"/>
+          </a:fillRef>
+          <a:effectRef idx="0">
+            <a:schemeClr val="accent1"/>
+          </a:effectRef>
+          <a:fontRef idx="minor">
+            <a:schemeClr val="lt1"/>
+          </a:fontRef>
+        </p:style>
+        <p:txBody>
+          <a:bodyPr rtlCol="0" anchor="ctr"/>
+          <a:lstStyle/>
+          <a:p>
+            <a:pPr algn="ctr"/>
+            <a:endParaRPr lang="en-US"/>
+          </a:p>
+        </p:txBody>
+      </p:sp>
+      <p:sp>
+        <p:nvSpPr>
+          <p:cNvPr id="13" name="Rectangle 12">
+            <a:extLst>
+              <a:ext uri="{FF2B5EF4-FFF2-40B4-BE49-F238E27FC236}">
+                <a16:creationId xmlns:a16="http://schemas.microsoft.com/office/drawing/2014/main" id="{2CBCDC26-00E5-A3E1-F5B6-30FDC541BC9D}"/>
+              </a:ext>
+            </a:extLst>
+          </p:cNvPr>
+          <p:cNvSpPr/>
+          <p:nvPr/>
+        </p:nvSpPr>
+        <p:spPr>
+          <a:xfrm>
+            <a:off x="4036873" y="2161579"/>
+            <a:ext cx="1976763" cy="221943"/>
+          </a:xfrm>
+          <a:prstGeom prst="rect">
+            <a:avLst/>
+          </a:prstGeom>
+          <a:solidFill>
+            <a:schemeClr val="accent2">
+              <a:lumMod val="40000"/>
+              <a:lumOff val="60000"/>
+            </a:schemeClr>
+          </a:solidFill>
+          <a:ln>
+            <a:noFill/>
+          </a:ln>
+        </p:spPr>
+        <p:style>
+          <a:lnRef idx="2">
+            <a:schemeClr val="accent1">
+              <a:shade val="15000"/>
+            </a:schemeClr>
+          </a:lnRef>
+          <a:fillRef idx="1">
+            <a:schemeClr val="accent1"/>
+          </a:fillRef>
+          <a:effectRef idx="0">
+            <a:schemeClr val="accent1"/>
+          </a:effectRef>
+          <a:fontRef idx="minor">
+            <a:schemeClr val="lt1"/>
+          </a:fontRef>
+        </p:style>
+        <p:txBody>
+          <a:bodyPr rtlCol="0" anchor="ctr"/>
+          <a:lstStyle/>
+          <a:p>
+            <a:pPr algn="ctr"/>
+            <a:endParaRPr lang="en-US"/>
+          </a:p>
+        </p:txBody>
+      </p:sp>
+      <p:sp>
+        <p:nvSpPr>
+          <p:cNvPr id="8" name="Rectangle 7">
+            <a:extLst>
+              <a:ext uri="{FF2B5EF4-FFF2-40B4-BE49-F238E27FC236}">
+                <a16:creationId xmlns:a16="http://schemas.microsoft.com/office/drawing/2014/main" id="{1C026455-CAB0-7107-5E06-73B62BD22F6E}"/>
+              </a:ext>
+            </a:extLst>
+          </p:cNvPr>
+          <p:cNvSpPr/>
+          <p:nvPr/>
+        </p:nvSpPr>
+        <p:spPr>
+          <a:xfrm>
+            <a:off x="4036873" y="1876641"/>
+            <a:ext cx="2601157" cy="269288"/>
+          </a:xfrm>
+          <a:prstGeom prst="rect">
+            <a:avLst/>
+          </a:prstGeom>
+          <a:solidFill>
+            <a:schemeClr val="accent6">
+              <a:lumMod val="40000"/>
+              <a:lumOff val="60000"/>
+            </a:schemeClr>
+          </a:solidFill>
+          <a:ln>
+            <a:noFill/>
+          </a:ln>
+        </p:spPr>
+        <p:style>
+          <a:lnRef idx="2">
+            <a:schemeClr val="accent1">
+              <a:shade val="15000"/>
+            </a:schemeClr>
+          </a:lnRef>
+          <a:fillRef idx="1">
+            <a:schemeClr val="accent1"/>
+          </a:fillRef>
+          <a:effectRef idx="0">
+            <a:schemeClr val="accent1"/>
+          </a:effectRef>
+          <a:fontRef idx="minor">
+            <a:schemeClr val="lt1"/>
+          </a:fontRef>
+        </p:style>
+        <p:txBody>
+          <a:bodyPr rtlCol="0" anchor="ctr"/>
+          <a:lstStyle/>
+          <a:p>
+            <a:pPr algn="ctr"/>
+            <a:endParaRPr lang="en-US"/>
+          </a:p>
+        </p:txBody>
+      </p:sp>
+      <p:sp>
+        <p:nvSpPr>
+          <p:cNvPr id="9" name="Rectangle 8">
+            <a:extLst>
+              <a:ext uri="{FF2B5EF4-FFF2-40B4-BE49-F238E27FC236}">
+                <a16:creationId xmlns:a16="http://schemas.microsoft.com/office/drawing/2014/main" id="{1757DC22-740F-82D7-A00D-42CF44D23CA6}"/>
+              </a:ext>
+            </a:extLst>
+          </p:cNvPr>
+          <p:cNvSpPr/>
+          <p:nvPr/>
+        </p:nvSpPr>
+        <p:spPr>
+          <a:xfrm>
+            <a:off x="4036873" y="1414401"/>
+            <a:ext cx="4225772" cy="488526"/>
+          </a:xfrm>
+          <a:prstGeom prst="rect">
+            <a:avLst/>
+          </a:prstGeom>
+          <a:solidFill>
+            <a:schemeClr val="accent4"/>
+          </a:solidFill>
+          <a:ln>
+            <a:noFill/>
+          </a:ln>
+        </p:spPr>
+        <p:style>
+          <a:lnRef idx="2">
+            <a:schemeClr val="accent1">
+              <a:shade val="15000"/>
+            </a:schemeClr>
+          </a:lnRef>
+          <a:fillRef idx="1">
+            <a:schemeClr val="accent1"/>
+          </a:fillRef>
+          <a:effectRef idx="0">
+            <a:schemeClr val="accent1"/>
+          </a:effectRef>
+          <a:fontRef idx="minor">
+            <a:schemeClr val="lt1"/>
+          </a:fontRef>
+        </p:style>
+        <p:txBody>
+          <a:bodyPr rtlCol="0" anchor="ctr"/>
+          <a:lstStyle/>
+          <a:p>
+            <a:pPr algn="ctr"/>
+            <a:endParaRPr lang="en-US"/>
+          </a:p>
+        </p:txBody>
+      </p:sp>
+      <p:sp>
+        <p:nvSpPr>
+          <p:cNvPr id="7" name="Rectangle 6">
+            <a:extLst>
+              <a:ext uri="{FF2B5EF4-FFF2-40B4-BE49-F238E27FC236}">
+                <a16:creationId xmlns:a16="http://schemas.microsoft.com/office/drawing/2014/main" id="{790F2CA3-19A2-C7F6-C82D-20112C0EFFC8}"/>
+              </a:ext>
+            </a:extLst>
+          </p:cNvPr>
+          <p:cNvSpPr/>
+          <p:nvPr/>
+        </p:nvSpPr>
+        <p:spPr>
+          <a:xfrm>
+            <a:off x="4036874" y="460052"/>
+            <a:ext cx="2177618" cy="954349"/>
+          </a:xfrm>
+          <a:prstGeom prst="rect">
+            <a:avLst/>
+          </a:prstGeom>
+          <a:solidFill>
+            <a:schemeClr val="accent1">
+              <a:lumMod val="40000"/>
+              <a:lumOff val="60000"/>
+            </a:schemeClr>
+          </a:solidFill>
+          <a:ln>
+            <a:noFill/>
+          </a:ln>
+        </p:spPr>
+        <p:style>
+          <a:lnRef idx="2">
+            <a:schemeClr val="accent1">
+              <a:shade val="15000"/>
+            </a:schemeClr>
+          </a:lnRef>
+          <a:fillRef idx="1">
+            <a:schemeClr val="accent1"/>
+          </a:fillRef>
+          <a:effectRef idx="0">
+            <a:schemeClr val="accent1"/>
+          </a:effectRef>
+          <a:fontRef idx="minor">
+            <a:schemeClr val="lt1"/>
+          </a:fontRef>
+        </p:style>
+        <p:txBody>
+          <a:bodyPr rtlCol="0" anchor="ctr"/>
+          <a:lstStyle/>
+          <a:p>
+            <a:pPr algn="ctr"/>
+            <a:endParaRPr lang="en-US"/>
+          </a:p>
+        </p:txBody>
+      </p:sp>
+      <p:sp>
+        <p:nvSpPr>
+          <p:cNvPr id="6" name="Rectangle 5">
+            <a:extLst>
+              <a:ext uri="{FF2B5EF4-FFF2-40B4-BE49-F238E27FC236}">
+                <a16:creationId xmlns:a16="http://schemas.microsoft.com/office/drawing/2014/main" id="{5D85A8FA-8E6E-79A7-59E0-7676B5C606A4}"/>
+              </a:ext>
+            </a:extLst>
+          </p:cNvPr>
+          <p:cNvSpPr/>
+          <p:nvPr/>
+        </p:nvSpPr>
+        <p:spPr>
+          <a:xfrm>
+            <a:off x="3823439" y="136525"/>
+            <a:ext cx="6436682" cy="6547028"/>
+          </a:xfrm>
+          <a:prstGeom prst="rect">
+            <a:avLst/>
+          </a:prstGeom>
+          <a:noFill/>
+          <a:ln w="28575">
+            <a:solidFill>
+              <a:schemeClr val="accent1"/>
+            </a:solidFill>
+          </a:ln>
+        </p:spPr>
+        <p:style>
+          <a:lnRef idx="2">
+            <a:schemeClr val="dk1"/>
+          </a:lnRef>
+          <a:fillRef idx="1">
+            <a:schemeClr val="lt1"/>
+          </a:fillRef>
+          <a:effectRef idx="0">
+            <a:schemeClr val="dk1"/>
+          </a:effectRef>
+          <a:fontRef idx="minor">
+            <a:schemeClr val="dk1"/>
+          </a:fontRef>
+        </p:style>
+        <p:txBody>
+          <a:bodyPr rtlCol="0" anchor="t"/>
+          <a:lstStyle/>
+          <a:p>
+            <a:r>
+              <a:rPr lang="en-US" sz="1600" dirty="0"/>
+              <a:t>class </a:t>
+            </a:r>
+            <a:r>
+              <a:rPr lang="en-US" sz="1600" dirty="0" err="1"/>
+              <a:t>FunctionName</a:t>
+            </a:r>
+            <a:r>
+              <a:rPr lang="en-US" sz="1600" dirty="0"/>
+              <a:t>(</a:t>
+            </a:r>
+            <a:r>
+              <a:rPr lang="en-US" sz="1600" dirty="0" err="1"/>
+              <a:t>FxnBlock</a:t>
+            </a:r>
+            <a:r>
+              <a:rPr lang="en-US" sz="1600" dirty="0"/>
+              <a:t>):</a:t>
+            </a:r>
+          </a:p>
+          <a:p>
+            <a:r>
+              <a:rPr lang="en-US" sz="1600" dirty="0"/>
+              <a:t>    _</a:t>
+            </a:r>
+            <a:r>
+              <a:rPr lang="en-US" sz="1600" dirty="0" err="1"/>
+              <a:t>init_s</a:t>
+            </a:r>
+            <a:r>
+              <a:rPr lang="en-US" sz="1600" dirty="0"/>
+              <a:t> = </a:t>
+            </a:r>
+            <a:r>
+              <a:rPr lang="en-US" sz="1600" dirty="0" err="1"/>
+              <a:t>FunctionState</a:t>
+            </a:r>
+            <a:endParaRPr lang="en-US" sz="1600" dirty="0"/>
+          </a:p>
+          <a:p>
+            <a:r>
+              <a:rPr lang="en-US" sz="1600" dirty="0"/>
+              <a:t>    _</a:t>
+            </a:r>
+            <a:r>
+              <a:rPr lang="en-US" sz="1600" dirty="0" err="1"/>
+              <a:t>init_m</a:t>
+            </a:r>
+            <a:r>
+              <a:rPr lang="en-US" sz="1600" dirty="0"/>
+              <a:t> = </a:t>
+            </a:r>
+            <a:r>
+              <a:rPr lang="en-US" sz="1600" dirty="0" err="1"/>
+              <a:t>FunctionMode</a:t>
+            </a:r>
+            <a:endParaRPr lang="en-US" sz="1600" dirty="0"/>
+          </a:p>
+          <a:p>
+            <a:r>
+              <a:rPr lang="en-US" sz="1600" dirty="0"/>
+              <a:t>    _</a:t>
+            </a:r>
+            <a:r>
+              <a:rPr lang="en-US" sz="1600" dirty="0" err="1"/>
+              <a:t>init_t</a:t>
+            </a:r>
+            <a:r>
+              <a:rPr lang="en-US" sz="1600" dirty="0"/>
+              <a:t> = </a:t>
+            </a:r>
+            <a:r>
+              <a:rPr lang="en-US" sz="1600" dirty="0" err="1"/>
+              <a:t>FunctionTime</a:t>
+            </a:r>
+            <a:endParaRPr lang="en-US" sz="1600" dirty="0"/>
+          </a:p>
+          <a:p>
+            <a:r>
+              <a:rPr lang="en-US" sz="1600" dirty="0"/>
+              <a:t>    …</a:t>
+            </a:r>
+          </a:p>
+          <a:p>
+            <a:r>
+              <a:rPr lang="en-US" sz="1600" dirty="0"/>
+              <a:t>    _init_flowname1 = FlowClass1</a:t>
+            </a:r>
+          </a:p>
+          <a:p>
+            <a:r>
+              <a:rPr lang="en-US" sz="1600" dirty="0"/>
+              <a:t>    </a:t>
+            </a:r>
+            <a:r>
+              <a:rPr lang="en-US" sz="1600" dirty="0" err="1"/>
+              <a:t>flownames</a:t>
+            </a:r>
+            <a:r>
+              <a:rPr lang="en-US" sz="1600" dirty="0"/>
+              <a:t> = {“outsideflowname”:”flowname1”}</a:t>
+            </a:r>
+          </a:p>
+          <a:p>
+            <a:r>
+              <a:rPr lang="en-US" sz="1600" dirty="0"/>
+              <a:t>    </a:t>
+            </a:r>
+            <a:r>
+              <a:rPr lang="en-US" sz="1600" dirty="0" err="1"/>
+              <a:t>default_sp</a:t>
+            </a:r>
+            <a:r>
+              <a:rPr lang="en-US" sz="1600" dirty="0"/>
+              <a:t> = {‘times’:</a:t>
+            </a:r>
+            <a:r>
+              <a:rPr lang="en-US" sz="1600" dirty="0">
+                <a:sym typeface="Wingdings" panose="05000000000000000000" pitchFamily="2" charset="2"/>
+              </a:rPr>
+              <a:t>(0,100)</a:t>
+            </a:r>
+            <a:r>
+              <a:rPr lang="en-US" sz="1600" dirty="0"/>
+              <a:t>}</a:t>
+            </a:r>
+          </a:p>
+          <a:p>
+            <a:r>
+              <a:rPr lang="en-US" sz="1600" dirty="0"/>
+              <a:t>    </a:t>
+            </a:r>
+            <a:r>
+              <a:rPr lang="en-US" sz="1600" dirty="0" err="1"/>
+              <a:t>default_track</a:t>
+            </a:r>
+            <a:r>
+              <a:rPr lang="en-US" sz="1600" dirty="0"/>
+              <a:t> = [‘</a:t>
+            </a:r>
+            <a:r>
+              <a:rPr lang="en-US" sz="1600" dirty="0" err="1"/>
+              <a:t>s’,’m</a:t>
+            </a:r>
+            <a:r>
+              <a:rPr lang="en-US" sz="1600" dirty="0"/>
+              <a:t>’]</a:t>
+            </a:r>
+          </a:p>
+          <a:p>
+            <a:r>
+              <a:rPr lang="en-US" sz="1600" dirty="0"/>
+              <a:t>    def __</a:t>
+            </a:r>
+            <a:r>
+              <a:rPr lang="en-US" sz="1600" dirty="0" err="1"/>
+              <a:t>init</a:t>
+            </a:r>
+            <a:r>
+              <a:rPr lang="en-US" sz="1600" dirty="0"/>
+              <a:t>__(self, name, flows, **</a:t>
+            </a:r>
+            <a:r>
+              <a:rPr lang="en-US" sz="1600" dirty="0" err="1"/>
+              <a:t>kwargs</a:t>
+            </a:r>
+            <a:r>
+              <a:rPr lang="en-US" sz="1600" dirty="0"/>
+              <a:t>):</a:t>
+            </a:r>
+          </a:p>
+          <a:p>
+            <a:r>
+              <a:rPr lang="en-US" sz="1600" dirty="0"/>
+              <a:t>        super().__</a:t>
+            </a:r>
+            <a:r>
+              <a:rPr lang="en-US" sz="1600" dirty="0" err="1"/>
+              <a:t>init</a:t>
+            </a:r>
+            <a:r>
+              <a:rPr lang="en-US" sz="1600" dirty="0"/>
+              <a:t>__(name, flows, **</a:t>
+            </a:r>
+            <a:r>
+              <a:rPr lang="en-US" sz="1600" dirty="0" err="1"/>
+              <a:t>kwargs</a:t>
+            </a:r>
+            <a:r>
+              <a:rPr lang="en-US" sz="1600" dirty="0"/>
+              <a:t>)</a:t>
+            </a:r>
+          </a:p>
+          <a:p>
+            <a:r>
+              <a:rPr lang="en-US" sz="1600" dirty="0"/>
+              <a:t>   def </a:t>
+            </a:r>
+            <a:r>
+              <a:rPr lang="en-US" sz="1600" dirty="0" err="1"/>
+              <a:t>static_behavior</a:t>
+            </a:r>
+            <a:r>
+              <a:rPr lang="en-US" sz="1600" dirty="0"/>
+              <a:t>(self, time):</a:t>
+            </a:r>
+          </a:p>
+          <a:p>
+            <a:r>
+              <a:rPr lang="en-US" sz="1600" dirty="0"/>
+              <a:t>        </a:t>
+            </a:r>
+            <a:r>
+              <a:rPr lang="en-US" sz="1600" dirty="0">
+                <a:highlight>
+                  <a:srgbClr val="00FFFF"/>
+                </a:highlight>
+              </a:rPr>
+              <a:t>Runs only in static propagation steps</a:t>
+            </a:r>
+          </a:p>
+          <a:p>
+            <a:r>
+              <a:rPr lang="en-US" sz="1600" dirty="0"/>
+              <a:t>    def </a:t>
+            </a:r>
+            <a:r>
+              <a:rPr lang="en-US" sz="1600" dirty="0" err="1"/>
+              <a:t>dynamic_behavior</a:t>
+            </a:r>
+            <a:r>
+              <a:rPr lang="en-US" sz="1600" dirty="0"/>
+              <a:t>(self, time):</a:t>
+            </a:r>
+          </a:p>
+          <a:p>
+            <a:r>
+              <a:rPr lang="en-US" sz="1600" dirty="0"/>
+              <a:t>        </a:t>
+            </a:r>
+            <a:r>
+              <a:rPr lang="en-US" sz="1600" dirty="0">
+                <a:highlight>
+                  <a:srgbClr val="00FFFF"/>
+                </a:highlight>
+              </a:rPr>
+              <a:t>Runs only in dynamic propagation steps</a:t>
+            </a:r>
+          </a:p>
+          <a:p>
+            <a:r>
+              <a:rPr lang="en-US" sz="1600" dirty="0"/>
+              <a:t>     def behavior(self, time):</a:t>
+            </a:r>
+          </a:p>
+          <a:p>
+            <a:r>
+              <a:rPr lang="en-US" sz="1600" dirty="0"/>
+              <a:t>        </a:t>
+            </a:r>
+            <a:r>
+              <a:rPr lang="en-US" sz="1600" dirty="0">
+                <a:highlight>
+                  <a:srgbClr val="00FFFF"/>
+                </a:highlight>
+              </a:rPr>
+              <a:t>Runs in static propagation step (same as </a:t>
+            </a:r>
+            <a:r>
+              <a:rPr lang="en-US" sz="1600" dirty="0" err="1">
+                <a:highlight>
+                  <a:srgbClr val="00FFFF"/>
+                </a:highlight>
+              </a:rPr>
+              <a:t>static_behavior</a:t>
+            </a:r>
+            <a:r>
+              <a:rPr lang="en-US" sz="1600" dirty="0">
+                <a:highlight>
+                  <a:srgbClr val="00FFFF"/>
+                </a:highlight>
+              </a:rPr>
+              <a:t>)</a:t>
+            </a:r>
+            <a:endParaRPr lang="en-US" sz="1600" dirty="0"/>
+          </a:p>
+          <a:p>
+            <a:r>
+              <a:rPr lang="en-US" sz="1600" dirty="0"/>
+              <a:t>    def </a:t>
+            </a:r>
+            <a:r>
+              <a:rPr lang="en-US" sz="1600" dirty="0" err="1"/>
+              <a:t>condfaults</a:t>
+            </a:r>
+            <a:r>
+              <a:rPr lang="en-US" sz="1600" dirty="0"/>
+              <a:t>(self, time):</a:t>
+            </a:r>
+          </a:p>
+          <a:p>
+            <a:r>
+              <a:rPr lang="en-US" sz="1600" dirty="0"/>
+              <a:t>        </a:t>
+            </a:r>
+            <a:r>
+              <a:rPr lang="en-US" sz="1600" dirty="0">
+                <a:highlight>
+                  <a:srgbClr val="00FFFF"/>
+                </a:highlight>
+              </a:rPr>
+              <a:t>Runs in both static and dynamic propagation steps prior to behaviors and internal fault propagation (to components  and actions)</a:t>
+            </a:r>
+          </a:p>
+          <a:p>
+            <a:r>
+              <a:rPr lang="en-US" sz="1600" dirty="0"/>
+              <a:t>    def </a:t>
+            </a:r>
+            <a:r>
+              <a:rPr lang="en-US" sz="1600" dirty="0" err="1"/>
+              <a:t>indicate_XXX</a:t>
+            </a:r>
+            <a:r>
+              <a:rPr lang="en-US" sz="1600" dirty="0"/>
+              <a:t>(self, time):</a:t>
+            </a:r>
+          </a:p>
+          <a:p>
+            <a:r>
+              <a:rPr lang="en-US" sz="1600" dirty="0"/>
+              <a:t>        </a:t>
+            </a:r>
+            <a:r>
+              <a:rPr lang="en-US" sz="1600" dirty="0">
+                <a:highlight>
+                  <a:srgbClr val="00FF00"/>
+                </a:highlight>
+              </a:rPr>
+              <a:t>Conditional statement (e.g., </a:t>
+            </a:r>
+            <a:r>
+              <a:rPr lang="en-US" sz="1600" dirty="0" err="1">
+                <a:highlight>
+                  <a:srgbClr val="00FF00"/>
+                </a:highlight>
+              </a:rPr>
+              <a:t>self.s.state</a:t>
+            </a:r>
+            <a:r>
+              <a:rPr lang="en-US" sz="1600" dirty="0">
+                <a:highlight>
+                  <a:srgbClr val="00FF00"/>
+                </a:highlight>
+              </a:rPr>
+              <a:t>&gt;threshold) which is logged in the history and may be used to terminate simulations</a:t>
+            </a:r>
+          </a:p>
+          <a:p>
+            <a:r>
+              <a:rPr lang="en-US" sz="1600" dirty="0"/>
+              <a:t>    def </a:t>
+            </a:r>
+            <a:r>
+              <a:rPr lang="en-US" sz="1600" dirty="0" err="1"/>
+              <a:t>find_classification</a:t>
+            </a:r>
+            <a:r>
+              <a:rPr lang="en-US" sz="1600" dirty="0"/>
+              <a:t>(self, time):</a:t>
+            </a:r>
+          </a:p>
+          <a:p>
+            <a:r>
+              <a:rPr lang="en-US" sz="1600" dirty="0">
+                <a:highlight>
+                  <a:srgbClr val="E997E9"/>
+                </a:highlight>
+              </a:rPr>
+              <a:t>        Returns a Result dictionary (calculated at completion)</a:t>
+            </a:r>
+          </a:p>
+        </p:txBody>
+      </p:sp>
+      <p:sp>
+        <p:nvSpPr>
+          <p:cNvPr id="10" name="Rectangle 9">
+            <a:extLst>
+              <a:ext uri="{FF2B5EF4-FFF2-40B4-BE49-F238E27FC236}">
+                <a16:creationId xmlns:a16="http://schemas.microsoft.com/office/drawing/2014/main" id="{FF99E59A-7941-6350-EE6B-CB334F86800C}"/>
+              </a:ext>
+            </a:extLst>
+          </p:cNvPr>
+          <p:cNvSpPr/>
+          <p:nvPr/>
+        </p:nvSpPr>
+        <p:spPr>
+          <a:xfrm>
+            <a:off x="151599" y="2003056"/>
+            <a:ext cx="3328941" cy="1410896"/>
+          </a:xfrm>
+          <a:prstGeom prst="rect">
+            <a:avLst/>
+          </a:prstGeom>
+          <a:solidFill>
+            <a:schemeClr val="accent2">
+              <a:lumMod val="40000"/>
+              <a:lumOff val="60000"/>
+            </a:schemeClr>
+          </a:solidFill>
+          <a:ln>
+            <a:noFill/>
+          </a:ln>
+        </p:spPr>
+        <p:style>
+          <a:lnRef idx="2">
+            <a:schemeClr val="accent1">
+              <a:shade val="15000"/>
+            </a:schemeClr>
+          </a:lnRef>
+          <a:fillRef idx="1">
+            <a:schemeClr val="accent1"/>
+          </a:fillRef>
+          <a:effectRef idx="0">
+            <a:schemeClr val="accent1"/>
+          </a:effectRef>
+          <a:fontRef idx="minor">
+            <a:schemeClr val="lt1"/>
+          </a:fontRef>
+        </p:style>
+        <p:txBody>
+          <a:bodyPr rtlCol="0" anchor="ctr"/>
+          <a:lstStyle/>
+          <a:p>
+            <a:pPr algn="ctr"/>
+            <a:r>
+              <a:rPr lang="en-US" sz="1400" dirty="0">
+                <a:solidFill>
+                  <a:schemeClr val="tx1"/>
+                </a:solidFill>
+              </a:rPr>
+              <a:t>Specifies </a:t>
+            </a:r>
+            <a:r>
+              <a:rPr lang="en-US" sz="1400" b="1" dirty="0">
+                <a:solidFill>
+                  <a:schemeClr val="tx1"/>
+                </a:solidFill>
+              </a:rPr>
+              <a:t>what should be tracked</a:t>
+            </a:r>
+            <a:r>
+              <a:rPr lang="en-US" sz="1400" dirty="0">
+                <a:solidFill>
+                  <a:schemeClr val="tx1"/>
+                </a:solidFill>
+              </a:rPr>
+              <a:t> in the </a:t>
+            </a:r>
+            <a:r>
+              <a:rPr lang="en-US" sz="1400" dirty="0" err="1">
+                <a:solidFill>
+                  <a:schemeClr val="tx1"/>
+                </a:solidFill>
+              </a:rPr>
+              <a:t>FxnBlock</a:t>
+            </a:r>
+            <a:r>
+              <a:rPr lang="en-US" sz="1400" dirty="0">
+                <a:solidFill>
+                  <a:schemeClr val="tx1"/>
+                </a:solidFill>
+              </a:rPr>
+              <a:t> history (</a:t>
+            </a:r>
+            <a:r>
+              <a:rPr lang="en-US" sz="1400" dirty="0" err="1">
+                <a:solidFill>
+                  <a:schemeClr val="tx1"/>
+                </a:solidFill>
+              </a:rPr>
+              <a:t>fxnname.h</a:t>
+            </a:r>
+            <a:r>
+              <a:rPr lang="en-US" sz="1400" dirty="0">
+                <a:solidFill>
+                  <a:schemeClr val="tx1"/>
+                </a:solidFill>
+              </a:rPr>
+              <a:t>) by default. May be a </a:t>
+            </a:r>
+            <a:r>
+              <a:rPr lang="en-US" sz="1400" dirty="0" err="1">
+                <a:solidFill>
+                  <a:schemeClr val="tx1"/>
+                </a:solidFill>
+              </a:rPr>
+              <a:t>dict</a:t>
+            </a:r>
+            <a:r>
+              <a:rPr lang="en-US" sz="1400" dirty="0">
+                <a:solidFill>
+                  <a:schemeClr val="tx1"/>
+                </a:solidFill>
+              </a:rPr>
+              <a:t> ({</a:t>
+            </a:r>
+            <a:r>
+              <a:rPr lang="en-US" sz="1400" dirty="0" err="1">
+                <a:solidFill>
+                  <a:schemeClr val="tx1"/>
+                </a:solidFill>
+              </a:rPr>
+              <a:t>role:value</a:t>
+            </a:r>
+            <a:r>
+              <a:rPr lang="en-US" sz="1400" dirty="0">
+                <a:solidFill>
+                  <a:schemeClr val="tx1"/>
+                </a:solidFill>
+              </a:rPr>
+              <a:t>}), list ([role1, role2]), or string (“</a:t>
+            </a:r>
+            <a:r>
+              <a:rPr lang="en-US" sz="1400" dirty="0" err="1">
+                <a:solidFill>
+                  <a:schemeClr val="tx1"/>
+                </a:solidFill>
+              </a:rPr>
+              <a:t>all”,”none</a:t>
+            </a:r>
+            <a:r>
+              <a:rPr lang="en-US" sz="1400" dirty="0">
+                <a:solidFill>
+                  <a:schemeClr val="tx1"/>
+                </a:solidFill>
+              </a:rPr>
+              <a:t>”, </a:t>
+            </a:r>
+            <a:r>
+              <a:rPr lang="en-US" sz="1400" dirty="0" err="1">
+                <a:solidFill>
+                  <a:schemeClr val="tx1"/>
+                </a:solidFill>
+              </a:rPr>
+              <a:t>etc</a:t>
+            </a:r>
+            <a:r>
+              <a:rPr lang="en-US" sz="1400" dirty="0">
+                <a:solidFill>
+                  <a:schemeClr val="tx1"/>
+                </a:solidFill>
+              </a:rPr>
+              <a:t>). Overwritten by the track option in propagate. </a:t>
+            </a:r>
+          </a:p>
+        </p:txBody>
+      </p:sp>
+      <p:sp>
+        <p:nvSpPr>
+          <p:cNvPr id="11" name="Rectangle 10">
+            <a:extLst>
+              <a:ext uri="{FF2B5EF4-FFF2-40B4-BE49-F238E27FC236}">
+                <a16:creationId xmlns:a16="http://schemas.microsoft.com/office/drawing/2014/main" id="{1EF27A4B-E6D1-E3FB-020B-333E46CFE23E}"/>
+              </a:ext>
+            </a:extLst>
+          </p:cNvPr>
+          <p:cNvSpPr/>
+          <p:nvPr/>
+        </p:nvSpPr>
+        <p:spPr>
+          <a:xfrm>
+            <a:off x="257946" y="253687"/>
+            <a:ext cx="3222594" cy="1597751"/>
+          </a:xfrm>
+          <a:prstGeom prst="rect">
+            <a:avLst/>
+          </a:prstGeom>
+          <a:solidFill>
+            <a:schemeClr val="accent4"/>
+          </a:solidFill>
+          <a:ln>
+            <a:noFill/>
+          </a:ln>
+        </p:spPr>
+        <p:style>
+          <a:lnRef idx="2">
+            <a:schemeClr val="accent1">
+              <a:shade val="15000"/>
+            </a:schemeClr>
+          </a:lnRef>
+          <a:fillRef idx="1">
+            <a:schemeClr val="accent1"/>
+          </a:fillRef>
+          <a:effectRef idx="0">
+            <a:schemeClr val="accent1"/>
+          </a:effectRef>
+          <a:fontRef idx="minor">
+            <a:schemeClr val="lt1"/>
+          </a:fontRef>
+        </p:style>
+        <p:txBody>
+          <a:bodyPr rtlCol="0" anchor="ctr"/>
+          <a:lstStyle/>
+          <a:p>
+            <a:pPr algn="ctr"/>
+            <a:r>
+              <a:rPr lang="en-US" sz="1400" dirty="0">
+                <a:solidFill>
+                  <a:schemeClr val="tx1"/>
+                </a:solidFill>
+              </a:rPr>
+              <a:t>If not one of the given roles (s, m, t, etc.), _</a:t>
+            </a:r>
+            <a:r>
+              <a:rPr lang="en-US" sz="1400" dirty="0" err="1">
+                <a:solidFill>
+                  <a:schemeClr val="tx1"/>
+                </a:solidFill>
+              </a:rPr>
+              <a:t>init_XXX</a:t>
+            </a:r>
+            <a:r>
+              <a:rPr lang="en-US" sz="1400" dirty="0">
+                <a:solidFill>
+                  <a:schemeClr val="tx1"/>
+                </a:solidFill>
+              </a:rPr>
+              <a:t> is assumed to correspond to a </a:t>
+            </a:r>
+            <a:r>
+              <a:rPr lang="en-US" sz="1400" b="1" dirty="0">
+                <a:solidFill>
+                  <a:schemeClr val="tx1"/>
+                </a:solidFill>
+              </a:rPr>
+              <a:t>flow </a:t>
+            </a:r>
+            <a:r>
+              <a:rPr lang="en-US" sz="1400" dirty="0">
+                <a:solidFill>
+                  <a:schemeClr val="tx1"/>
+                </a:solidFill>
+              </a:rPr>
+              <a:t>named XXX which the </a:t>
+            </a:r>
+            <a:r>
+              <a:rPr lang="en-US" sz="1400" dirty="0" err="1">
+                <a:solidFill>
+                  <a:schemeClr val="tx1"/>
+                </a:solidFill>
+              </a:rPr>
+              <a:t>FxnBlock</a:t>
+            </a:r>
+            <a:r>
+              <a:rPr lang="en-US" sz="1400" dirty="0">
+                <a:solidFill>
+                  <a:schemeClr val="tx1"/>
+                </a:solidFill>
+              </a:rPr>
+              <a:t> will contain. If the flow(s) has a different name outside the function (optional), </a:t>
+            </a:r>
+            <a:r>
+              <a:rPr lang="en-US" sz="1400" dirty="0" err="1">
+                <a:solidFill>
+                  <a:schemeClr val="tx1"/>
+                </a:solidFill>
+              </a:rPr>
+              <a:t>flownames</a:t>
+            </a:r>
+            <a:r>
+              <a:rPr lang="en-US" sz="1400" dirty="0">
+                <a:solidFill>
+                  <a:schemeClr val="tx1"/>
+                </a:solidFill>
+              </a:rPr>
+              <a:t> matches the external name to the internal name</a:t>
+            </a:r>
+          </a:p>
+        </p:txBody>
+      </p:sp>
+      <p:sp>
+        <p:nvSpPr>
+          <p:cNvPr id="14" name="Rectangle 13">
+            <a:extLst>
+              <a:ext uri="{FF2B5EF4-FFF2-40B4-BE49-F238E27FC236}">
+                <a16:creationId xmlns:a16="http://schemas.microsoft.com/office/drawing/2014/main" id="{0D391646-A2EB-6DB7-673E-EBCE48A81170}"/>
+              </a:ext>
+            </a:extLst>
+          </p:cNvPr>
+          <p:cNvSpPr/>
+          <p:nvPr/>
+        </p:nvSpPr>
+        <p:spPr>
+          <a:xfrm>
+            <a:off x="7269642" y="431937"/>
+            <a:ext cx="4602318" cy="954350"/>
+          </a:xfrm>
+          <a:prstGeom prst="rect">
+            <a:avLst/>
+          </a:prstGeom>
+          <a:solidFill>
+            <a:schemeClr val="accent1">
+              <a:lumMod val="40000"/>
+              <a:lumOff val="60000"/>
+            </a:schemeClr>
+          </a:solidFill>
+          <a:ln>
+            <a:noFill/>
+          </a:ln>
+        </p:spPr>
+        <p:style>
+          <a:lnRef idx="2">
+            <a:schemeClr val="accent1">
+              <a:shade val="15000"/>
+            </a:schemeClr>
+          </a:lnRef>
+          <a:fillRef idx="1">
+            <a:schemeClr val="accent1"/>
+          </a:fillRef>
+          <a:effectRef idx="0">
+            <a:schemeClr val="accent1"/>
+          </a:effectRef>
+          <a:fontRef idx="minor">
+            <a:schemeClr val="lt1"/>
+          </a:fontRef>
+        </p:style>
+        <p:txBody>
+          <a:bodyPr rtlCol="0" anchor="ctr"/>
+          <a:lstStyle/>
+          <a:p>
+            <a:pPr algn="ctr"/>
+            <a:r>
+              <a:rPr lang="en-US" sz="1400" dirty="0">
+                <a:solidFill>
+                  <a:schemeClr val="tx1"/>
+                </a:solidFill>
+              </a:rPr>
+              <a:t>Specifies which classes play specific </a:t>
+            </a:r>
+            <a:r>
+              <a:rPr lang="en-US" sz="1400" dirty="0" err="1">
+                <a:solidFill>
+                  <a:schemeClr val="tx1"/>
+                </a:solidFill>
+              </a:rPr>
+              <a:t>FxnBlock</a:t>
+            </a:r>
+            <a:r>
+              <a:rPr lang="en-US" sz="1400" dirty="0">
+                <a:solidFill>
+                  <a:schemeClr val="tx1"/>
+                </a:solidFill>
+              </a:rPr>
+              <a:t> </a:t>
+            </a:r>
+            <a:r>
+              <a:rPr lang="en-US" sz="1400" b="1" dirty="0">
+                <a:solidFill>
+                  <a:schemeClr val="tx1"/>
+                </a:solidFill>
+              </a:rPr>
+              <a:t>roles </a:t>
+            </a:r>
+            <a:r>
+              <a:rPr lang="en-US" sz="1400" dirty="0">
+                <a:solidFill>
+                  <a:schemeClr val="tx1"/>
+                </a:solidFill>
+              </a:rPr>
+              <a:t>(e.g., s corresponds to the state role, m corresponds to the mode role, </a:t>
+            </a:r>
+            <a:r>
+              <a:rPr lang="en-US" sz="1400" dirty="0" err="1">
+                <a:solidFill>
+                  <a:schemeClr val="tx1"/>
+                </a:solidFill>
+              </a:rPr>
+              <a:t>etc</a:t>
+            </a:r>
+            <a:r>
+              <a:rPr lang="en-US" sz="1400" dirty="0">
+                <a:solidFill>
+                  <a:schemeClr val="tx1"/>
+                </a:solidFill>
+              </a:rPr>
+              <a:t>)</a:t>
+            </a:r>
+          </a:p>
+        </p:txBody>
+      </p:sp>
+      <p:sp>
+        <p:nvSpPr>
+          <p:cNvPr id="15" name="Rectangle 14">
+            <a:extLst>
+              <a:ext uri="{FF2B5EF4-FFF2-40B4-BE49-F238E27FC236}">
+                <a16:creationId xmlns:a16="http://schemas.microsoft.com/office/drawing/2014/main" id="{1F890D35-88DD-C827-1F33-F89FED5D13D0}"/>
+              </a:ext>
+            </a:extLst>
+          </p:cNvPr>
+          <p:cNvSpPr/>
+          <p:nvPr/>
+        </p:nvSpPr>
+        <p:spPr>
+          <a:xfrm>
+            <a:off x="8240869" y="2313204"/>
+            <a:ext cx="3639846" cy="867598"/>
+          </a:xfrm>
+          <a:prstGeom prst="rect">
+            <a:avLst/>
+          </a:prstGeom>
+          <a:solidFill>
+            <a:schemeClr val="bg2">
+              <a:lumMod val="90000"/>
+            </a:schemeClr>
+          </a:solidFill>
+          <a:ln>
+            <a:noFill/>
+          </a:ln>
+        </p:spPr>
+        <p:style>
+          <a:lnRef idx="2">
+            <a:schemeClr val="accent1">
+              <a:shade val="15000"/>
+            </a:schemeClr>
+          </a:lnRef>
+          <a:fillRef idx="1">
+            <a:schemeClr val="accent1"/>
+          </a:fillRef>
+          <a:effectRef idx="0">
+            <a:schemeClr val="accent1"/>
+          </a:effectRef>
+          <a:fontRef idx="minor">
+            <a:schemeClr val="lt1"/>
+          </a:fontRef>
+        </p:style>
+        <p:txBody>
+          <a:bodyPr rtlCol="0" anchor="ctr"/>
+          <a:lstStyle/>
+          <a:p>
+            <a:pPr algn="ctr"/>
+            <a:r>
+              <a:rPr lang="en-US" sz="1400" b="1" dirty="0">
+                <a:solidFill>
+                  <a:schemeClr val="tx1"/>
+                </a:solidFill>
+              </a:rPr>
+              <a:t>Optional</a:t>
+            </a:r>
+            <a:r>
+              <a:rPr lang="en-US" sz="1400" dirty="0">
+                <a:solidFill>
+                  <a:schemeClr val="tx1"/>
+                </a:solidFill>
+              </a:rPr>
+              <a:t> method to call to set up </a:t>
+            </a:r>
+            <a:r>
+              <a:rPr lang="en-US" sz="1400" dirty="0" err="1">
+                <a:solidFill>
+                  <a:schemeClr val="tx1"/>
+                </a:solidFill>
+              </a:rPr>
+              <a:t>FxnBlock</a:t>
+            </a:r>
+            <a:r>
+              <a:rPr lang="en-US" sz="1400" dirty="0">
+                <a:solidFill>
+                  <a:schemeClr val="tx1"/>
+                </a:solidFill>
+              </a:rPr>
+              <a:t> in ways not already defined by role </a:t>
+            </a:r>
+            <a:r>
+              <a:rPr lang="en-US" sz="1400" dirty="0" err="1">
+                <a:solidFill>
+                  <a:schemeClr val="tx1"/>
+                </a:solidFill>
+              </a:rPr>
+              <a:t>initalization</a:t>
+            </a:r>
+            <a:r>
+              <a:rPr lang="en-US" sz="1400" dirty="0">
+                <a:solidFill>
+                  <a:schemeClr val="tx1"/>
+                </a:solidFill>
+              </a:rPr>
+              <a:t> (e.g., attaching local </a:t>
+            </a:r>
+            <a:r>
+              <a:rPr lang="en-US" sz="1400" dirty="0" err="1">
+                <a:solidFill>
+                  <a:schemeClr val="tx1"/>
+                </a:solidFill>
+              </a:rPr>
+              <a:t>MultiFlows</a:t>
+            </a:r>
+            <a:r>
+              <a:rPr lang="en-US" sz="1400" dirty="0">
+                <a:solidFill>
+                  <a:schemeClr val="tx1"/>
+                </a:solidFill>
+              </a:rPr>
+              <a:t> or setting initial values for States from Parameter)</a:t>
+            </a:r>
+          </a:p>
+        </p:txBody>
+      </p:sp>
+      <p:cxnSp>
+        <p:nvCxnSpPr>
+          <p:cNvPr id="18" name="Straight Arrow Connector 17">
+            <a:extLst>
+              <a:ext uri="{FF2B5EF4-FFF2-40B4-BE49-F238E27FC236}">
+                <a16:creationId xmlns:a16="http://schemas.microsoft.com/office/drawing/2014/main" id="{C412D98A-A8CB-E5EE-CD28-4B2D28CA3DD0}"/>
+              </a:ext>
+            </a:extLst>
+          </p:cNvPr>
+          <p:cNvCxnSpPr>
+            <a:cxnSpLocks/>
+          </p:cNvCxnSpPr>
+          <p:nvPr/>
+        </p:nvCxnSpPr>
+        <p:spPr>
+          <a:xfrm flipH="1">
+            <a:off x="6146800" y="909112"/>
+            <a:ext cx="1122842" cy="0"/>
+          </a:xfrm>
+          <a:prstGeom prst="straightConnector1">
+            <a:avLst/>
+          </a:prstGeom>
+          <a:ln w="38100">
+            <a:tailEnd type="triangle"/>
+          </a:ln>
+        </p:spPr>
+        <p:style>
+          <a:lnRef idx="1">
+            <a:schemeClr val="accent1"/>
+          </a:lnRef>
+          <a:fillRef idx="0">
+            <a:schemeClr val="accent1"/>
+          </a:fillRef>
+          <a:effectRef idx="0">
+            <a:schemeClr val="accent1"/>
+          </a:effectRef>
+          <a:fontRef idx="minor">
+            <a:schemeClr val="tx1"/>
+          </a:fontRef>
+        </p:style>
+      </p:cxnSp>
+      <p:cxnSp>
+        <p:nvCxnSpPr>
+          <p:cNvPr id="21" name="Straight Arrow Connector 20">
+            <a:extLst>
+              <a:ext uri="{FF2B5EF4-FFF2-40B4-BE49-F238E27FC236}">
+                <a16:creationId xmlns:a16="http://schemas.microsoft.com/office/drawing/2014/main" id="{70D3E556-B5AF-E72D-AC7A-7B463B25E468}"/>
+              </a:ext>
+            </a:extLst>
+          </p:cNvPr>
+          <p:cNvCxnSpPr>
+            <a:cxnSpLocks/>
+          </p:cNvCxnSpPr>
+          <p:nvPr/>
+        </p:nvCxnSpPr>
+        <p:spPr>
+          <a:xfrm>
+            <a:off x="3446694" y="1658664"/>
+            <a:ext cx="644000" cy="0"/>
+          </a:xfrm>
+          <a:prstGeom prst="straightConnector1">
+            <a:avLst/>
+          </a:prstGeom>
+          <a:ln w="38100">
+            <a:solidFill>
+              <a:schemeClr val="accent2"/>
+            </a:solidFill>
+            <a:tailEnd type="triangle"/>
+          </a:ln>
+        </p:spPr>
+        <p:style>
+          <a:lnRef idx="1">
+            <a:schemeClr val="accent1"/>
+          </a:lnRef>
+          <a:fillRef idx="0">
+            <a:schemeClr val="accent1"/>
+          </a:fillRef>
+          <a:effectRef idx="0">
+            <a:schemeClr val="accent1"/>
+          </a:effectRef>
+          <a:fontRef idx="minor">
+            <a:schemeClr val="tx1"/>
+          </a:fontRef>
+        </p:style>
+      </p:cxnSp>
+      <p:cxnSp>
+        <p:nvCxnSpPr>
+          <p:cNvPr id="25" name="Straight Arrow Connector 24">
+            <a:extLst>
+              <a:ext uri="{FF2B5EF4-FFF2-40B4-BE49-F238E27FC236}">
+                <a16:creationId xmlns:a16="http://schemas.microsoft.com/office/drawing/2014/main" id="{331E180F-8F33-EF2F-BF23-D21BBB7BD54A}"/>
+              </a:ext>
+            </a:extLst>
+          </p:cNvPr>
+          <p:cNvCxnSpPr>
+            <a:cxnSpLocks/>
+          </p:cNvCxnSpPr>
+          <p:nvPr/>
+        </p:nvCxnSpPr>
+        <p:spPr>
+          <a:xfrm>
+            <a:off x="3480540" y="2272550"/>
+            <a:ext cx="610154" cy="0"/>
+          </a:xfrm>
+          <a:prstGeom prst="straightConnector1">
+            <a:avLst/>
+          </a:prstGeom>
+          <a:ln w="38100">
+            <a:solidFill>
+              <a:schemeClr val="accent2">
+                <a:lumMod val="75000"/>
+              </a:schemeClr>
+            </a:solidFill>
+            <a:tailEnd type="triangle"/>
+          </a:ln>
+        </p:spPr>
+        <p:style>
+          <a:lnRef idx="1">
+            <a:schemeClr val="accent1"/>
+          </a:lnRef>
+          <a:fillRef idx="0">
+            <a:schemeClr val="accent1"/>
+          </a:fillRef>
+          <a:effectRef idx="0">
+            <a:schemeClr val="accent1"/>
+          </a:effectRef>
+          <a:fontRef idx="minor">
+            <a:schemeClr val="tx1"/>
+          </a:fontRef>
+        </p:style>
+      </p:cxnSp>
+      <p:cxnSp>
+        <p:nvCxnSpPr>
+          <p:cNvPr id="30" name="Straight Arrow Connector 29">
+            <a:extLst>
+              <a:ext uri="{FF2B5EF4-FFF2-40B4-BE49-F238E27FC236}">
+                <a16:creationId xmlns:a16="http://schemas.microsoft.com/office/drawing/2014/main" id="{EA0BCC97-D1D8-DF39-176F-86523512AC28}"/>
+              </a:ext>
+            </a:extLst>
+          </p:cNvPr>
+          <p:cNvCxnSpPr>
+            <a:cxnSpLocks/>
+          </p:cNvCxnSpPr>
+          <p:nvPr/>
+        </p:nvCxnSpPr>
+        <p:spPr>
+          <a:xfrm flipH="1">
+            <a:off x="6638030" y="2003056"/>
+            <a:ext cx="1833241" cy="0"/>
+          </a:xfrm>
+          <a:prstGeom prst="straightConnector1">
+            <a:avLst/>
+          </a:prstGeom>
+          <a:ln w="38100">
+            <a:solidFill>
+              <a:schemeClr val="accent6"/>
+            </a:solidFill>
+            <a:tailEnd type="triangle"/>
+          </a:ln>
+        </p:spPr>
+        <p:style>
+          <a:lnRef idx="1">
+            <a:schemeClr val="accent1"/>
+          </a:lnRef>
+          <a:fillRef idx="0">
+            <a:schemeClr val="accent1"/>
+          </a:fillRef>
+          <a:effectRef idx="0">
+            <a:schemeClr val="accent1"/>
+          </a:effectRef>
+          <a:fontRef idx="minor">
+            <a:schemeClr val="tx1"/>
+          </a:fontRef>
+        </p:style>
+      </p:cxnSp>
+      <p:cxnSp>
+        <p:nvCxnSpPr>
+          <p:cNvPr id="33" name="Straight Arrow Connector 32">
+            <a:extLst>
+              <a:ext uri="{FF2B5EF4-FFF2-40B4-BE49-F238E27FC236}">
+                <a16:creationId xmlns:a16="http://schemas.microsoft.com/office/drawing/2014/main" id="{8FFE40E2-32A7-0D24-42D4-DDDE4CCAA3E9}"/>
+              </a:ext>
+            </a:extLst>
+          </p:cNvPr>
+          <p:cNvCxnSpPr>
+            <a:cxnSpLocks/>
+          </p:cNvCxnSpPr>
+          <p:nvPr/>
+        </p:nvCxnSpPr>
+        <p:spPr>
+          <a:xfrm flipH="1">
+            <a:off x="7676719" y="2677020"/>
+            <a:ext cx="564150" cy="0"/>
+          </a:xfrm>
+          <a:prstGeom prst="straightConnector1">
+            <a:avLst/>
+          </a:prstGeom>
+          <a:ln w="38100">
+            <a:solidFill>
+              <a:schemeClr val="bg1">
+                <a:lumMod val="50000"/>
+              </a:schemeClr>
+            </a:solidFill>
+            <a:tailEnd type="triangle"/>
+          </a:ln>
+        </p:spPr>
+        <p:style>
+          <a:lnRef idx="1">
+            <a:schemeClr val="accent1"/>
+          </a:lnRef>
+          <a:fillRef idx="0">
+            <a:schemeClr val="accent1"/>
+          </a:fillRef>
+          <a:effectRef idx="0">
+            <a:schemeClr val="accent1"/>
+          </a:effectRef>
+          <a:fontRef idx="minor">
+            <a:schemeClr val="tx1"/>
+          </a:fontRef>
+        </p:style>
+      </p:cxnSp>
+      <p:sp>
+        <p:nvSpPr>
+          <p:cNvPr id="37" name="Rectangle 36">
+            <a:extLst>
+              <a:ext uri="{FF2B5EF4-FFF2-40B4-BE49-F238E27FC236}">
+                <a16:creationId xmlns:a16="http://schemas.microsoft.com/office/drawing/2014/main" id="{954CDA26-7188-7FC2-53F5-F949AB4666D7}"/>
+              </a:ext>
+            </a:extLst>
+          </p:cNvPr>
+          <p:cNvSpPr/>
+          <p:nvPr/>
+        </p:nvSpPr>
+        <p:spPr>
+          <a:xfrm>
+            <a:off x="257946" y="3693884"/>
+            <a:ext cx="3040112" cy="952215"/>
+          </a:xfrm>
+          <a:prstGeom prst="rect">
+            <a:avLst/>
+          </a:prstGeom>
+          <a:solidFill>
+            <a:schemeClr val="accent1">
+              <a:lumMod val="40000"/>
+              <a:lumOff val="60000"/>
+            </a:schemeClr>
+          </a:solidFill>
+          <a:ln>
+            <a:solidFill>
+              <a:schemeClr val="accent1">
+                <a:lumMod val="20000"/>
+                <a:lumOff val="80000"/>
+              </a:schemeClr>
+            </a:solidFill>
+          </a:ln>
+        </p:spPr>
+        <p:style>
+          <a:lnRef idx="2">
+            <a:schemeClr val="accent1">
+              <a:shade val="15000"/>
+            </a:schemeClr>
+          </a:lnRef>
+          <a:fillRef idx="1">
+            <a:schemeClr val="accent1"/>
+          </a:fillRef>
+          <a:effectRef idx="0">
+            <a:schemeClr val="accent1"/>
+          </a:effectRef>
+          <a:fontRef idx="minor">
+            <a:schemeClr val="lt1"/>
+          </a:fontRef>
+        </p:style>
+        <p:txBody>
+          <a:bodyPr rtlCol="0" anchor="ctr"/>
+          <a:lstStyle/>
+          <a:p>
+            <a:pPr algn="ctr"/>
+            <a:r>
+              <a:rPr lang="en-US" sz="1400" dirty="0">
+                <a:solidFill>
+                  <a:schemeClr val="tx1"/>
+                </a:solidFill>
+              </a:rPr>
+              <a:t>These methods define the </a:t>
+            </a:r>
+            <a:r>
+              <a:rPr lang="en-US" sz="1400" b="1" dirty="0">
+                <a:solidFill>
+                  <a:schemeClr val="tx1"/>
+                </a:solidFill>
+              </a:rPr>
+              <a:t>behavior</a:t>
+            </a:r>
+            <a:r>
+              <a:rPr lang="en-US" sz="1400" dirty="0">
+                <a:solidFill>
+                  <a:schemeClr val="tx1"/>
+                </a:solidFill>
+              </a:rPr>
+              <a:t> of the </a:t>
+            </a:r>
+            <a:r>
+              <a:rPr lang="en-US" sz="1400" dirty="0" err="1">
+                <a:solidFill>
+                  <a:schemeClr val="tx1"/>
+                </a:solidFill>
+              </a:rPr>
+              <a:t>FxnBlock</a:t>
+            </a:r>
+            <a:r>
+              <a:rPr lang="en-US" sz="1400" dirty="0">
+                <a:solidFill>
+                  <a:schemeClr val="tx1"/>
+                </a:solidFill>
+              </a:rPr>
+              <a:t> and thus simulate at each time-step of the simulation. </a:t>
+            </a:r>
+          </a:p>
+        </p:txBody>
+      </p:sp>
+      <p:cxnSp>
+        <p:nvCxnSpPr>
+          <p:cNvPr id="38" name="Straight Arrow Connector 37">
+            <a:extLst>
+              <a:ext uri="{FF2B5EF4-FFF2-40B4-BE49-F238E27FC236}">
+                <a16:creationId xmlns:a16="http://schemas.microsoft.com/office/drawing/2014/main" id="{ECB4D921-7315-0CD4-C005-045DA48F73E2}"/>
+              </a:ext>
+            </a:extLst>
+          </p:cNvPr>
+          <p:cNvCxnSpPr>
+            <a:cxnSpLocks/>
+          </p:cNvCxnSpPr>
+          <p:nvPr/>
+        </p:nvCxnSpPr>
+        <p:spPr>
+          <a:xfrm>
+            <a:off x="3284738" y="4239718"/>
+            <a:ext cx="538701" cy="0"/>
+          </a:xfrm>
+          <a:prstGeom prst="straightConnector1">
+            <a:avLst/>
+          </a:prstGeom>
+          <a:ln w="38100">
+            <a:tailEnd type="triangle"/>
+          </a:ln>
+        </p:spPr>
+        <p:style>
+          <a:lnRef idx="1">
+            <a:schemeClr val="accent1"/>
+          </a:lnRef>
+          <a:fillRef idx="0">
+            <a:schemeClr val="accent1"/>
+          </a:fillRef>
+          <a:effectRef idx="0">
+            <a:schemeClr val="accent1"/>
+          </a:effectRef>
+          <a:fontRef idx="minor">
+            <a:schemeClr val="tx1"/>
+          </a:fontRef>
+        </p:style>
+      </p:cxnSp>
+      <p:sp>
+        <p:nvSpPr>
+          <p:cNvPr id="41" name="Rectangle 40">
+            <a:extLst>
+              <a:ext uri="{FF2B5EF4-FFF2-40B4-BE49-F238E27FC236}">
+                <a16:creationId xmlns:a16="http://schemas.microsoft.com/office/drawing/2014/main" id="{0C53CCF7-9DEF-5A5C-C935-E0DC29EA5CAC}"/>
+              </a:ext>
+            </a:extLst>
+          </p:cNvPr>
+          <p:cNvSpPr/>
+          <p:nvPr/>
+        </p:nvSpPr>
+        <p:spPr>
+          <a:xfrm>
+            <a:off x="256648" y="5010793"/>
+            <a:ext cx="3040112" cy="740651"/>
+          </a:xfrm>
+          <a:prstGeom prst="rect">
+            <a:avLst/>
+          </a:prstGeom>
+          <a:solidFill>
+            <a:schemeClr val="accent6">
+              <a:lumMod val="20000"/>
+              <a:lumOff val="80000"/>
+            </a:schemeClr>
+          </a:solidFill>
+          <a:ln>
+            <a:noFill/>
+          </a:ln>
+        </p:spPr>
+        <p:style>
+          <a:lnRef idx="2">
+            <a:schemeClr val="accent1">
+              <a:shade val="15000"/>
+            </a:schemeClr>
+          </a:lnRef>
+          <a:fillRef idx="1">
+            <a:schemeClr val="accent1"/>
+          </a:fillRef>
+          <a:effectRef idx="0">
+            <a:schemeClr val="accent1"/>
+          </a:effectRef>
+          <a:fontRef idx="minor">
+            <a:schemeClr val="lt1"/>
+          </a:fontRef>
+        </p:style>
+        <p:txBody>
+          <a:bodyPr rtlCol="0" anchor="ctr"/>
+          <a:lstStyle/>
+          <a:p>
+            <a:pPr algn="ctr"/>
+            <a:r>
+              <a:rPr lang="en-US" sz="1400" dirty="0">
+                <a:solidFill>
+                  <a:schemeClr val="tx1"/>
+                </a:solidFill>
+              </a:rPr>
+              <a:t>These methods define </a:t>
+            </a:r>
+            <a:r>
+              <a:rPr lang="en-US" sz="1400" dirty="0" err="1">
+                <a:solidFill>
+                  <a:schemeClr val="tx1"/>
+                </a:solidFill>
+              </a:rPr>
+              <a:t>FxnBlock</a:t>
+            </a:r>
+            <a:r>
+              <a:rPr lang="en-US" sz="1400" dirty="0">
+                <a:solidFill>
+                  <a:schemeClr val="tx1"/>
+                </a:solidFill>
+              </a:rPr>
+              <a:t> </a:t>
+            </a:r>
+            <a:r>
+              <a:rPr lang="en-US" sz="1400" b="1" dirty="0">
+                <a:solidFill>
+                  <a:schemeClr val="tx1"/>
+                </a:solidFill>
+              </a:rPr>
+              <a:t>indicators</a:t>
+            </a:r>
+            <a:r>
+              <a:rPr lang="en-US" sz="1400" dirty="0">
+                <a:solidFill>
+                  <a:schemeClr val="tx1"/>
+                </a:solidFill>
+              </a:rPr>
+              <a:t> and are called/tracked during simulation (in </a:t>
+            </a:r>
+            <a:r>
+              <a:rPr lang="en-US" sz="1400" dirty="0" err="1">
+                <a:solidFill>
+                  <a:schemeClr val="tx1"/>
+                </a:solidFill>
+              </a:rPr>
+              <a:t>fxnname.i</a:t>
+            </a:r>
+            <a:r>
+              <a:rPr lang="en-US" sz="1400" dirty="0">
+                <a:solidFill>
+                  <a:schemeClr val="tx1"/>
+                </a:solidFill>
+              </a:rPr>
+              <a:t>)</a:t>
+            </a:r>
+          </a:p>
+        </p:txBody>
+      </p:sp>
+      <p:sp>
+        <p:nvSpPr>
+          <p:cNvPr id="42" name="Rectangle 41">
+            <a:extLst>
+              <a:ext uri="{FF2B5EF4-FFF2-40B4-BE49-F238E27FC236}">
+                <a16:creationId xmlns:a16="http://schemas.microsoft.com/office/drawing/2014/main" id="{8CDCE0CD-812F-C5E1-0CB4-58D9C56432A5}"/>
+              </a:ext>
+            </a:extLst>
+          </p:cNvPr>
+          <p:cNvSpPr/>
+          <p:nvPr/>
+        </p:nvSpPr>
+        <p:spPr>
+          <a:xfrm>
+            <a:off x="8480026" y="1572546"/>
+            <a:ext cx="3400689" cy="740658"/>
+          </a:xfrm>
+          <a:prstGeom prst="rect">
+            <a:avLst/>
+          </a:prstGeom>
+          <a:solidFill>
+            <a:schemeClr val="accent6">
+              <a:lumMod val="40000"/>
+              <a:lumOff val="60000"/>
+            </a:schemeClr>
+          </a:solidFill>
+          <a:ln>
+            <a:noFill/>
+          </a:ln>
+        </p:spPr>
+        <p:style>
+          <a:lnRef idx="2">
+            <a:schemeClr val="accent1">
+              <a:shade val="15000"/>
+            </a:schemeClr>
+          </a:lnRef>
+          <a:fillRef idx="1">
+            <a:schemeClr val="accent1"/>
+          </a:fillRef>
+          <a:effectRef idx="0">
+            <a:schemeClr val="accent1"/>
+          </a:effectRef>
+          <a:fontRef idx="minor">
+            <a:schemeClr val="lt1"/>
+          </a:fontRef>
+        </p:style>
+        <p:txBody>
+          <a:bodyPr rtlCol="0" anchor="ctr"/>
+          <a:lstStyle/>
+          <a:p>
+            <a:pPr algn="ctr"/>
+            <a:r>
+              <a:rPr lang="en-US" sz="1400" dirty="0">
+                <a:solidFill>
+                  <a:schemeClr val="tx1"/>
+                </a:solidFill>
+              </a:rPr>
+              <a:t>Default </a:t>
+            </a:r>
+            <a:r>
+              <a:rPr lang="en-US" sz="1400" b="1" dirty="0">
+                <a:solidFill>
+                  <a:schemeClr val="tx1"/>
+                </a:solidFill>
+              </a:rPr>
+              <a:t>keyword arguments for </a:t>
+            </a:r>
+            <a:r>
+              <a:rPr lang="en-US" sz="1400" b="1" dirty="0" err="1">
+                <a:solidFill>
+                  <a:schemeClr val="tx1"/>
+                </a:solidFill>
+              </a:rPr>
+              <a:t>SimParam</a:t>
+            </a:r>
+            <a:r>
+              <a:rPr lang="en-US" sz="1400" dirty="0">
+                <a:solidFill>
+                  <a:schemeClr val="tx1"/>
+                </a:solidFill>
+              </a:rPr>
+              <a:t>. Only necessary when the </a:t>
+            </a:r>
+            <a:r>
+              <a:rPr lang="en-US" sz="1400" dirty="0" err="1">
+                <a:solidFill>
+                  <a:schemeClr val="tx1"/>
+                </a:solidFill>
+              </a:rPr>
+              <a:t>functionblock</a:t>
+            </a:r>
+            <a:r>
+              <a:rPr lang="en-US" sz="1400" dirty="0">
+                <a:solidFill>
+                  <a:schemeClr val="tx1"/>
+                </a:solidFill>
+              </a:rPr>
+              <a:t> will be simulated individually.</a:t>
+            </a:r>
+          </a:p>
+        </p:txBody>
+      </p:sp>
+      <p:cxnSp>
+        <p:nvCxnSpPr>
+          <p:cNvPr id="44" name="Straight Arrow Connector 43">
+            <a:extLst>
+              <a:ext uri="{FF2B5EF4-FFF2-40B4-BE49-F238E27FC236}">
+                <a16:creationId xmlns:a16="http://schemas.microsoft.com/office/drawing/2014/main" id="{2F39350D-8555-F1AE-2F34-766C9EE33104}"/>
+              </a:ext>
+            </a:extLst>
+          </p:cNvPr>
+          <p:cNvCxnSpPr>
+            <a:cxnSpLocks/>
+          </p:cNvCxnSpPr>
+          <p:nvPr/>
+        </p:nvCxnSpPr>
+        <p:spPr>
+          <a:xfrm>
+            <a:off x="3300089" y="5435810"/>
+            <a:ext cx="538701" cy="0"/>
+          </a:xfrm>
+          <a:prstGeom prst="straightConnector1">
+            <a:avLst/>
+          </a:prstGeom>
+          <a:ln w="38100">
+            <a:solidFill>
+              <a:schemeClr val="accent6"/>
+            </a:solidFill>
+            <a:tailEnd type="triangle"/>
+          </a:ln>
+        </p:spPr>
+        <p:style>
+          <a:lnRef idx="1">
+            <a:schemeClr val="accent1"/>
+          </a:lnRef>
+          <a:fillRef idx="0">
+            <a:schemeClr val="accent1"/>
+          </a:fillRef>
+          <a:effectRef idx="0">
+            <a:schemeClr val="accent1"/>
+          </a:effectRef>
+          <a:fontRef idx="minor">
+            <a:schemeClr val="tx1"/>
+          </a:fontRef>
+        </p:style>
+      </p:cxnSp>
+      <p:sp>
+        <p:nvSpPr>
+          <p:cNvPr id="45" name="Rectangle 44">
+            <a:extLst>
+              <a:ext uri="{FF2B5EF4-FFF2-40B4-BE49-F238E27FC236}">
+                <a16:creationId xmlns:a16="http://schemas.microsoft.com/office/drawing/2014/main" id="{D45EAE9F-3FFE-CF4A-26AA-8D2A61746450}"/>
+              </a:ext>
+            </a:extLst>
+          </p:cNvPr>
+          <p:cNvSpPr/>
+          <p:nvPr/>
+        </p:nvSpPr>
+        <p:spPr>
+          <a:xfrm>
+            <a:off x="258934" y="5860828"/>
+            <a:ext cx="3038135" cy="665117"/>
+          </a:xfrm>
+          <a:prstGeom prst="rect">
+            <a:avLst/>
+          </a:prstGeom>
+          <a:solidFill>
+            <a:srgbClr val="F1D9F1"/>
+          </a:solidFill>
+          <a:ln>
+            <a:noFill/>
+          </a:ln>
+        </p:spPr>
+        <p:style>
+          <a:lnRef idx="2">
+            <a:schemeClr val="accent1">
+              <a:shade val="15000"/>
+            </a:schemeClr>
+          </a:lnRef>
+          <a:fillRef idx="1">
+            <a:schemeClr val="accent1"/>
+          </a:fillRef>
+          <a:effectRef idx="0">
+            <a:schemeClr val="accent1"/>
+          </a:effectRef>
+          <a:fontRef idx="minor">
+            <a:schemeClr val="lt1"/>
+          </a:fontRef>
+        </p:style>
+        <p:txBody>
+          <a:bodyPr rtlCol="0" anchor="ctr"/>
+          <a:lstStyle/>
+          <a:p>
+            <a:pPr algn="ctr"/>
+            <a:r>
+              <a:rPr lang="en-US" sz="1400" dirty="0">
+                <a:solidFill>
+                  <a:schemeClr val="tx1"/>
+                </a:solidFill>
+              </a:rPr>
+              <a:t>This method defines the Result to be returned </a:t>
+            </a:r>
+            <a:r>
+              <a:rPr lang="en-US" sz="1400" b="1" dirty="0">
+                <a:solidFill>
+                  <a:schemeClr val="tx1"/>
+                </a:solidFill>
+              </a:rPr>
+              <a:t>when simulated individually</a:t>
+            </a:r>
+          </a:p>
+        </p:txBody>
+      </p:sp>
+      <p:cxnSp>
+        <p:nvCxnSpPr>
+          <p:cNvPr id="47" name="Straight Arrow Connector 46">
+            <a:extLst>
+              <a:ext uri="{FF2B5EF4-FFF2-40B4-BE49-F238E27FC236}">
+                <a16:creationId xmlns:a16="http://schemas.microsoft.com/office/drawing/2014/main" id="{63F352AD-414C-473F-B963-608E7ABC775D}"/>
+              </a:ext>
+            </a:extLst>
+          </p:cNvPr>
+          <p:cNvCxnSpPr>
+            <a:cxnSpLocks/>
+          </p:cNvCxnSpPr>
+          <p:nvPr/>
+        </p:nvCxnSpPr>
+        <p:spPr>
+          <a:xfrm>
+            <a:off x="3317536" y="6209647"/>
+            <a:ext cx="538701" cy="0"/>
+          </a:xfrm>
+          <a:prstGeom prst="straightConnector1">
+            <a:avLst/>
+          </a:prstGeom>
+          <a:ln w="38100">
+            <a:solidFill>
+              <a:srgbClr val="E890E8"/>
+            </a:solidFill>
+            <a:tailEnd type="triangle"/>
+          </a:ln>
+        </p:spPr>
+        <p:style>
+          <a:lnRef idx="1">
+            <a:schemeClr val="accent1"/>
+          </a:lnRef>
+          <a:fillRef idx="0">
+            <a:schemeClr val="accent1"/>
+          </a:fillRef>
+          <a:effectRef idx="0">
+            <a:schemeClr val="accent1"/>
+          </a:effectRef>
+          <a:fontRef idx="minor">
+            <a:schemeClr val="tx1"/>
+          </a:fontRef>
+        </p:style>
+      </p:cxnSp>
+    </p:spTree>
+    <p:extLst>
+      <p:ext uri="{BB962C8B-B14F-4D97-AF65-F5344CB8AC3E}">
+        <p14:creationId xmlns:p14="http://schemas.microsoft.com/office/powerpoint/2010/main" val="3020370138"/>
+      </p:ext>
+    </p:extLst>
+  </p:cSld>
+  <p:clrMapOvr>
+    <a:masterClrMapping/>
+  </p:clrMapOvr>
+</p:sld>
+</file>
+
+<file path=ppt/slides/slide13.xml><?xml version="1.0" encoding="utf-8"?>
+<p:sld xmlns:a="http://schemas.openxmlformats.org/drawingml/2006/main" xmlns:r="http://schemas.openxmlformats.org/officeDocument/2006/relationships" xmlns:p="http://schemas.openxmlformats.org/presentationml/2006/main">
+  <p:cSld>
+    <p:spTree>
+      <p:nvGrpSpPr>
+        <p:cNvPr id="1" name=""/>
+        <p:cNvGrpSpPr/>
+        <p:nvPr/>
+      </p:nvGrpSpPr>
+      <p:grpSpPr>
+        <a:xfrm>
+          <a:off x="0" y="0"/>
+          <a:ext cx="0" cy="0"/>
+          <a:chOff x="0" y="0"/>
+          <a:chExt cx="0" cy="0"/>
+        </a:xfrm>
+      </p:grpSpPr>
+      <p:sp>
+        <p:nvSpPr>
+          <p:cNvPr id="46" name="Rectangle 45">
+            <a:extLst>
+              <a:ext uri="{FF2B5EF4-FFF2-40B4-BE49-F238E27FC236}">
+                <a16:creationId xmlns:a16="http://schemas.microsoft.com/office/drawing/2014/main" id="{72127004-8A7D-A358-ADEB-B3629DBFE527}"/>
+              </a:ext>
+            </a:extLst>
+          </p:cNvPr>
+          <p:cNvSpPr/>
+          <p:nvPr/>
+        </p:nvSpPr>
+        <p:spPr>
+          <a:xfrm>
+            <a:off x="3967376" y="5334029"/>
+            <a:ext cx="6392648" cy="623283"/>
+          </a:xfrm>
+          <a:prstGeom prst="rect">
+            <a:avLst/>
+          </a:prstGeom>
+          <a:solidFill>
+            <a:srgbClr val="F1D9F1"/>
+          </a:solidFill>
+          <a:ln>
+            <a:noFill/>
+          </a:ln>
+        </p:spPr>
+        <p:style>
+          <a:lnRef idx="2">
+            <a:schemeClr val="accent1">
+              <a:shade val="15000"/>
+            </a:schemeClr>
+          </a:lnRef>
+          <a:fillRef idx="1">
+            <a:schemeClr val="accent1"/>
+          </a:fillRef>
+          <a:effectRef idx="0">
+            <a:schemeClr val="accent1"/>
+          </a:effectRef>
+          <a:fontRef idx="minor">
+            <a:schemeClr val="lt1"/>
+          </a:fontRef>
+        </p:style>
+        <p:txBody>
+          <a:bodyPr rtlCol="0" anchor="ctr"/>
+          <a:lstStyle/>
+          <a:p>
+            <a:pPr algn="ctr"/>
+            <a:endParaRPr lang="en-US" sz="1400" b="1" dirty="0">
+              <a:solidFill>
+                <a:schemeClr val="tx1"/>
+              </a:solidFill>
+            </a:endParaRPr>
+          </a:p>
+        </p:txBody>
+      </p:sp>
+      <p:sp>
+        <p:nvSpPr>
+          <p:cNvPr id="12" name="Rectangle 11">
+            <a:extLst>
+              <a:ext uri="{FF2B5EF4-FFF2-40B4-BE49-F238E27FC236}">
+                <a16:creationId xmlns:a16="http://schemas.microsoft.com/office/drawing/2014/main" id="{E3774B39-3B4C-D81E-872A-828DD7656DFD}"/>
+              </a:ext>
+            </a:extLst>
+          </p:cNvPr>
+          <p:cNvSpPr/>
+          <p:nvPr/>
+        </p:nvSpPr>
+        <p:spPr>
+          <a:xfrm>
+            <a:off x="3926869" y="4157845"/>
+            <a:ext cx="6430023" cy="768917"/>
+          </a:xfrm>
+          <a:prstGeom prst="rect">
+            <a:avLst/>
+          </a:prstGeom>
+          <a:solidFill>
+            <a:schemeClr val="accent6">
+              <a:lumMod val="20000"/>
+              <a:lumOff val="80000"/>
+            </a:schemeClr>
+          </a:solidFill>
+          <a:ln>
+            <a:noFill/>
+          </a:ln>
+        </p:spPr>
+        <p:style>
+          <a:lnRef idx="2">
+            <a:schemeClr val="accent1">
+              <a:shade val="15000"/>
+            </a:schemeClr>
+          </a:lnRef>
+          <a:fillRef idx="1">
+            <a:schemeClr val="accent1"/>
+          </a:fillRef>
+          <a:effectRef idx="0">
+            <a:schemeClr val="accent1"/>
+          </a:effectRef>
+          <a:fontRef idx="minor">
+            <a:schemeClr val="lt1"/>
+          </a:fontRef>
+        </p:style>
+        <p:txBody>
+          <a:bodyPr rtlCol="0" anchor="ctr"/>
+          <a:lstStyle/>
+          <a:p>
+            <a:pPr algn="ctr"/>
+            <a:endParaRPr lang="en-US" sz="1400" dirty="0">
+              <a:solidFill>
+                <a:schemeClr val="tx1"/>
+              </a:solidFill>
+            </a:endParaRPr>
+          </a:p>
+        </p:txBody>
+      </p:sp>
+      <p:sp>
+        <p:nvSpPr>
+          <p:cNvPr id="16" name="Rectangle 15">
+            <a:extLst>
+              <a:ext uri="{FF2B5EF4-FFF2-40B4-BE49-F238E27FC236}">
+                <a16:creationId xmlns:a16="http://schemas.microsoft.com/office/drawing/2014/main" id="{72C539D4-1CBA-B5E5-2E88-785897940B49}"/>
+              </a:ext>
+            </a:extLst>
+          </p:cNvPr>
+          <p:cNvSpPr/>
+          <p:nvPr/>
+        </p:nvSpPr>
+        <p:spPr>
+          <a:xfrm>
+            <a:off x="3945360" y="2015578"/>
+            <a:ext cx="6753120" cy="1931608"/>
+          </a:xfrm>
+          <a:prstGeom prst="rect">
+            <a:avLst/>
+          </a:prstGeom>
+          <a:solidFill>
+            <a:schemeClr val="bg2">
+              <a:lumMod val="90000"/>
+            </a:schemeClr>
+          </a:solidFill>
+          <a:ln>
+            <a:noFill/>
+          </a:ln>
+        </p:spPr>
+        <p:style>
+          <a:lnRef idx="2">
+            <a:schemeClr val="accent1">
+              <a:shade val="15000"/>
+            </a:schemeClr>
+          </a:lnRef>
+          <a:fillRef idx="1">
+            <a:schemeClr val="accent1"/>
+          </a:fillRef>
+          <a:effectRef idx="0">
+            <a:schemeClr val="accent1"/>
+          </a:effectRef>
+          <a:fontRef idx="minor">
+            <a:schemeClr val="lt1"/>
+          </a:fontRef>
+        </p:style>
+        <p:txBody>
+          <a:bodyPr rtlCol="0" anchor="ctr"/>
+          <a:lstStyle/>
+          <a:p>
+            <a:pPr algn="ctr"/>
+            <a:endParaRPr lang="en-US"/>
+          </a:p>
+        </p:txBody>
+      </p:sp>
+      <p:sp>
+        <p:nvSpPr>
+          <p:cNvPr id="13" name="Rectangle 12">
+            <a:extLst>
+              <a:ext uri="{FF2B5EF4-FFF2-40B4-BE49-F238E27FC236}">
+                <a16:creationId xmlns:a16="http://schemas.microsoft.com/office/drawing/2014/main" id="{2CBCDC26-00E5-A3E1-F5B6-30FDC541BC9D}"/>
+              </a:ext>
+            </a:extLst>
+          </p:cNvPr>
+          <p:cNvSpPr/>
+          <p:nvPr/>
+        </p:nvSpPr>
+        <p:spPr>
+          <a:xfrm>
+            <a:off x="4158792" y="1765140"/>
+            <a:ext cx="2628088" cy="208826"/>
+          </a:xfrm>
+          <a:prstGeom prst="rect">
+            <a:avLst/>
+          </a:prstGeom>
+          <a:solidFill>
+            <a:schemeClr val="accent2">
+              <a:lumMod val="40000"/>
+              <a:lumOff val="60000"/>
+            </a:schemeClr>
+          </a:solidFill>
+          <a:ln>
+            <a:noFill/>
+          </a:ln>
+        </p:spPr>
+        <p:style>
+          <a:lnRef idx="2">
+            <a:schemeClr val="accent1">
+              <a:shade val="15000"/>
+            </a:schemeClr>
+          </a:lnRef>
+          <a:fillRef idx="1">
+            <a:schemeClr val="accent1"/>
+          </a:fillRef>
+          <a:effectRef idx="0">
+            <a:schemeClr val="accent1"/>
+          </a:effectRef>
+          <a:fontRef idx="minor">
+            <a:schemeClr val="lt1"/>
+          </a:fontRef>
+        </p:style>
+        <p:txBody>
+          <a:bodyPr rtlCol="0" anchor="ctr"/>
+          <a:lstStyle/>
+          <a:p>
+            <a:pPr algn="ctr"/>
+            <a:endParaRPr lang="en-US"/>
+          </a:p>
+        </p:txBody>
+      </p:sp>
+      <p:sp>
+        <p:nvSpPr>
+          <p:cNvPr id="8" name="Rectangle 7">
+            <a:extLst>
+              <a:ext uri="{FF2B5EF4-FFF2-40B4-BE49-F238E27FC236}">
+                <a16:creationId xmlns:a16="http://schemas.microsoft.com/office/drawing/2014/main" id="{1C026455-CAB0-7107-5E06-73B62BD22F6E}"/>
+              </a:ext>
+            </a:extLst>
+          </p:cNvPr>
+          <p:cNvSpPr/>
+          <p:nvPr/>
+        </p:nvSpPr>
+        <p:spPr>
+          <a:xfrm>
+            <a:off x="4158792" y="1480201"/>
+            <a:ext cx="3233595" cy="269288"/>
+          </a:xfrm>
+          <a:prstGeom prst="rect">
+            <a:avLst/>
+          </a:prstGeom>
+          <a:solidFill>
+            <a:schemeClr val="accent6">
+              <a:lumMod val="40000"/>
+              <a:lumOff val="60000"/>
+            </a:schemeClr>
+          </a:solidFill>
+          <a:ln>
+            <a:noFill/>
+          </a:ln>
+        </p:spPr>
+        <p:style>
+          <a:lnRef idx="2">
+            <a:schemeClr val="accent1">
+              <a:shade val="15000"/>
+            </a:schemeClr>
+          </a:lnRef>
+          <a:fillRef idx="1">
+            <a:schemeClr val="accent1"/>
+          </a:fillRef>
+          <a:effectRef idx="0">
+            <a:schemeClr val="accent1"/>
+          </a:effectRef>
+          <a:fontRef idx="minor">
+            <a:schemeClr val="lt1"/>
+          </a:fontRef>
+        </p:style>
+        <p:txBody>
+          <a:bodyPr rtlCol="0" anchor="ctr"/>
+          <a:lstStyle/>
+          <a:p>
+            <a:pPr algn="ctr"/>
+            <a:endParaRPr lang="en-US"/>
+          </a:p>
+        </p:txBody>
+      </p:sp>
+      <p:sp>
+        <p:nvSpPr>
+          <p:cNvPr id="7" name="Rectangle 6">
+            <a:extLst>
+              <a:ext uri="{FF2B5EF4-FFF2-40B4-BE49-F238E27FC236}">
+                <a16:creationId xmlns:a16="http://schemas.microsoft.com/office/drawing/2014/main" id="{790F2CA3-19A2-C7F6-C82D-20112C0EFFC8}"/>
+              </a:ext>
+            </a:extLst>
+          </p:cNvPr>
+          <p:cNvSpPr/>
+          <p:nvPr/>
+        </p:nvSpPr>
+        <p:spPr>
+          <a:xfrm>
+            <a:off x="4158792" y="1256969"/>
+            <a:ext cx="2177618" cy="190634"/>
+          </a:xfrm>
+          <a:prstGeom prst="rect">
+            <a:avLst/>
+          </a:prstGeom>
+          <a:solidFill>
+            <a:schemeClr val="accent1">
+              <a:lumMod val="40000"/>
+              <a:lumOff val="60000"/>
+            </a:schemeClr>
+          </a:solidFill>
+          <a:ln>
+            <a:noFill/>
+          </a:ln>
+        </p:spPr>
+        <p:style>
+          <a:lnRef idx="2">
+            <a:schemeClr val="accent1">
+              <a:shade val="15000"/>
+            </a:schemeClr>
+          </a:lnRef>
+          <a:fillRef idx="1">
+            <a:schemeClr val="accent1"/>
+          </a:fillRef>
+          <a:effectRef idx="0">
+            <a:schemeClr val="accent1"/>
+          </a:effectRef>
+          <a:fontRef idx="minor">
+            <a:schemeClr val="lt1"/>
+          </a:fontRef>
+        </p:style>
+        <p:txBody>
+          <a:bodyPr rtlCol="0" anchor="ctr"/>
+          <a:lstStyle/>
+          <a:p>
+            <a:pPr algn="ctr"/>
+            <a:endParaRPr lang="en-US"/>
+          </a:p>
+        </p:txBody>
+      </p:sp>
+      <p:sp>
+        <p:nvSpPr>
+          <p:cNvPr id="6" name="Rectangle 5">
+            <a:extLst>
+              <a:ext uri="{FF2B5EF4-FFF2-40B4-BE49-F238E27FC236}">
+                <a16:creationId xmlns:a16="http://schemas.microsoft.com/office/drawing/2014/main" id="{5D85A8FA-8E6E-79A7-59E0-7676B5C606A4}"/>
+              </a:ext>
+            </a:extLst>
+          </p:cNvPr>
+          <p:cNvSpPr/>
+          <p:nvPr/>
+        </p:nvSpPr>
+        <p:spPr>
+          <a:xfrm>
+            <a:off x="3945359" y="939165"/>
+            <a:ext cx="6826376" cy="5238115"/>
+          </a:xfrm>
+          <a:prstGeom prst="rect">
+            <a:avLst/>
+          </a:prstGeom>
+          <a:noFill/>
+          <a:ln w="28575">
+            <a:solidFill>
+              <a:schemeClr val="accent1"/>
+            </a:solidFill>
+          </a:ln>
+        </p:spPr>
+        <p:style>
+          <a:lnRef idx="2">
+            <a:schemeClr val="dk1"/>
+          </a:lnRef>
+          <a:fillRef idx="1">
+            <a:schemeClr val="lt1"/>
+          </a:fillRef>
+          <a:effectRef idx="0">
+            <a:schemeClr val="dk1"/>
+          </a:effectRef>
+          <a:fontRef idx="minor">
+            <a:schemeClr val="dk1"/>
+          </a:fontRef>
+        </p:style>
+        <p:txBody>
+          <a:bodyPr rtlCol="0" anchor="t"/>
+          <a:lstStyle/>
+          <a:p>
+            <a:r>
+              <a:rPr lang="en-US" sz="1600" dirty="0"/>
+              <a:t>class </a:t>
+            </a:r>
+            <a:r>
+              <a:rPr lang="en-US" sz="1600" dirty="0" err="1"/>
+              <a:t>ModelName</a:t>
+            </a:r>
+            <a:r>
+              <a:rPr lang="en-US" sz="1600" dirty="0"/>
+              <a:t>(Model):</a:t>
+            </a:r>
+          </a:p>
+          <a:p>
+            <a:r>
+              <a:rPr lang="en-US" sz="1600" dirty="0"/>
+              <a:t>    _</a:t>
+            </a:r>
+            <a:r>
+              <a:rPr lang="en-US" sz="1600" dirty="0" err="1"/>
+              <a:t>init_p</a:t>
+            </a:r>
+            <a:r>
+              <a:rPr lang="en-US" sz="1600" dirty="0"/>
+              <a:t>= </a:t>
+            </a:r>
+            <a:r>
+              <a:rPr lang="en-US" sz="1600" dirty="0" err="1"/>
+              <a:t>ModelParam</a:t>
+            </a:r>
+            <a:endParaRPr lang="en-US" sz="1600" dirty="0"/>
+          </a:p>
+          <a:p>
+            <a:r>
+              <a:rPr lang="en-US" sz="1600" dirty="0"/>
+              <a:t>    </a:t>
+            </a:r>
+            <a:r>
+              <a:rPr lang="en-US" sz="1600" dirty="0" err="1"/>
+              <a:t>default_sp</a:t>
+            </a:r>
+            <a:r>
+              <a:rPr lang="en-US" sz="1600" dirty="0"/>
+              <a:t> = {‘times’:</a:t>
+            </a:r>
+            <a:r>
+              <a:rPr lang="en-US" sz="1600" dirty="0">
+                <a:sym typeface="Wingdings" panose="05000000000000000000" pitchFamily="2" charset="2"/>
+              </a:rPr>
+              <a:t>(0,100)</a:t>
+            </a:r>
+            <a:r>
+              <a:rPr lang="en-US" sz="1600" dirty="0"/>
+              <a:t>}</a:t>
+            </a:r>
+          </a:p>
+          <a:p>
+            <a:r>
+              <a:rPr lang="en-US" sz="1600" dirty="0"/>
+              <a:t>    </a:t>
+            </a:r>
+            <a:r>
+              <a:rPr lang="en-US" sz="1600" dirty="0" err="1"/>
+              <a:t>default_track</a:t>
+            </a:r>
+            <a:r>
+              <a:rPr lang="en-US" sz="1600" dirty="0"/>
+              <a:t> = [“</a:t>
+            </a:r>
+            <a:r>
+              <a:rPr lang="en-US" sz="1600" dirty="0" err="1"/>
+              <a:t>fxns</a:t>
+            </a:r>
+            <a:r>
+              <a:rPr lang="en-US" sz="1600" dirty="0"/>
+              <a:t>”, “flows]</a:t>
+            </a:r>
+          </a:p>
+          <a:p>
+            <a:r>
+              <a:rPr lang="en-US" sz="1600" dirty="0"/>
+              <a:t>    </a:t>
+            </a:r>
+          </a:p>
+          <a:p>
+            <a:r>
+              <a:rPr lang="en-US" sz="1600" dirty="0"/>
+              <a:t>    def __</a:t>
+            </a:r>
+            <a:r>
+              <a:rPr lang="en-US" sz="1600" dirty="0" err="1"/>
+              <a:t>init</a:t>
+            </a:r>
+            <a:r>
+              <a:rPr lang="en-US" sz="1600" dirty="0"/>
+              <a:t>__(self, **</a:t>
+            </a:r>
+            <a:r>
+              <a:rPr lang="en-US" sz="1600" dirty="0" err="1"/>
+              <a:t>kwargs</a:t>
+            </a:r>
+            <a:r>
+              <a:rPr lang="en-US" sz="1600" dirty="0"/>
+              <a:t>):</a:t>
+            </a:r>
+          </a:p>
+          <a:p>
+            <a:r>
+              <a:rPr lang="en-US" sz="1600" dirty="0"/>
+              <a:t>        super().__</a:t>
+            </a:r>
+            <a:r>
+              <a:rPr lang="en-US" sz="1600" dirty="0" err="1"/>
+              <a:t>init</a:t>
+            </a:r>
+            <a:r>
+              <a:rPr lang="en-US" sz="1600" dirty="0"/>
+              <a:t>__(name, flows, **</a:t>
+            </a:r>
+            <a:r>
+              <a:rPr lang="en-US" sz="1600" dirty="0" err="1"/>
+              <a:t>kwargs</a:t>
+            </a:r>
+            <a:r>
+              <a:rPr lang="en-US" sz="1600" dirty="0"/>
+              <a:t>)</a:t>
+            </a:r>
+          </a:p>
+          <a:p>
+            <a:r>
+              <a:rPr lang="en-US" sz="1600" dirty="0"/>
+              <a:t>        </a:t>
+            </a:r>
+            <a:r>
+              <a:rPr lang="en-US" sz="1600" dirty="0" err="1"/>
+              <a:t>self.add_flow</a:t>
+            </a:r>
+            <a:r>
+              <a:rPr lang="en-US" sz="1600" dirty="0"/>
+              <a:t>(“</a:t>
+            </a:r>
+            <a:r>
+              <a:rPr lang="en-US" sz="1600" dirty="0" err="1"/>
+              <a:t>flowname</a:t>
+            </a:r>
+            <a:r>
+              <a:rPr lang="en-US" sz="1600" dirty="0"/>
+              <a:t>”, </a:t>
+            </a:r>
+            <a:r>
+              <a:rPr lang="en-US" sz="1600" dirty="0" err="1"/>
+              <a:t>FlowClass</a:t>
+            </a:r>
+            <a:r>
+              <a:rPr lang="en-US" sz="1600" dirty="0"/>
+              <a:t>)</a:t>
+            </a:r>
+          </a:p>
+          <a:p>
+            <a:r>
+              <a:rPr lang="en-US" sz="1600" dirty="0"/>
+              <a:t>        …</a:t>
+            </a:r>
+          </a:p>
+          <a:p>
+            <a:r>
+              <a:rPr lang="en-US" sz="1600" dirty="0"/>
+              <a:t>        </a:t>
+            </a:r>
+            <a:r>
+              <a:rPr lang="en-US" sz="1600" dirty="0" err="1"/>
+              <a:t>self.add_fxn</a:t>
+            </a:r>
+            <a:r>
+              <a:rPr lang="en-US" sz="1600" dirty="0"/>
+              <a:t>(“</a:t>
+            </a:r>
+            <a:r>
+              <a:rPr lang="en-US" sz="1600" dirty="0" err="1"/>
+              <a:t>functionname</a:t>
+            </a:r>
+            <a:r>
+              <a:rPr lang="en-US" sz="1600" dirty="0"/>
+              <a:t>”, </a:t>
+            </a:r>
+            <a:r>
+              <a:rPr lang="en-US" sz="1600" dirty="0" err="1"/>
+              <a:t>FunctionClass</a:t>
+            </a:r>
+            <a:r>
+              <a:rPr lang="en-US" sz="1600" dirty="0"/>
+              <a:t>, “flowname1”, “flowname2”)</a:t>
+            </a:r>
+          </a:p>
+          <a:p>
+            <a:r>
+              <a:rPr lang="en-US" sz="1600" dirty="0"/>
+              <a:t>        …</a:t>
+            </a:r>
+          </a:p>
+          <a:p>
+            <a:r>
+              <a:rPr lang="en-US" sz="1600" dirty="0"/>
+              <a:t>         </a:t>
+            </a:r>
+            <a:r>
+              <a:rPr lang="en-US" sz="1600" dirty="0" err="1"/>
+              <a:t>self.build</a:t>
+            </a:r>
+            <a:r>
+              <a:rPr lang="en-US" sz="1600" dirty="0"/>
+              <a:t>()</a:t>
+            </a:r>
+          </a:p>
+          <a:p>
+            <a:endParaRPr lang="en-US" sz="1600" dirty="0"/>
+          </a:p>
+          <a:p>
+            <a:r>
+              <a:rPr lang="en-US" sz="1600" dirty="0"/>
+              <a:t>def </a:t>
+            </a:r>
+            <a:r>
+              <a:rPr lang="en-US" sz="1600" dirty="0" err="1"/>
+              <a:t>indicate_XXX</a:t>
+            </a:r>
+            <a:r>
+              <a:rPr lang="en-US" sz="1600" dirty="0"/>
+              <a:t>(self, time):</a:t>
+            </a:r>
+          </a:p>
+          <a:p>
+            <a:r>
+              <a:rPr lang="en-US" sz="1600" dirty="0"/>
+              <a:t>        </a:t>
+            </a:r>
+            <a:r>
+              <a:rPr lang="en-US" sz="1600" dirty="0">
+                <a:highlight>
+                  <a:srgbClr val="00FF00"/>
+                </a:highlight>
+              </a:rPr>
+              <a:t>Conditional statement </a:t>
+            </a:r>
+          </a:p>
+          <a:p>
+            <a:r>
+              <a:rPr lang="en-US" sz="1600" dirty="0"/>
+              <a:t>        </a:t>
+            </a:r>
+            <a:r>
+              <a:rPr lang="en-US" sz="1600" dirty="0">
+                <a:highlight>
+                  <a:srgbClr val="00FF00"/>
+                </a:highlight>
+              </a:rPr>
+              <a:t>(e.g., </a:t>
+            </a:r>
+            <a:r>
+              <a:rPr lang="en-US" sz="1600" dirty="0" err="1">
+                <a:highlight>
+                  <a:srgbClr val="00FF00"/>
+                </a:highlight>
+              </a:rPr>
+              <a:t>self.fxns</a:t>
+            </a:r>
+            <a:r>
+              <a:rPr lang="en-US" sz="1600" dirty="0">
+                <a:highlight>
+                  <a:srgbClr val="00FF00"/>
+                </a:highlight>
+              </a:rPr>
+              <a:t>[“</a:t>
+            </a:r>
+            <a:r>
+              <a:rPr lang="en-US" sz="1600" dirty="0" err="1">
+                <a:highlight>
+                  <a:srgbClr val="00FF00"/>
+                </a:highlight>
+              </a:rPr>
+              <a:t>functionname</a:t>
+            </a:r>
+            <a:r>
+              <a:rPr lang="en-US" sz="1600" dirty="0">
+                <a:highlight>
+                  <a:srgbClr val="00FF00"/>
+                </a:highlight>
+              </a:rPr>
+              <a:t>”].</a:t>
+            </a:r>
+            <a:r>
+              <a:rPr lang="en-US" sz="1600" dirty="0" err="1">
+                <a:highlight>
+                  <a:srgbClr val="00FF00"/>
+                </a:highlight>
+              </a:rPr>
+              <a:t>s.state</a:t>
+            </a:r>
+            <a:r>
+              <a:rPr lang="en-US" sz="1600" dirty="0">
+                <a:highlight>
+                  <a:srgbClr val="00FF00"/>
+                </a:highlight>
+              </a:rPr>
+              <a:t>&gt;threshold)</a:t>
+            </a:r>
+          </a:p>
+          <a:p>
+            <a:r>
+              <a:rPr lang="en-US" sz="1600" dirty="0">
+                <a:highlight>
+                  <a:srgbClr val="00FF00"/>
+                </a:highlight>
+              </a:rPr>
+              <a:t> which is logged in the history and may be used to terminate simulations</a:t>
+            </a:r>
+          </a:p>
+          <a:p>
+            <a:r>
+              <a:rPr lang="en-US" sz="1600" dirty="0"/>
+              <a:t>    </a:t>
+            </a:r>
+          </a:p>
+          <a:p>
+            <a:r>
+              <a:rPr lang="en-US" sz="1600" dirty="0"/>
+              <a:t>def </a:t>
+            </a:r>
+            <a:r>
+              <a:rPr lang="en-US" sz="1600" dirty="0" err="1"/>
+              <a:t>find_classification</a:t>
+            </a:r>
+            <a:r>
+              <a:rPr lang="en-US" sz="1600" dirty="0"/>
+              <a:t>(self, time):</a:t>
+            </a:r>
+          </a:p>
+          <a:p>
+            <a:r>
+              <a:rPr lang="en-US" sz="1600" dirty="0">
+                <a:highlight>
+                  <a:srgbClr val="E997E9"/>
+                </a:highlight>
+              </a:rPr>
+              <a:t>        Returns a Result dictionary (calculated at completion)</a:t>
+            </a:r>
+          </a:p>
+        </p:txBody>
+      </p:sp>
+      <p:sp>
+        <p:nvSpPr>
+          <p:cNvPr id="10" name="Rectangle 9">
+            <a:extLst>
+              <a:ext uri="{FF2B5EF4-FFF2-40B4-BE49-F238E27FC236}">
+                <a16:creationId xmlns:a16="http://schemas.microsoft.com/office/drawing/2014/main" id="{FF99E59A-7941-6350-EE6B-CB334F86800C}"/>
+              </a:ext>
+            </a:extLst>
+          </p:cNvPr>
+          <p:cNvSpPr/>
+          <p:nvPr/>
+        </p:nvSpPr>
+        <p:spPr>
+          <a:xfrm>
+            <a:off x="7917287" y="1646681"/>
+            <a:ext cx="4076593" cy="940685"/>
+          </a:xfrm>
+          <a:prstGeom prst="rect">
+            <a:avLst/>
+          </a:prstGeom>
+          <a:solidFill>
+            <a:schemeClr val="accent2">
+              <a:lumMod val="40000"/>
+              <a:lumOff val="60000"/>
+            </a:schemeClr>
+          </a:solidFill>
+          <a:ln>
+            <a:noFill/>
+          </a:ln>
+        </p:spPr>
+        <p:style>
+          <a:lnRef idx="2">
+            <a:schemeClr val="accent1">
+              <a:shade val="15000"/>
+            </a:schemeClr>
+          </a:lnRef>
+          <a:fillRef idx="1">
+            <a:schemeClr val="accent1"/>
+          </a:fillRef>
+          <a:effectRef idx="0">
+            <a:schemeClr val="accent1"/>
+          </a:effectRef>
+          <a:fontRef idx="minor">
+            <a:schemeClr val="lt1"/>
+          </a:fontRef>
+        </p:style>
+        <p:txBody>
+          <a:bodyPr rtlCol="0" anchor="ctr"/>
+          <a:lstStyle/>
+          <a:p>
+            <a:pPr algn="ctr"/>
+            <a:r>
+              <a:rPr lang="en-US" sz="1400" dirty="0">
+                <a:solidFill>
+                  <a:schemeClr val="tx1"/>
+                </a:solidFill>
+              </a:rPr>
+              <a:t>Specifies </a:t>
+            </a:r>
+            <a:r>
+              <a:rPr lang="en-US" sz="1400" b="1" dirty="0">
+                <a:solidFill>
+                  <a:schemeClr val="tx1"/>
+                </a:solidFill>
+              </a:rPr>
+              <a:t>what should be tracked</a:t>
+            </a:r>
+            <a:r>
+              <a:rPr lang="en-US" sz="1400" dirty="0">
+                <a:solidFill>
+                  <a:schemeClr val="tx1"/>
+                </a:solidFill>
+              </a:rPr>
+              <a:t> in the Model history by default. May be a </a:t>
+            </a:r>
+            <a:r>
+              <a:rPr lang="en-US" sz="1400" dirty="0" err="1">
+                <a:solidFill>
+                  <a:schemeClr val="tx1"/>
+                </a:solidFill>
+              </a:rPr>
+              <a:t>dict</a:t>
+            </a:r>
+            <a:r>
+              <a:rPr lang="en-US" sz="1400" dirty="0">
+                <a:solidFill>
+                  <a:schemeClr val="tx1"/>
+                </a:solidFill>
+              </a:rPr>
+              <a:t> ({</a:t>
+            </a:r>
+            <a:r>
+              <a:rPr lang="en-US" sz="1400" dirty="0" err="1">
+                <a:solidFill>
+                  <a:schemeClr val="tx1"/>
+                </a:solidFill>
+              </a:rPr>
+              <a:t>role:value</a:t>
+            </a:r>
+            <a:r>
+              <a:rPr lang="en-US" sz="1400" dirty="0">
+                <a:solidFill>
+                  <a:schemeClr val="tx1"/>
+                </a:solidFill>
+              </a:rPr>
+              <a:t>}), list ([role1, role2]), or string (“</a:t>
+            </a:r>
+            <a:r>
+              <a:rPr lang="en-US" sz="1400" dirty="0" err="1">
+                <a:solidFill>
+                  <a:schemeClr val="tx1"/>
+                </a:solidFill>
+              </a:rPr>
+              <a:t>all”,”none</a:t>
+            </a:r>
+            <a:r>
+              <a:rPr lang="en-US" sz="1400" dirty="0">
+                <a:solidFill>
+                  <a:schemeClr val="tx1"/>
+                </a:solidFill>
+              </a:rPr>
+              <a:t>”, </a:t>
+            </a:r>
+            <a:r>
+              <a:rPr lang="en-US" sz="1400" dirty="0" err="1">
+                <a:solidFill>
+                  <a:schemeClr val="tx1"/>
+                </a:solidFill>
+              </a:rPr>
+              <a:t>etc</a:t>
+            </a:r>
+            <a:r>
+              <a:rPr lang="en-US" sz="1400" dirty="0">
+                <a:solidFill>
+                  <a:schemeClr val="tx1"/>
+                </a:solidFill>
+              </a:rPr>
+              <a:t>). Overwritten by the track option in propagate. </a:t>
+            </a:r>
+          </a:p>
+        </p:txBody>
+      </p:sp>
+      <p:sp>
+        <p:nvSpPr>
+          <p:cNvPr id="14" name="Rectangle 13">
+            <a:extLst>
+              <a:ext uri="{FF2B5EF4-FFF2-40B4-BE49-F238E27FC236}">
+                <a16:creationId xmlns:a16="http://schemas.microsoft.com/office/drawing/2014/main" id="{0D391646-A2EB-6DB7-673E-EBCE48A81170}"/>
+              </a:ext>
+            </a:extLst>
+          </p:cNvPr>
+          <p:cNvSpPr/>
+          <p:nvPr/>
+        </p:nvSpPr>
+        <p:spPr>
+          <a:xfrm>
+            <a:off x="7391562" y="1200510"/>
+            <a:ext cx="4602318" cy="488526"/>
+          </a:xfrm>
+          <a:prstGeom prst="rect">
+            <a:avLst/>
+          </a:prstGeom>
+          <a:solidFill>
+            <a:schemeClr val="accent1">
+              <a:lumMod val="40000"/>
+              <a:lumOff val="60000"/>
+            </a:schemeClr>
+          </a:solidFill>
+          <a:ln>
+            <a:noFill/>
+          </a:ln>
+        </p:spPr>
+        <p:style>
+          <a:lnRef idx="2">
+            <a:schemeClr val="accent1">
+              <a:shade val="15000"/>
+            </a:schemeClr>
+          </a:lnRef>
+          <a:fillRef idx="1">
+            <a:schemeClr val="accent1"/>
+          </a:fillRef>
+          <a:effectRef idx="0">
+            <a:schemeClr val="accent1"/>
+          </a:effectRef>
+          <a:fontRef idx="minor">
+            <a:schemeClr val="lt1"/>
+          </a:fontRef>
+        </p:style>
+        <p:txBody>
+          <a:bodyPr rtlCol="0" anchor="ctr"/>
+          <a:lstStyle/>
+          <a:p>
+            <a:pPr algn="ctr"/>
+            <a:r>
+              <a:rPr lang="en-US" sz="1400" dirty="0">
+                <a:solidFill>
+                  <a:schemeClr val="tx1"/>
+                </a:solidFill>
+              </a:rPr>
+              <a:t>Points to a Parameter representing immutable model characteristics instantiated at the start of the simulation</a:t>
+            </a:r>
+          </a:p>
+        </p:txBody>
+      </p:sp>
+      <p:sp>
+        <p:nvSpPr>
+          <p:cNvPr id="15" name="Rectangle 14">
+            <a:extLst>
+              <a:ext uri="{FF2B5EF4-FFF2-40B4-BE49-F238E27FC236}">
+                <a16:creationId xmlns:a16="http://schemas.microsoft.com/office/drawing/2014/main" id="{1F890D35-88DD-C827-1F33-F89FED5D13D0}"/>
+              </a:ext>
+            </a:extLst>
+          </p:cNvPr>
+          <p:cNvSpPr/>
+          <p:nvPr/>
+        </p:nvSpPr>
+        <p:spPr>
+          <a:xfrm>
+            <a:off x="206463" y="2024202"/>
+            <a:ext cx="3505864" cy="1905197"/>
+          </a:xfrm>
+          <a:prstGeom prst="rect">
+            <a:avLst/>
+          </a:prstGeom>
+          <a:solidFill>
+            <a:schemeClr val="bg2">
+              <a:lumMod val="90000"/>
+            </a:schemeClr>
+          </a:solidFill>
+          <a:ln>
+            <a:noFill/>
+          </a:ln>
+        </p:spPr>
+        <p:style>
+          <a:lnRef idx="2">
+            <a:schemeClr val="accent1">
+              <a:shade val="15000"/>
+            </a:schemeClr>
+          </a:lnRef>
+          <a:fillRef idx="1">
+            <a:schemeClr val="accent1"/>
+          </a:fillRef>
+          <a:effectRef idx="0">
+            <a:schemeClr val="accent1"/>
+          </a:effectRef>
+          <a:fontRef idx="minor">
+            <a:schemeClr val="lt1"/>
+          </a:fontRef>
+        </p:style>
+        <p:txBody>
+          <a:bodyPr rtlCol="0" anchor="ctr"/>
+          <a:lstStyle/>
+          <a:p>
+            <a:pPr algn="ctr"/>
+            <a:r>
+              <a:rPr lang="en-US" sz="1400" dirty="0">
+                <a:solidFill>
+                  <a:schemeClr val="tx1"/>
+                </a:solidFill>
+              </a:rPr>
+              <a:t>Method to </a:t>
+            </a:r>
+            <a:r>
+              <a:rPr lang="en-US" sz="1400" b="1" dirty="0">
+                <a:solidFill>
+                  <a:schemeClr val="tx1"/>
+                </a:solidFill>
+              </a:rPr>
+              <a:t>instantiate the model and define its structure:</a:t>
+            </a:r>
+            <a:r>
+              <a:rPr lang="en-US" sz="1400" dirty="0">
+                <a:solidFill>
+                  <a:schemeClr val="tx1"/>
+                </a:solidFill>
+              </a:rPr>
+              <a:t>,</a:t>
+            </a:r>
+          </a:p>
+          <a:p>
+            <a:pPr marL="285750" indent="-285750">
+              <a:buFontTx/>
+              <a:buChar char="-"/>
+            </a:pPr>
+            <a:r>
+              <a:rPr lang="en-US" sz="1400" b="1" dirty="0">
+                <a:solidFill>
+                  <a:schemeClr val="tx1"/>
+                </a:solidFill>
+              </a:rPr>
+              <a:t>super().__</a:t>
+            </a:r>
+            <a:r>
+              <a:rPr lang="en-US" sz="1400" b="1" dirty="0" err="1">
+                <a:solidFill>
+                  <a:schemeClr val="tx1"/>
+                </a:solidFill>
+              </a:rPr>
+              <a:t>init</a:t>
+            </a:r>
+            <a:r>
+              <a:rPr lang="en-US" sz="1400" b="1" dirty="0">
+                <a:solidFill>
+                  <a:schemeClr val="tx1"/>
+                </a:solidFill>
+              </a:rPr>
+              <a:t>__() </a:t>
+            </a:r>
+            <a:r>
+              <a:rPr lang="en-US" sz="1400" dirty="0">
+                <a:solidFill>
+                  <a:schemeClr val="tx1"/>
+                </a:solidFill>
+              </a:rPr>
+              <a:t>instantiates roles</a:t>
+            </a:r>
+          </a:p>
+          <a:p>
+            <a:pPr marL="285750" indent="-285750">
+              <a:buFontTx/>
+              <a:buChar char="-"/>
+            </a:pPr>
+            <a:r>
+              <a:rPr lang="en-US" sz="1400" b="1" dirty="0">
+                <a:solidFill>
+                  <a:schemeClr val="tx1"/>
+                </a:solidFill>
+              </a:rPr>
+              <a:t>.</a:t>
+            </a:r>
+            <a:r>
+              <a:rPr lang="en-US" sz="1400" b="1" dirty="0" err="1">
+                <a:solidFill>
+                  <a:schemeClr val="tx1"/>
+                </a:solidFill>
+              </a:rPr>
+              <a:t>add_flow</a:t>
+            </a:r>
+            <a:r>
+              <a:rPr lang="en-US" sz="1400" b="1" dirty="0">
+                <a:solidFill>
+                  <a:schemeClr val="tx1"/>
+                </a:solidFill>
+              </a:rPr>
+              <a:t> </a:t>
+            </a:r>
+            <a:r>
+              <a:rPr lang="en-US" sz="1400" dirty="0">
+                <a:solidFill>
+                  <a:schemeClr val="tx1"/>
+                </a:solidFill>
+              </a:rPr>
+              <a:t>is used to instantiate a flow</a:t>
+            </a:r>
+          </a:p>
+          <a:p>
+            <a:pPr marL="285750" indent="-285750">
+              <a:buFontTx/>
+              <a:buChar char="-"/>
+            </a:pPr>
+            <a:r>
+              <a:rPr lang="en-US" sz="1400" dirty="0">
+                <a:solidFill>
+                  <a:schemeClr val="tx1"/>
+                </a:solidFill>
+              </a:rPr>
+              <a:t>.</a:t>
+            </a:r>
+            <a:r>
+              <a:rPr lang="en-US" sz="1400" b="1" dirty="0" err="1">
+                <a:solidFill>
+                  <a:schemeClr val="tx1"/>
+                </a:solidFill>
+              </a:rPr>
+              <a:t>add_fxn</a:t>
+            </a:r>
+            <a:r>
+              <a:rPr lang="en-US" sz="1400" b="1" dirty="0">
+                <a:solidFill>
+                  <a:schemeClr val="tx1"/>
+                </a:solidFill>
+              </a:rPr>
+              <a:t> </a:t>
+            </a:r>
+            <a:r>
+              <a:rPr lang="en-US" sz="1400" dirty="0">
+                <a:solidFill>
+                  <a:schemeClr val="tx1"/>
+                </a:solidFill>
+              </a:rPr>
+              <a:t>is used to instantiate a function and attach connected flows</a:t>
+            </a:r>
+          </a:p>
+          <a:p>
+            <a:pPr marL="285750" indent="-285750">
+              <a:buFontTx/>
+              <a:buChar char="-"/>
+            </a:pPr>
+            <a:r>
+              <a:rPr lang="en-US" sz="1400" b="1" dirty="0">
+                <a:solidFill>
+                  <a:schemeClr val="tx1"/>
+                </a:solidFill>
+              </a:rPr>
+              <a:t>.build() </a:t>
+            </a:r>
+            <a:r>
+              <a:rPr lang="en-US" sz="1400" dirty="0">
+                <a:solidFill>
+                  <a:schemeClr val="tx1"/>
+                </a:solidFill>
+              </a:rPr>
+              <a:t>creates the underlying graph structure</a:t>
+            </a:r>
+          </a:p>
+        </p:txBody>
+      </p:sp>
+      <p:cxnSp>
+        <p:nvCxnSpPr>
+          <p:cNvPr id="18" name="Straight Arrow Connector 17">
+            <a:extLst>
+              <a:ext uri="{FF2B5EF4-FFF2-40B4-BE49-F238E27FC236}">
+                <a16:creationId xmlns:a16="http://schemas.microsoft.com/office/drawing/2014/main" id="{C412D98A-A8CB-E5EE-CD28-4B2D28CA3DD0}"/>
+              </a:ext>
+            </a:extLst>
+          </p:cNvPr>
+          <p:cNvCxnSpPr>
+            <a:cxnSpLocks/>
+          </p:cNvCxnSpPr>
+          <p:nvPr/>
+        </p:nvCxnSpPr>
+        <p:spPr>
+          <a:xfrm flipH="1">
+            <a:off x="6268718" y="1391515"/>
+            <a:ext cx="1122842" cy="0"/>
+          </a:xfrm>
+          <a:prstGeom prst="straightConnector1">
+            <a:avLst/>
+          </a:prstGeom>
+          <a:ln w="38100">
+            <a:tailEnd type="triangle"/>
+          </a:ln>
+        </p:spPr>
+        <p:style>
+          <a:lnRef idx="1">
+            <a:schemeClr val="accent1"/>
+          </a:lnRef>
+          <a:fillRef idx="0">
+            <a:schemeClr val="accent1"/>
+          </a:fillRef>
+          <a:effectRef idx="0">
+            <a:schemeClr val="accent1"/>
+          </a:effectRef>
+          <a:fontRef idx="minor">
+            <a:schemeClr val="tx1"/>
+          </a:fontRef>
+        </p:style>
+      </p:cxnSp>
+      <p:cxnSp>
+        <p:nvCxnSpPr>
+          <p:cNvPr id="25" name="Straight Arrow Connector 24">
+            <a:extLst>
+              <a:ext uri="{FF2B5EF4-FFF2-40B4-BE49-F238E27FC236}">
+                <a16:creationId xmlns:a16="http://schemas.microsoft.com/office/drawing/2014/main" id="{331E180F-8F33-EF2F-BF23-D21BBB7BD54A}"/>
+              </a:ext>
+            </a:extLst>
+          </p:cNvPr>
+          <p:cNvCxnSpPr>
+            <a:cxnSpLocks/>
+          </p:cNvCxnSpPr>
+          <p:nvPr/>
+        </p:nvCxnSpPr>
+        <p:spPr>
+          <a:xfrm>
+            <a:off x="6868160" y="1865950"/>
+            <a:ext cx="1049127" cy="0"/>
+          </a:xfrm>
+          <a:prstGeom prst="straightConnector1">
+            <a:avLst/>
+          </a:prstGeom>
+          <a:ln w="38100">
+            <a:solidFill>
+              <a:schemeClr val="accent2">
+                <a:lumMod val="75000"/>
+              </a:schemeClr>
+            </a:solidFill>
+            <a:tailEnd type="triangle"/>
+          </a:ln>
+        </p:spPr>
+        <p:style>
+          <a:lnRef idx="1">
+            <a:schemeClr val="accent1"/>
+          </a:lnRef>
+          <a:fillRef idx="0">
+            <a:schemeClr val="accent1"/>
+          </a:fillRef>
+          <a:effectRef idx="0">
+            <a:schemeClr val="accent1"/>
+          </a:effectRef>
+          <a:fontRef idx="minor">
+            <a:schemeClr val="tx1"/>
+          </a:fontRef>
+        </p:style>
+      </p:cxnSp>
+      <p:cxnSp>
+        <p:nvCxnSpPr>
+          <p:cNvPr id="30" name="Straight Arrow Connector 29">
+            <a:extLst>
+              <a:ext uri="{FF2B5EF4-FFF2-40B4-BE49-F238E27FC236}">
+                <a16:creationId xmlns:a16="http://schemas.microsoft.com/office/drawing/2014/main" id="{EA0BCC97-D1D8-DF39-176F-86523512AC28}"/>
+              </a:ext>
+            </a:extLst>
+          </p:cNvPr>
+          <p:cNvCxnSpPr>
+            <a:cxnSpLocks/>
+          </p:cNvCxnSpPr>
+          <p:nvPr/>
+        </p:nvCxnSpPr>
+        <p:spPr>
+          <a:xfrm>
+            <a:off x="3232338" y="1588244"/>
+            <a:ext cx="887340" cy="2318"/>
+          </a:xfrm>
+          <a:prstGeom prst="straightConnector1">
+            <a:avLst/>
+          </a:prstGeom>
+          <a:ln w="38100">
+            <a:solidFill>
+              <a:schemeClr val="accent6"/>
+            </a:solidFill>
+            <a:tailEnd type="triangle"/>
+          </a:ln>
+        </p:spPr>
+        <p:style>
+          <a:lnRef idx="1">
+            <a:schemeClr val="accent1"/>
+          </a:lnRef>
+          <a:fillRef idx="0">
+            <a:schemeClr val="accent1"/>
+          </a:fillRef>
+          <a:effectRef idx="0">
+            <a:schemeClr val="accent1"/>
+          </a:effectRef>
+          <a:fontRef idx="minor">
+            <a:schemeClr val="tx1"/>
+          </a:fontRef>
+        </p:style>
+      </p:cxnSp>
+      <p:cxnSp>
+        <p:nvCxnSpPr>
+          <p:cNvPr id="33" name="Straight Arrow Connector 32">
+            <a:extLst>
+              <a:ext uri="{FF2B5EF4-FFF2-40B4-BE49-F238E27FC236}">
+                <a16:creationId xmlns:a16="http://schemas.microsoft.com/office/drawing/2014/main" id="{8FFE40E2-32A7-0D24-42D4-DDDE4CCAA3E9}"/>
+              </a:ext>
+            </a:extLst>
+          </p:cNvPr>
+          <p:cNvCxnSpPr>
+            <a:cxnSpLocks/>
+          </p:cNvCxnSpPr>
+          <p:nvPr/>
+        </p:nvCxnSpPr>
+        <p:spPr>
+          <a:xfrm>
+            <a:off x="3655541" y="2976800"/>
+            <a:ext cx="302149" cy="0"/>
+          </a:xfrm>
+          <a:prstGeom prst="straightConnector1">
+            <a:avLst/>
+          </a:prstGeom>
+          <a:ln w="38100">
+            <a:solidFill>
+              <a:schemeClr val="bg1">
+                <a:lumMod val="50000"/>
+              </a:schemeClr>
+            </a:solidFill>
+            <a:tailEnd type="triangle"/>
+          </a:ln>
+        </p:spPr>
+        <p:style>
+          <a:lnRef idx="1">
+            <a:schemeClr val="accent1"/>
+          </a:lnRef>
+          <a:fillRef idx="0">
+            <a:schemeClr val="accent1"/>
+          </a:fillRef>
+          <a:effectRef idx="0">
+            <a:schemeClr val="accent1"/>
+          </a:effectRef>
+          <a:fontRef idx="minor">
+            <a:schemeClr val="tx1"/>
+          </a:fontRef>
+        </p:style>
+      </p:cxnSp>
+      <p:sp>
+        <p:nvSpPr>
+          <p:cNvPr id="41" name="Rectangle 40">
+            <a:extLst>
+              <a:ext uri="{FF2B5EF4-FFF2-40B4-BE49-F238E27FC236}">
+                <a16:creationId xmlns:a16="http://schemas.microsoft.com/office/drawing/2014/main" id="{0C53CCF7-9DEF-5A5C-C935-E0DC29EA5CAC}"/>
+              </a:ext>
+            </a:extLst>
+          </p:cNvPr>
+          <p:cNvSpPr/>
+          <p:nvPr/>
+        </p:nvSpPr>
+        <p:spPr>
+          <a:xfrm>
+            <a:off x="380854" y="4106849"/>
+            <a:ext cx="3040112" cy="740651"/>
+          </a:xfrm>
+          <a:prstGeom prst="rect">
+            <a:avLst/>
+          </a:prstGeom>
+          <a:solidFill>
+            <a:schemeClr val="accent6">
+              <a:lumMod val="20000"/>
+              <a:lumOff val="80000"/>
+            </a:schemeClr>
+          </a:solidFill>
+          <a:ln>
+            <a:noFill/>
+          </a:ln>
+        </p:spPr>
+        <p:style>
+          <a:lnRef idx="2">
+            <a:schemeClr val="accent1">
+              <a:shade val="15000"/>
+            </a:schemeClr>
+          </a:lnRef>
+          <a:fillRef idx="1">
+            <a:schemeClr val="accent1"/>
+          </a:fillRef>
+          <a:effectRef idx="0">
+            <a:schemeClr val="accent1"/>
+          </a:effectRef>
+          <a:fontRef idx="minor">
+            <a:schemeClr val="lt1"/>
+          </a:fontRef>
+        </p:style>
+        <p:txBody>
+          <a:bodyPr rtlCol="0" anchor="ctr"/>
+          <a:lstStyle/>
+          <a:p>
+            <a:pPr algn="ctr"/>
+            <a:r>
+              <a:rPr lang="en-US" sz="1400" dirty="0">
+                <a:solidFill>
+                  <a:schemeClr val="tx1"/>
+                </a:solidFill>
+              </a:rPr>
+              <a:t>These methods define Model </a:t>
+            </a:r>
+            <a:r>
+              <a:rPr lang="en-US" sz="1400" b="1" dirty="0">
+                <a:solidFill>
+                  <a:schemeClr val="tx1"/>
+                </a:solidFill>
+              </a:rPr>
+              <a:t>indicators</a:t>
+            </a:r>
+            <a:r>
+              <a:rPr lang="en-US" sz="1400" dirty="0">
+                <a:solidFill>
+                  <a:schemeClr val="tx1"/>
+                </a:solidFill>
+              </a:rPr>
+              <a:t> and are called/tracked during simulation (in </a:t>
+            </a:r>
+            <a:r>
+              <a:rPr lang="en-US" sz="1400" dirty="0" err="1">
+                <a:solidFill>
+                  <a:schemeClr val="tx1"/>
+                </a:solidFill>
+              </a:rPr>
+              <a:t>modelname.i</a:t>
+            </a:r>
+            <a:r>
+              <a:rPr lang="en-US" sz="1400" dirty="0">
+                <a:solidFill>
+                  <a:schemeClr val="tx1"/>
+                </a:solidFill>
+              </a:rPr>
+              <a:t>)</a:t>
+            </a:r>
+          </a:p>
+        </p:txBody>
+      </p:sp>
+      <p:sp>
+        <p:nvSpPr>
+          <p:cNvPr id="42" name="Rectangle 41">
+            <a:extLst>
+              <a:ext uri="{FF2B5EF4-FFF2-40B4-BE49-F238E27FC236}">
+                <a16:creationId xmlns:a16="http://schemas.microsoft.com/office/drawing/2014/main" id="{8CDCE0CD-812F-C5E1-0CB4-58D9C56432A5}"/>
+              </a:ext>
+            </a:extLst>
+          </p:cNvPr>
+          <p:cNvSpPr/>
+          <p:nvPr/>
+        </p:nvSpPr>
+        <p:spPr>
+          <a:xfrm>
+            <a:off x="170143" y="1049485"/>
+            <a:ext cx="3391491" cy="740658"/>
+          </a:xfrm>
+          <a:prstGeom prst="rect">
+            <a:avLst/>
+          </a:prstGeom>
+          <a:solidFill>
+            <a:schemeClr val="accent6">
+              <a:lumMod val="40000"/>
+              <a:lumOff val="60000"/>
+            </a:schemeClr>
+          </a:solidFill>
+          <a:ln>
+            <a:noFill/>
+          </a:ln>
+        </p:spPr>
+        <p:style>
+          <a:lnRef idx="2">
+            <a:schemeClr val="accent1">
+              <a:shade val="15000"/>
+            </a:schemeClr>
+          </a:lnRef>
+          <a:fillRef idx="1">
+            <a:schemeClr val="accent1"/>
+          </a:fillRef>
+          <a:effectRef idx="0">
+            <a:schemeClr val="accent1"/>
+          </a:effectRef>
+          <a:fontRef idx="minor">
+            <a:schemeClr val="lt1"/>
+          </a:fontRef>
+        </p:style>
+        <p:txBody>
+          <a:bodyPr rtlCol="0" anchor="ctr"/>
+          <a:lstStyle/>
+          <a:p>
+            <a:pPr algn="ctr"/>
+            <a:r>
+              <a:rPr lang="en-US" sz="1400" dirty="0">
+                <a:solidFill>
+                  <a:schemeClr val="tx1"/>
+                </a:solidFill>
+              </a:rPr>
+              <a:t>Default </a:t>
+            </a:r>
+            <a:r>
+              <a:rPr lang="en-US" sz="1400" b="1" dirty="0">
+                <a:solidFill>
+                  <a:schemeClr val="tx1"/>
+                </a:solidFill>
+              </a:rPr>
+              <a:t>keyword arguments for </a:t>
+            </a:r>
+            <a:r>
+              <a:rPr lang="en-US" sz="1400" b="1" dirty="0" err="1">
+                <a:solidFill>
+                  <a:schemeClr val="tx1"/>
+                </a:solidFill>
+              </a:rPr>
+              <a:t>SimParam</a:t>
+            </a:r>
+            <a:r>
+              <a:rPr lang="en-US" sz="1400" dirty="0">
+                <a:solidFill>
+                  <a:schemeClr val="tx1"/>
+                </a:solidFill>
+              </a:rPr>
+              <a:t>. Defines max time of the simulation, along with phases, timestep, units, etc.</a:t>
+            </a:r>
+          </a:p>
+        </p:txBody>
+      </p:sp>
+      <p:cxnSp>
+        <p:nvCxnSpPr>
+          <p:cNvPr id="44" name="Straight Arrow Connector 43">
+            <a:extLst>
+              <a:ext uri="{FF2B5EF4-FFF2-40B4-BE49-F238E27FC236}">
+                <a16:creationId xmlns:a16="http://schemas.microsoft.com/office/drawing/2014/main" id="{2F39350D-8555-F1AE-2F34-766C9EE33104}"/>
+              </a:ext>
+            </a:extLst>
+          </p:cNvPr>
+          <p:cNvCxnSpPr>
+            <a:cxnSpLocks/>
+          </p:cNvCxnSpPr>
+          <p:nvPr/>
+        </p:nvCxnSpPr>
+        <p:spPr>
+          <a:xfrm>
+            <a:off x="3418989" y="4542303"/>
+            <a:ext cx="538701" cy="0"/>
+          </a:xfrm>
+          <a:prstGeom prst="straightConnector1">
+            <a:avLst/>
+          </a:prstGeom>
+          <a:ln w="38100">
+            <a:solidFill>
+              <a:schemeClr val="accent6"/>
+            </a:solidFill>
+            <a:tailEnd type="triangle"/>
+          </a:ln>
+        </p:spPr>
+        <p:style>
+          <a:lnRef idx="1">
+            <a:schemeClr val="accent1"/>
+          </a:lnRef>
+          <a:fillRef idx="0">
+            <a:schemeClr val="accent1"/>
+          </a:fillRef>
+          <a:effectRef idx="0">
+            <a:schemeClr val="accent1"/>
+          </a:effectRef>
+          <a:fontRef idx="minor">
+            <a:schemeClr val="tx1"/>
+          </a:fontRef>
+        </p:style>
+      </p:cxnSp>
+      <p:sp>
+        <p:nvSpPr>
+          <p:cNvPr id="45" name="Rectangle 44">
+            <a:extLst>
+              <a:ext uri="{FF2B5EF4-FFF2-40B4-BE49-F238E27FC236}">
+                <a16:creationId xmlns:a16="http://schemas.microsoft.com/office/drawing/2014/main" id="{D45EAE9F-3FFE-CF4A-26AA-8D2A61746450}"/>
+              </a:ext>
+            </a:extLst>
+          </p:cNvPr>
+          <p:cNvSpPr/>
+          <p:nvPr/>
+        </p:nvSpPr>
+        <p:spPr>
+          <a:xfrm>
+            <a:off x="380854" y="5294530"/>
+            <a:ext cx="3038135" cy="665117"/>
+          </a:xfrm>
+          <a:prstGeom prst="rect">
+            <a:avLst/>
+          </a:prstGeom>
+          <a:solidFill>
+            <a:srgbClr val="F1D9F1"/>
+          </a:solidFill>
+          <a:ln>
+            <a:noFill/>
+          </a:ln>
+        </p:spPr>
+        <p:style>
+          <a:lnRef idx="2">
+            <a:schemeClr val="accent1">
+              <a:shade val="15000"/>
+            </a:schemeClr>
+          </a:lnRef>
+          <a:fillRef idx="1">
+            <a:schemeClr val="accent1"/>
+          </a:fillRef>
+          <a:effectRef idx="0">
+            <a:schemeClr val="accent1"/>
+          </a:effectRef>
+          <a:fontRef idx="minor">
+            <a:schemeClr val="lt1"/>
+          </a:fontRef>
+        </p:style>
+        <p:txBody>
+          <a:bodyPr rtlCol="0" anchor="ctr"/>
+          <a:lstStyle/>
+          <a:p>
+            <a:pPr algn="ctr"/>
+            <a:r>
+              <a:rPr lang="en-US" sz="1400" dirty="0">
+                <a:solidFill>
+                  <a:schemeClr val="tx1"/>
+                </a:solidFill>
+              </a:rPr>
+              <a:t>This method defines the Result to be returned </a:t>
+            </a:r>
+            <a:r>
+              <a:rPr lang="en-US" sz="1400" b="1" dirty="0">
+                <a:solidFill>
+                  <a:schemeClr val="tx1"/>
+                </a:solidFill>
+              </a:rPr>
+              <a:t> </a:t>
+            </a:r>
+            <a:r>
+              <a:rPr lang="en-US" sz="1400" dirty="0">
+                <a:solidFill>
+                  <a:schemeClr val="tx1"/>
+                </a:solidFill>
+              </a:rPr>
+              <a:t>by the model.</a:t>
+            </a:r>
+          </a:p>
+        </p:txBody>
+      </p:sp>
+      <p:cxnSp>
+        <p:nvCxnSpPr>
+          <p:cNvPr id="47" name="Straight Arrow Connector 46">
+            <a:extLst>
+              <a:ext uri="{FF2B5EF4-FFF2-40B4-BE49-F238E27FC236}">
+                <a16:creationId xmlns:a16="http://schemas.microsoft.com/office/drawing/2014/main" id="{63F352AD-414C-473F-B963-608E7ABC775D}"/>
+              </a:ext>
+            </a:extLst>
+          </p:cNvPr>
+          <p:cNvCxnSpPr>
+            <a:cxnSpLocks/>
+          </p:cNvCxnSpPr>
+          <p:nvPr/>
+        </p:nvCxnSpPr>
+        <p:spPr>
+          <a:xfrm>
+            <a:off x="3439456" y="5643349"/>
+            <a:ext cx="538701" cy="0"/>
+          </a:xfrm>
+          <a:prstGeom prst="straightConnector1">
+            <a:avLst/>
+          </a:prstGeom>
+          <a:ln w="38100">
+            <a:solidFill>
+              <a:srgbClr val="E890E8"/>
+            </a:solidFill>
+            <a:tailEnd type="triangle"/>
+          </a:ln>
+        </p:spPr>
+        <p:style>
+          <a:lnRef idx="1">
+            <a:schemeClr val="accent1"/>
+          </a:lnRef>
+          <a:fillRef idx="0">
+            <a:schemeClr val="accent1"/>
+          </a:fillRef>
+          <a:effectRef idx="0">
+            <a:schemeClr val="accent1"/>
+          </a:effectRef>
+          <a:fontRef idx="minor">
+            <a:schemeClr val="tx1"/>
+          </a:fontRef>
+        </p:style>
+      </p:cxnSp>
+    </p:spTree>
+    <p:extLst>
+      <p:ext uri="{BB962C8B-B14F-4D97-AF65-F5344CB8AC3E}">
+        <p14:creationId xmlns:p14="http://schemas.microsoft.com/office/powerpoint/2010/main" val="1227501762"/>
       </p:ext>
     </p:extLst>
   </p:cSld>
@@ -15667,7 +19517,7 @@
           <a:p>
             <a:fld id="{5B2B2ECE-C27A-4FBC-A5B7-24ADD502157D}" type="datetime1">
               <a:rPr lang="en-US" smtClean="0"/>
-              <a:t>6/14/2023</a:t>
+              <a:t>6/21/2023</a:t>
             </a:fld>
             <a:endParaRPr lang="en-US"/>
           </a:p>
@@ -15887,7 +19737,7 @@
           <a:p>
             <a:fld id="{C8D67213-7DC7-4566-B4E8-39CBEF03CE40}" type="datetime1">
               <a:rPr lang="en-US" smtClean="0"/>
-              <a:t>6/14/2023</a:t>
+              <a:t>6/21/2023</a:t>
             </a:fld>
             <a:endParaRPr lang="en-US"/>
           </a:p>
@@ -16214,7 +20064,7 @@
           <a:p>
             <a:fld id="{7DBF9849-58D3-4F19-9398-5C19541DD8B5}" type="datetime1">
               <a:rPr lang="en-US" smtClean="0"/>
-              <a:t>6/14/2023</a:t>
+              <a:t>6/21/2023</a:t>
             </a:fld>
             <a:endParaRPr lang="en-US"/>
           </a:p>
@@ -17602,7 +21452,7 @@
           <a:p>
             <a:fld id="{97B5B71A-C210-4A41-9D4A-E72BF6E30274}" type="datetime1">
               <a:rPr lang="en-US" smtClean="0"/>
-              <a:t>6/14/2023</a:t>
+              <a:t>6/21/2023</a:t>
             </a:fld>
             <a:endParaRPr lang="en-US"/>
           </a:p>
@@ -18241,6 +22091,15 @@
 </file>
 
 <file path=customXml/item1.xml><?xml version="1.0" encoding="utf-8"?>
+<?mso-contentType ?>
+<FormTemplates xmlns="http://schemas.microsoft.com/sharepoint/v3/contenttype/forms">
+  <Display>DocumentLibraryForm</Display>
+  <Edit>DocumentLibraryForm</Edit>
+  <New>DocumentLibraryForm</New>
+</FormTemplates>
+</file>
+
+<file path=customXml/item2.xml><?xml version="1.0" encoding="utf-8"?>
 <ct:contentTypeSchema xmlns:ct="http://schemas.microsoft.com/office/2006/metadata/contentType" xmlns:ma="http://schemas.microsoft.com/office/2006/metadata/properties/metaAttributes" ct:_="" ma:_="" ma:contentTypeName="Document" ma:contentTypeID="0x0101002F0B4413AAFFE34B9A5E0B87EBB2BF4F" ma:contentTypeVersion="0" ma:contentTypeDescription="Create a new document." ma:contentTypeScope="" ma:versionID="9632435baf965c6c093711282b9a8698">
   <xsd:schema xmlns:xsd="http://www.w3.org/2001/XMLSchema" xmlns:xs="http://www.w3.org/2001/XMLSchema" xmlns:p="http://schemas.microsoft.com/office/2006/metadata/properties" targetNamespace="http://schemas.microsoft.com/office/2006/metadata/properties" ma:root="true" ma:fieldsID="ad47a0f10127d9e30d85633090e6731d">
     <xsd:element name="properties">
@@ -18354,15 +22213,6 @@
 </ct:contentTypeSchema>
 </file>
 
-<file path=customXml/item2.xml><?xml version="1.0" encoding="utf-8"?>
-<?mso-contentType ?>
-<FormTemplates xmlns="http://schemas.microsoft.com/sharepoint/v3/contenttype/forms">
-  <Display>DocumentLibraryForm</Display>
-  <Edit>DocumentLibraryForm</Edit>
-  <New>DocumentLibraryForm</New>
-</FormTemplates>
-</file>
-
 <file path=customXml/item3.xml><?xml version="1.0" encoding="utf-8"?>
 <p:properties xmlns:p="http://schemas.microsoft.com/office/2006/metadata/properties" xmlns:xsi="http://www.w3.org/2001/XMLSchema-instance" xmlns:pc="http://schemas.microsoft.com/office/infopath/2007/PartnerControls">
   <documentManagement/>
@@ -18370,6 +22220,14 @@
 </file>
 
 <file path=customXml/itemProps1.xml><?xml version="1.0" encoding="utf-8"?>
+<ds:datastoreItem xmlns:ds="http://schemas.openxmlformats.org/officeDocument/2006/customXml" ds:itemID="{D3728C9A-7C9B-4A99-A7F5-4857043C7DB3}">
+  <ds:schemaRefs>
+    <ds:schemaRef ds:uri="http://schemas.microsoft.com/sharepoint/v3/contenttype/forms"/>
+  </ds:schemaRefs>
+</ds:datastoreItem>
+</file>
+
+<file path=customXml/itemProps2.xml><?xml version="1.0" encoding="utf-8"?>
 <ds:datastoreItem xmlns:ds="http://schemas.openxmlformats.org/officeDocument/2006/customXml" ds:itemID="{8807AEC1-3868-4489-99AA-F6101CBA6951}">
   <ds:schemaRefs>
     <ds:schemaRef ds:uri="http://schemas.microsoft.com/office/2006/metadata/contentType"/>
@@ -18381,14 +22239,6 @@
     <ds:schemaRef ds:uri="http://purl.org/dc/terms/"/>
     <ds:schemaRef ds:uri="http://schemas.microsoft.com/internal/obd"/>
     <ds:schemaRef ds:uri="http://schemas.microsoft.com/office/infopath/2007/PartnerControls"/>
-  </ds:schemaRefs>
-</ds:datastoreItem>
-</file>
-
-<file path=customXml/itemProps2.xml><?xml version="1.0" encoding="utf-8"?>
-<ds:datastoreItem xmlns:ds="http://schemas.openxmlformats.org/officeDocument/2006/customXml" ds:itemID="{D3728C9A-7C9B-4A99-A7F5-4857043C7DB3}">
-  <ds:schemaRefs>
-    <ds:schemaRef ds:uri="http://schemas.microsoft.com/sharepoint/v3/contenttype/forms"/>
   </ds:schemaRefs>
 </ds:datastoreItem>
 </file>

</xml_diff>

<commit_message>
Updating docs figures to match new module structure
- Figures updated to match
- Some adjustments to docstrings/rst
</commit_message>
<xml_diff>
--- a/docs/figures/powerpoint_figures.pptx
+++ b/docs/figures/powerpoint_figures.pptx
@@ -209,7 +209,7 @@
           <a:p>
             <a:fld id="{711A52A6-9D8E-41FC-9651-78B3E515F872}" type="datetimeFigureOut">
               <a:rPr lang="en-US" smtClean="0"/>
-              <a:t>6/21/2023</a:t>
+              <a:t>11/2/2023</a:t>
             </a:fld>
             <a:endParaRPr lang="en-US"/>
           </a:p>
@@ -636,7 +636,7 @@
           <a:p>
             <a:fld id="{77F775AD-3704-4F98-A581-F4E052B5E341}" type="datetime1">
               <a:rPr lang="en-US" smtClean="0"/>
-              <a:t>6/21/2023</a:t>
+              <a:t>11/2/2023</a:t>
             </a:fld>
             <a:endParaRPr lang="en-US" dirty="0"/>
           </a:p>
@@ -885,7 +885,7 @@
           <a:p>
             <a:fld id="{B49B97F0-8049-4B63-9B9F-B08800B08AEA}" type="datetime1">
               <a:rPr lang="en-US" smtClean="0"/>
-              <a:t>6/21/2023</a:t>
+              <a:t>11/2/2023</a:t>
             </a:fld>
             <a:endParaRPr lang="en-US"/>
           </a:p>
@@ -1125,7 +1125,7 @@
           <a:p>
             <a:fld id="{76BB3555-78C2-4894-951A-9F28C24107FA}" type="datetime1">
               <a:rPr lang="en-US" smtClean="0"/>
-              <a:t>6/21/2023</a:t>
+              <a:t>11/2/2023</a:t>
             </a:fld>
             <a:endParaRPr lang="en-US"/>
           </a:p>
@@ -1355,7 +1355,7 @@
           <a:p>
             <a:fld id="{37A4B9B3-CD86-4259-A27A-F9B9C6081119}" type="datetime1">
               <a:rPr lang="en-US" smtClean="0"/>
-              <a:t>6/21/2023</a:t>
+              <a:t>11/2/2023</a:t>
             </a:fld>
             <a:endParaRPr lang="en-US"/>
           </a:p>
@@ -1633,7 +1633,7 @@
           <a:p>
             <a:fld id="{66287512-E62E-4968-99B9-D028D358C1D6}" type="datetime1">
               <a:rPr lang="en-US" smtClean="0"/>
-              <a:t>6/21/2023</a:t>
+              <a:t>11/2/2023</a:t>
             </a:fld>
             <a:endParaRPr lang="en-US"/>
           </a:p>
@@ -1956,7 +1956,7 @@
           <a:p>
             <a:fld id="{356AD7E7-9EE9-4D28-82A7-0AE338FFEED9}" type="datetime1">
               <a:rPr lang="en-US" smtClean="0"/>
-              <a:t>6/21/2023</a:t>
+              <a:t>11/2/2023</a:t>
             </a:fld>
             <a:endParaRPr lang="en-US"/>
           </a:p>
@@ -2430,7 +2430,7 @@
           <a:p>
             <a:fld id="{0B5CD5E0-6150-412F-8881-52709F06EC3B}" type="datetime1">
               <a:rPr lang="en-US" smtClean="0"/>
-              <a:t>6/21/2023</a:t>
+              <a:t>11/2/2023</a:t>
             </a:fld>
             <a:endParaRPr lang="en-US"/>
           </a:p>
@@ -2577,7 +2577,7 @@
           <a:p>
             <a:fld id="{9428AFA3-5281-4B53-8B8B-8FD665A2F0D7}" type="datetime1">
               <a:rPr lang="en-US" smtClean="0"/>
-              <a:t>6/21/2023</a:t>
+              <a:t>11/2/2023</a:t>
             </a:fld>
             <a:endParaRPr lang="en-US"/>
           </a:p>
@@ -2690,7 +2690,7 @@
           <a:p>
             <a:fld id="{556D1394-26AC-45DA-9E25-AB3CC25C7422}" type="datetime1">
               <a:rPr lang="en-US" smtClean="0"/>
-              <a:t>6/21/2023</a:t>
+              <a:t>11/2/2023</a:t>
             </a:fld>
             <a:endParaRPr lang="en-US"/>
           </a:p>
@@ -3015,7 +3015,7 @@
           <a:p>
             <a:fld id="{B641D803-18D9-4B72-95D8-021B736F630F}" type="datetime1">
               <a:rPr lang="en-US" smtClean="0"/>
-              <a:t>6/21/2023</a:t>
+              <a:t>11/2/2023</a:t>
             </a:fld>
             <a:endParaRPr lang="en-US"/>
           </a:p>
@@ -3307,7 +3307,7 @@
           <a:p>
             <a:fld id="{9F82DFCB-4787-4629-B4F0-DCD676BE203A}" type="datetime1">
               <a:rPr lang="en-US" smtClean="0"/>
-              <a:t>6/21/2023</a:t>
+              <a:t>11/2/2023</a:t>
             </a:fld>
             <a:endParaRPr lang="en-US"/>
           </a:p>
@@ -3547,7 +3547,7 @@
           <a:p>
             <a:fld id="{300C2ECC-D91C-40D5-A01C-469FC90F0645}" type="datetime1">
               <a:rPr lang="en-US" smtClean="0"/>
-              <a:t>6/21/2023</a:t>
+              <a:t>11/2/2023</a:t>
             </a:fld>
             <a:endParaRPr lang="en-US" dirty="0"/>
           </a:p>
@@ -6370,150 +6370,6 @@
           <a:chExt cx="0" cy="0"/>
         </a:xfrm>
       </p:grpSpPr>
-      <p:cxnSp>
-        <p:nvCxnSpPr>
-          <p:cNvPr id="22" name="Straight Connector 21">
-            <a:extLst>
-              <a:ext uri="{FF2B5EF4-FFF2-40B4-BE49-F238E27FC236}">
-                <a16:creationId xmlns:a16="http://schemas.microsoft.com/office/drawing/2014/main" id="{DFA0A650-41E9-2F12-F0CC-4791BA568567}"/>
-              </a:ext>
-            </a:extLst>
-          </p:cNvPr>
-          <p:cNvCxnSpPr>
-            <a:cxnSpLocks/>
-          </p:cNvCxnSpPr>
-          <p:nvPr/>
-        </p:nvCxnSpPr>
-        <p:spPr>
-          <a:xfrm flipV="1">
-            <a:off x="2153450" y="3687486"/>
-            <a:ext cx="0" cy="1038887"/>
-          </a:xfrm>
-          <a:prstGeom prst="line">
-            <a:avLst/>
-          </a:prstGeom>
-          <a:ln w="57150">
-            <a:solidFill>
-              <a:schemeClr val="tx1">
-                <a:lumMod val="50000"/>
-                <a:lumOff val="50000"/>
-              </a:schemeClr>
-            </a:solidFill>
-            <a:prstDash val="dash"/>
-          </a:ln>
-          <a:effectLst/>
-        </p:spPr>
-        <p:style>
-          <a:lnRef idx="2">
-            <a:schemeClr val="accent1"/>
-          </a:lnRef>
-          <a:fillRef idx="0">
-            <a:schemeClr val="accent1"/>
-          </a:fillRef>
-          <a:effectRef idx="1">
-            <a:schemeClr val="accent1"/>
-          </a:effectRef>
-          <a:fontRef idx="minor">
-            <a:schemeClr val="tx1"/>
-          </a:fontRef>
-        </p:style>
-      </p:cxnSp>
-      <p:cxnSp>
-        <p:nvCxnSpPr>
-          <p:cNvPr id="27" name="Straight Connector 26">
-            <a:extLst>
-              <a:ext uri="{FF2B5EF4-FFF2-40B4-BE49-F238E27FC236}">
-                <a16:creationId xmlns:a16="http://schemas.microsoft.com/office/drawing/2014/main" id="{270E244F-EBBE-5B09-A593-60EB9AE33988}"/>
-              </a:ext>
-            </a:extLst>
-          </p:cNvPr>
-          <p:cNvCxnSpPr>
-            <a:cxnSpLocks/>
-          </p:cNvCxnSpPr>
-          <p:nvPr/>
-        </p:nvCxnSpPr>
-        <p:spPr>
-          <a:xfrm flipV="1">
-            <a:off x="6120323" y="3701350"/>
-            <a:ext cx="0" cy="1038887"/>
-          </a:xfrm>
-          <a:prstGeom prst="line">
-            <a:avLst/>
-          </a:prstGeom>
-          <a:ln w="57150">
-            <a:solidFill>
-              <a:schemeClr val="tx1">
-                <a:lumMod val="50000"/>
-                <a:lumOff val="50000"/>
-              </a:schemeClr>
-            </a:solidFill>
-            <a:prstDash val="dash"/>
-          </a:ln>
-          <a:effectLst/>
-        </p:spPr>
-        <p:style>
-          <a:lnRef idx="2">
-            <a:schemeClr val="accent1"/>
-          </a:lnRef>
-          <a:fillRef idx="0">
-            <a:schemeClr val="accent1"/>
-          </a:fillRef>
-          <a:effectRef idx="1">
-            <a:schemeClr val="accent1"/>
-          </a:effectRef>
-          <a:fontRef idx="minor">
-            <a:schemeClr val="tx1"/>
-          </a:fontRef>
-        </p:style>
-      </p:cxnSp>
-      <p:cxnSp>
-        <p:nvCxnSpPr>
-          <p:cNvPr id="28" name="Straight Connector 27">
-            <a:extLst>
-              <a:ext uri="{FF2B5EF4-FFF2-40B4-BE49-F238E27FC236}">
-                <a16:creationId xmlns:a16="http://schemas.microsoft.com/office/drawing/2014/main" id="{9804949E-B22D-BF98-94EC-E9549E7C57C9}"/>
-              </a:ext>
-            </a:extLst>
-          </p:cNvPr>
-          <p:cNvCxnSpPr>
-            <a:cxnSpLocks/>
-          </p:cNvCxnSpPr>
-          <p:nvPr/>
-        </p:nvCxnSpPr>
-        <p:spPr>
-          <a:xfrm flipV="1">
-            <a:off x="10406863" y="3703361"/>
-            <a:ext cx="0" cy="1038887"/>
-          </a:xfrm>
-          <a:prstGeom prst="line">
-            <a:avLst/>
-          </a:prstGeom>
-          <a:ln w="57150">
-            <a:solidFill>
-              <a:schemeClr val="tx1">
-                <a:lumMod val="50000"/>
-                <a:lumOff val="50000"/>
-              </a:schemeClr>
-            </a:solidFill>
-            <a:prstDash val="dash"/>
-          </a:ln>
-          <a:effectLst/>
-        </p:spPr>
-        <p:style>
-          <a:lnRef idx="2">
-            <a:schemeClr val="accent1"/>
-          </a:lnRef>
-          <a:fillRef idx="0">
-            <a:schemeClr val="accent1"/>
-          </a:fillRef>
-          <a:effectRef idx="1">
-            <a:schemeClr val="accent1"/>
-          </a:effectRef>
-          <a:fontRef idx="minor">
-            <a:schemeClr val="tx1"/>
-          </a:fontRef>
-        </p:style>
-      </p:cxnSp>
       <p:sp>
         <p:nvSpPr>
           <p:cNvPr id="5" name="Flowchart: Process 4">
@@ -6528,8 +6384,8 @@
         </p:nvSpPr>
         <p:spPr>
           <a:xfrm>
-            <a:off x="4130663" y="451676"/>
-            <a:ext cx="3954426" cy="3580195"/>
+            <a:off x="9112767" y="1525889"/>
+            <a:ext cx="2808905" cy="3553187"/>
           </a:xfrm>
           <a:prstGeom prst="flowChartProcess">
             <a:avLst/>
@@ -6609,74 +6465,6 @@
             </a:r>
           </a:p>
           <a:p>
-            <a:pPr marL="742950" lvl="1" indent="-285750">
-              <a:buFontTx/>
-              <a:buChar char="-"/>
-            </a:pPr>
-            <a:r>
-              <a:rPr lang="en-US" sz="1600" b="1" dirty="0">
-                <a:solidFill>
-                  <a:schemeClr val="tx1"/>
-                </a:solidFill>
-              </a:rPr>
-              <a:t>draw(): </a:t>
-            </a:r>
-            <a:r>
-              <a:rPr lang="en-US" sz="1600" dirty="0">
-                <a:solidFill>
-                  <a:schemeClr val="tx1"/>
-                </a:solidFill>
-              </a:rPr>
-              <a:t>Show graph at state</a:t>
-            </a:r>
-          </a:p>
-          <a:p>
-            <a:pPr marL="742950" lvl="1" indent="-285750">
-              <a:buFontTx/>
-              <a:buChar char="-"/>
-            </a:pPr>
-            <a:r>
-              <a:rPr lang="en-US" sz="1600" b="1" dirty="0" err="1">
-                <a:solidFill>
-                  <a:schemeClr val="tx1"/>
-                </a:solidFill>
-              </a:rPr>
-              <a:t>draw_from</a:t>
-            </a:r>
-            <a:r>
-              <a:rPr lang="en-US" sz="1600" b="1" dirty="0">
-                <a:solidFill>
-                  <a:schemeClr val="tx1"/>
-                </a:solidFill>
-              </a:rPr>
-              <a:t>(): </a:t>
-            </a:r>
-            <a:r>
-              <a:rPr lang="en-US" sz="1600" dirty="0">
-                <a:solidFill>
-                  <a:schemeClr val="tx1"/>
-                </a:solidFill>
-              </a:rPr>
-              <a:t>shows graph </a:t>
-            </a:r>
-            <a:r>
-              <a:rPr lang="en-US" sz="1600" dirty="0" err="1">
-                <a:solidFill>
-                  <a:schemeClr val="tx1"/>
-                </a:solidFill>
-              </a:rPr>
-              <a:t>statesat</a:t>
-            </a:r>
-            <a:r>
-              <a:rPr lang="en-US" sz="1600" dirty="0">
-                <a:solidFill>
-                  <a:schemeClr val="tx1"/>
-                </a:solidFill>
-              </a:rPr>
-              <a:t> a given time-step</a:t>
-            </a:r>
-          </a:p>
-          <a:p>
             <a:r>
               <a:rPr lang="en-US" sz="1600" b="1" dirty="0">
                 <a:solidFill>
@@ -6788,8 +6576,8 @@
         </p:nvSpPr>
         <p:spPr>
           <a:xfrm>
-            <a:off x="176237" y="4726373"/>
-            <a:ext cx="11863278" cy="1891716"/>
+            <a:off x="112014" y="1525890"/>
+            <a:ext cx="2972008" cy="2074025"/>
           </a:xfrm>
           <a:prstGeom prst="flowChartProcess">
             <a:avLst/>
@@ -6843,7 +6631,7 @@
                   <a:schemeClr val="tx1"/>
                 </a:solidFill>
               </a:rPr>
-              <a:t>Logging, processing, and save/load for simulation results</a:t>
+              <a:t>Analysis and save/load of simulation results.</a:t>
             </a:r>
           </a:p>
           <a:p>
@@ -6865,7 +6653,7 @@
                   <a:schemeClr val="tx1"/>
                 </a:solidFill>
               </a:rPr>
-              <a:t>: Class for storing results from a simulation specified in </a:t>
+              <a:t>: Class for storing and analyzing results from a simulation specified in </a:t>
             </a:r>
             <a:r>
               <a:rPr lang="en-US" sz="1600" dirty="0" err="1">
@@ -6895,73 +6683,7 @@
                   <a:schemeClr val="tx1"/>
                 </a:solidFill>
               </a:rPr>
-              <a:t>argument, e.g.:</a:t>
-            </a:r>
-          </a:p>
-          <a:p>
-            <a:pPr marL="742950" lvl="1" indent="-285750">
-              <a:buFontTx/>
-              <a:buChar char="-"/>
-            </a:pPr>
-            <a:r>
-              <a:rPr lang="en-US" sz="1600" dirty="0" err="1">
-                <a:solidFill>
-                  <a:schemeClr val="tx1"/>
-                </a:solidFill>
-              </a:rPr>
-              <a:t>endclass</a:t>
-            </a:r>
-            <a:r>
-              <a:rPr lang="en-US" sz="1600" dirty="0">
-                <a:solidFill>
-                  <a:schemeClr val="tx1"/>
-                </a:solidFill>
-              </a:rPr>
-              <a:t> (from </a:t>
-            </a:r>
-            <a:r>
-              <a:rPr lang="en-US" sz="1600" dirty="0" err="1">
-                <a:solidFill>
-                  <a:schemeClr val="tx1"/>
-                </a:solidFill>
-              </a:rPr>
-              <a:t>find_classification</a:t>
-            </a:r>
-            <a:r>
-              <a:rPr lang="en-US" sz="1600" dirty="0">
-                <a:solidFill>
-                  <a:schemeClr val="tx1"/>
-                </a:solidFill>
-              </a:rPr>
-              <a:t>) </a:t>
-            </a:r>
-          </a:p>
-          <a:p>
-            <a:pPr marL="742950" lvl="1" indent="-285750">
-              <a:buFontTx/>
-              <a:buChar char="-"/>
-            </a:pPr>
-            <a:r>
-              <a:rPr lang="en-US" sz="1600" dirty="0">
-                <a:solidFill>
-                  <a:schemeClr val="tx1"/>
-                </a:solidFill>
-              </a:rPr>
-              <a:t>graph (graph view)</a:t>
-            </a:r>
-          </a:p>
-          <a:p>
-            <a:pPr marL="742950" lvl="1" indent="-285750">
-              <a:buFontTx/>
-              <a:buChar char="-"/>
-            </a:pPr>
-            <a:r>
-              <a:rPr lang="en-US" sz="1600" dirty="0">
-                <a:solidFill>
-                  <a:schemeClr val="tx1"/>
-                </a:solidFill>
-              </a:rPr>
-              <a:t>model values (user-defined)</a:t>
+              <a:t>argument</a:t>
             </a:r>
           </a:p>
           <a:p>
@@ -6969,41 +6691,11 @@
               <a:buFontTx/>
               <a:buChar char="-"/>
             </a:pPr>
-            <a:r>
-              <a:rPr lang="en-US" sz="1600" b="1" dirty="0">
-                <a:solidFill>
-                  <a:schemeClr val="tx1"/>
-                </a:solidFill>
-              </a:rPr>
-              <a:t>History</a:t>
-            </a:r>
-            <a:r>
-              <a:rPr lang="en-US" sz="1600" dirty="0">
-                <a:solidFill>
-                  <a:schemeClr val="tx1"/>
-                </a:solidFill>
-              </a:rPr>
-              <a:t>: Class for storing simulation histories specified using </a:t>
-            </a:r>
-            <a:r>
-              <a:rPr lang="en-US" sz="1600" dirty="0">
-                <a:solidFill>
-                  <a:schemeClr val="tx1"/>
-                </a:solidFill>
-                <a:highlight>
-                  <a:srgbClr val="C0C0C0"/>
-                </a:highlight>
-              </a:rPr>
-              <a:t>track</a:t>
-            </a:r>
-            <a:r>
-              <a:rPr lang="en-US" sz="1600" dirty="0">
-                <a:solidFill>
-                  <a:schemeClr val="tx1"/>
-                </a:solidFill>
-              </a:rPr>
-              <a:t> argument</a:t>
-            </a:r>
+            <a:endParaRPr lang="en-US" sz="1600" dirty="0">
+              <a:solidFill>
+                <a:schemeClr val="tx1"/>
+              </a:solidFill>
+            </a:endParaRPr>
           </a:p>
         </p:txBody>
       </p:sp>
@@ -7021,8 +6713,8 @@
         </p:nvSpPr>
         <p:spPr>
           <a:xfrm>
-            <a:off x="8085088" y="451566"/>
-            <a:ext cx="3954427" cy="3579161"/>
+            <a:off x="3328768" y="1525889"/>
+            <a:ext cx="2775564" cy="3935373"/>
           </a:xfrm>
           <a:prstGeom prst="flowChartProcess">
             <a:avLst/>
@@ -7076,7 +6768,7 @@
                   <a:schemeClr val="tx1"/>
                 </a:solidFill>
               </a:rPr>
-              <a:t>Display and export of simulation results as tables</a:t>
+              <a:t>Construction of analyses based on samples.</a:t>
             </a:r>
           </a:p>
           <a:p>
@@ -7085,20 +6777,12 @@
               <a:buChar char="-"/>
             </a:pPr>
             <a:r>
-              <a:rPr lang="en-US" sz="1600" b="1" dirty="0" err="1">
+              <a:rPr lang="en-US" sz="1600" b="1" dirty="0">
                 <a:solidFill>
                   <a:schemeClr val="tx1"/>
                 </a:solidFill>
               </a:rPr>
-              <a:t>fmea</a:t>
-            </a:r>
-            <a:r>
-              <a:rPr lang="en-US" sz="1600" b="1" dirty="0">
-                <a:solidFill>
-                  <a:schemeClr val="tx1"/>
-                </a:solidFill>
-              </a:rPr>
-              <a:t>()</a:t>
+              <a:t>FMEA</a:t>
             </a:r>
             <a:r>
               <a:rPr lang="en-US" sz="1600" dirty="0">
@@ -7115,20 +6799,28 @@
               <a:buChar char="-"/>
             </a:pPr>
             <a:r>
-              <a:rPr lang="en-US" sz="1600" b="1" dirty="0" err="1">
+              <a:rPr lang="en-US" sz="1600" b="1" dirty="0">
                 <a:solidFill>
                   <a:schemeClr val="tx1"/>
                 </a:solidFill>
               </a:rPr>
-              <a:t>metricovertime</a:t>
-            </a:r>
-            <a:r>
-              <a:rPr lang="en-US" sz="1600" b="1" dirty="0">
+              <a:t>Comparison: </a:t>
+            </a:r>
+            <a:r>
+              <a:rPr lang="en-US" sz="1600" dirty="0">
                 <a:solidFill>
                   <a:schemeClr val="tx1"/>
                 </a:solidFill>
               </a:rPr>
-              <a:t>(): </a:t>
+              <a:t>Class for comparing different metrics over different scenarios in a </a:t>
+            </a:r>
+            <a:r>
+              <a:rPr lang="en-US" sz="1600" dirty="0" err="1">
+                <a:solidFill>
+                  <a:schemeClr val="tx1"/>
+                </a:solidFill>
+              </a:rPr>
+              <a:t>ParameterSample</a:t>
             </a:r>
             <a:r>
               <a:rPr lang="en-US" sz="1600" dirty="0">
@@ -7136,7 +6828,23 @@
                   <a:schemeClr val="tx1"/>
                 </a:solidFill>
               </a:rPr>
-              <a:t>total metric, rate, and expected metrics of scenarios over time</a:t>
+              <a:t>/</a:t>
+            </a:r>
+            <a:r>
+              <a:rPr lang="en-US" sz="1600" dirty="0" err="1">
+                <a:solidFill>
+                  <a:schemeClr val="tx1"/>
+                </a:solidFill>
+              </a:rPr>
+              <a:t>Faultsample</a:t>
+            </a:r>
+            <a:r>
+              <a:rPr lang="en-US" sz="1600" dirty="0">
+                <a:solidFill>
+                  <a:schemeClr val="tx1"/>
+                </a:solidFill>
+              </a:rPr>
+              <a:t>.</a:t>
             </a:r>
           </a:p>
           <a:p>
@@ -7145,51 +6853,42 @@
               <a:buChar char="-"/>
             </a:pPr>
             <a:r>
+              <a:rPr lang="en-US" sz="1600" b="1" dirty="0" err="1">
+                <a:solidFill>
+                  <a:schemeClr val="tx1"/>
+                </a:solidFill>
+              </a:rPr>
+              <a:t>NominalEnvelope</a:t>
+            </a:r>
+            <a:r>
               <a:rPr lang="en-US" sz="1600" b="1" dirty="0">
                 <a:solidFill>
                   <a:schemeClr val="tx1"/>
                 </a:solidFill>
               </a:rPr>
-              <a:t>nominal/</a:t>
-            </a:r>
-            <a:r>
-              <a:rPr lang="en-US" sz="1600" b="1" dirty="0" err="1">
+              <a:t>:</a:t>
+            </a:r>
+            <a:r>
+              <a:rPr lang="en-US" sz="1600" dirty="0">
                 <a:solidFill>
                   <a:schemeClr val="tx1"/>
                 </a:solidFill>
               </a:rPr>
-              <a:t>nested_factor_comparison</a:t>
-            </a:r>
-            <a:r>
-              <a:rPr lang="en-US" sz="1600" b="1" dirty="0">
+              <a:t> Class for determining nominal envelope of system over a </a:t>
+            </a:r>
+            <a:r>
+              <a:rPr lang="en-US" sz="1600" dirty="0" err="1">
                 <a:solidFill>
                   <a:schemeClr val="tx1"/>
                 </a:solidFill>
               </a:rPr>
-              <a:t>(): </a:t>
-            </a:r>
-            <a:r>
-              <a:rPr lang="en-US" sz="1600" dirty="0">
-                <a:solidFill>
-                  <a:schemeClr val="tx1"/>
-                </a:solidFill>
-              </a:rPr>
-              <a:t>Table of simulation statistics over factors</a:t>
-            </a:r>
-          </a:p>
-          <a:p>
-            <a:pPr marL="285750" indent="-285750">
-              <a:buFontTx/>
-              <a:buChar char="-"/>
-            </a:pPr>
-            <a:r>
-              <a:rPr lang="en-US" sz="1600" dirty="0">
-                <a:solidFill>
-                  <a:schemeClr val="tx1"/>
-                </a:solidFill>
-              </a:rPr>
-              <a:t>others…</a:t>
-            </a:r>
+              <a:t>ParameterSample</a:t>
+            </a:r>
+            <a:endParaRPr lang="en-US" sz="1600" b="1" dirty="0">
+              <a:solidFill>
+                <a:schemeClr val="tx1"/>
+              </a:solidFill>
+            </a:endParaRPr>
           </a:p>
         </p:txBody>
       </p:sp>
@@ -7222,7 +6921,7 @@
         </p:blipFill>
         <p:spPr bwMode="auto">
           <a:xfrm>
-            <a:off x="5095988" y="3409773"/>
+            <a:off x="9682296" y="4326823"/>
             <a:ext cx="2048671" cy="458284"/>
           </a:xfrm>
           <a:prstGeom prst="rect">
@@ -7240,59 +6939,12 @@
           </a:extLst>
         </p:spPr>
       </p:pic>
-      <p:pic>
-        <p:nvPicPr>
-          <p:cNvPr id="1030" name="Picture 6" descr="pandas (software) - Wikipedia">
-            <a:extLst>
-              <a:ext uri="{FF2B5EF4-FFF2-40B4-BE49-F238E27FC236}">
-                <a16:creationId xmlns:a16="http://schemas.microsoft.com/office/drawing/2014/main" id="{34D86B6E-983A-487D-BBA0-100E87B83019}"/>
-              </a:ext>
-            </a:extLst>
-          </p:cNvPr>
-          <p:cNvPicPr>
-            <a:picLocks noChangeAspect="1" noChangeArrowheads="1"/>
-          </p:cNvPicPr>
-          <p:nvPr/>
-        </p:nvPicPr>
-        <p:blipFill>
-          <a:blip r:embed="rId3">
-            <a:extLst>
-              <a:ext uri="{28A0092B-C50C-407E-A947-70E740481C1C}">
-                <a14:useLocalDpi xmlns:a14="http://schemas.microsoft.com/office/drawing/2010/main" val="0"/>
-              </a:ext>
-            </a:extLst>
-          </a:blip>
-          <a:srcRect/>
-          <a:stretch>
-            <a:fillRect/>
-          </a:stretch>
-        </p:blipFill>
-        <p:spPr bwMode="auto">
-          <a:xfrm>
-            <a:off x="8836737" y="3062830"/>
-            <a:ext cx="2262349" cy="914366"/>
-          </a:xfrm>
-          <a:prstGeom prst="rect">
-            <a:avLst/>
-          </a:prstGeom>
-          <a:noFill/>
-          <a:extLst>
-            <a:ext uri="{909E8E84-426E-40DD-AFC4-6F175D3DCCD1}">
-              <a14:hiddenFill xmlns:a14="http://schemas.microsoft.com/office/drawing/2010/main">
-                <a:solidFill>
-                  <a:srgbClr val="FFFFFF"/>
-                </a:solidFill>
-              </a14:hiddenFill>
-            </a:ext>
-          </a:extLst>
-        </p:spPr>
-      </p:pic>
-      <p:sp>
-        <p:nvSpPr>
-          <p:cNvPr id="23" name="Flowchart: Process 22">
-            <a:extLst>
-              <a:ext uri="{FF2B5EF4-FFF2-40B4-BE49-F238E27FC236}">
-                <a16:creationId xmlns:a16="http://schemas.microsoft.com/office/drawing/2014/main" id="{9512BDB7-AD65-4688-B513-C0DE77DBCE39}"/>
+      <p:sp>
+        <p:nvSpPr>
+          <p:cNvPr id="2" name="Flowchart: Process 1">
+            <a:extLst>
+              <a:ext uri="{FF2B5EF4-FFF2-40B4-BE49-F238E27FC236}">
+                <a16:creationId xmlns:a16="http://schemas.microsoft.com/office/drawing/2014/main" id="{5BFB8611-F122-DA60-B3A7-D1B438994E2D}"/>
               </a:ext>
             </a:extLst>
           </p:cNvPr>
@@ -7301,8 +6953,8 @@
         </p:nvSpPr>
         <p:spPr>
           <a:xfrm>
-            <a:off x="176237" y="452710"/>
-            <a:ext cx="3954426" cy="3579161"/>
+            <a:off x="261644" y="186340"/>
+            <a:ext cx="11777872" cy="884985"/>
           </a:xfrm>
           <a:prstGeom prst="flowChartProcess">
             <a:avLst/>
@@ -7336,7 +6988,7 @@
           </a:fontRef>
         </p:style>
         <p:txBody>
-          <a:bodyPr rtlCol="0" anchor="t"/>
+          <a:bodyPr rtlCol="0" anchor="ctr"/>
           <a:lstStyle/>
           <a:p>
             <a:pPr algn="ctr"/>
@@ -7346,7 +6998,7 @@
                   <a:schemeClr val="tx1"/>
                 </a:solidFill>
               </a:rPr>
-              <a:t>plot.py</a:t>
+              <a:t>common.py</a:t>
             </a:r>
           </a:p>
           <a:p>
@@ -7356,21 +7008,15 @@
                   <a:schemeClr val="tx1"/>
                 </a:solidFill>
               </a:rPr>
-              <a:t>Behavioral/Statistical Plotting</a:t>
-            </a:r>
-          </a:p>
-          <a:p>
-            <a:pPr marL="285750" indent="-285750">
-              <a:buFontTx/>
-              <a:buChar char="-"/>
-            </a:pPr>
-            <a:r>
-              <a:rPr lang="en-US" sz="1600" b="1" dirty="0">
+              <a:t>Basic analysis utilities (plotting, calculations, </a:t>
+            </a:r>
+            <a:r>
+              <a:rPr lang="en-US" sz="1600" dirty="0" err="1">
                 <a:solidFill>
                   <a:schemeClr val="tx1"/>
                 </a:solidFill>
               </a:rPr>
-              <a:t>hists()</a:t>
+              <a:t>etc</a:t>
             </a:r>
             <a:r>
               <a:rPr lang="en-US" sz="1600" dirty="0">
@@ -7378,119 +7024,8 @@
                   <a:schemeClr val="tx1"/>
                 </a:solidFill>
               </a:rPr>
-              <a:t>: Plots behavior of given states over time in a set of scenarios</a:t>
-            </a:r>
-          </a:p>
-          <a:p>
-            <a:pPr marL="285750" indent="-285750">
-              <a:buFontTx/>
-              <a:buChar char="-"/>
-            </a:pPr>
-            <a:r>
-              <a:rPr lang="en-US" sz="1600" b="1" dirty="0" err="1">
-                <a:solidFill>
-                  <a:schemeClr val="tx1"/>
-                </a:solidFill>
-              </a:rPr>
-              <a:t>metric_dist</a:t>
-            </a:r>
-            <a:r>
-              <a:rPr lang="en-US" sz="1600" b="1" dirty="0">
-                <a:solidFill>
-                  <a:schemeClr val="tx1"/>
-                </a:solidFill>
-              </a:rPr>
-              <a:t>()/_from(): </a:t>
-            </a:r>
-            <a:r>
-              <a:rPr lang="en-US" sz="1600" dirty="0">
-                <a:solidFill>
-                  <a:schemeClr val="tx1"/>
-                </a:solidFill>
-              </a:rPr>
-              <a:t>Histograms of modelled metrics</a:t>
-            </a:r>
-          </a:p>
-          <a:p>
-            <a:pPr marL="285750" indent="-285750">
-              <a:buFontTx/>
-              <a:buChar char="-"/>
-            </a:pPr>
-            <a:r>
-              <a:rPr lang="en-US" sz="1600" b="1" dirty="0">
-                <a:solidFill>
-                  <a:schemeClr val="tx1"/>
-                </a:solidFill>
-              </a:rPr>
-              <a:t>nominal_vals_1d/2d/3d(): </a:t>
-            </a:r>
-            <a:r>
-              <a:rPr lang="en-US" sz="1600" dirty="0">
-                <a:solidFill>
-                  <a:schemeClr val="tx1"/>
-                </a:solidFill>
-              </a:rPr>
-              <a:t>Simulation metric(s) in terms of input parameters</a:t>
-            </a:r>
-          </a:p>
-          <a:p>
-            <a:pPr marL="285750" indent="-285750">
-              <a:buFontTx/>
-              <a:buChar char="-"/>
-            </a:pPr>
-            <a:r>
-              <a:rPr lang="en-US" sz="1600" b="1" dirty="0">
-                <a:solidFill>
-                  <a:schemeClr val="tx1"/>
-                </a:solidFill>
-              </a:rPr>
-              <a:t>nominal/</a:t>
-            </a:r>
-            <a:r>
-              <a:rPr lang="en-US" sz="1600" b="1" dirty="0" err="1">
-                <a:solidFill>
-                  <a:schemeClr val="tx1"/>
-                </a:solidFill>
-              </a:rPr>
-              <a:t>nested_factor_comparison</a:t>
-            </a:r>
-            <a:r>
-              <a:rPr lang="en-US" sz="1600" b="1" dirty="0">
-                <a:solidFill>
-                  <a:schemeClr val="tx1"/>
-                </a:solidFill>
-              </a:rPr>
-              <a:t>(): </a:t>
-            </a:r>
-            <a:r>
-              <a:rPr lang="en-US" sz="1600" dirty="0">
-                <a:solidFill>
-                  <a:schemeClr val="tx1"/>
-                </a:solidFill>
-              </a:rPr>
-              <a:t>Comparison of simulation statistics over given factors</a:t>
-            </a:r>
-          </a:p>
-          <a:p>
-            <a:endParaRPr lang="en-US" sz="1600" dirty="0">
-              <a:solidFill>
-                <a:schemeClr val="tx1"/>
-              </a:solidFill>
-            </a:endParaRPr>
-          </a:p>
-          <a:p>
-            <a:endParaRPr lang="en-US" sz="1600" dirty="0">
-              <a:solidFill>
-                <a:schemeClr val="tx1"/>
-              </a:solidFill>
-            </a:endParaRPr>
-          </a:p>
-          <a:p>
-            <a:endParaRPr lang="en-US" sz="1600" dirty="0">
-              <a:solidFill>
-                <a:schemeClr val="tx1"/>
-              </a:solidFill>
-            </a:endParaRPr>
+              <a:t>) used throughout.</a:t>
+            </a:r>
           </a:p>
         </p:txBody>
       </p:sp>
@@ -7509,21 +7044,599 @@
           <p:nvPr/>
         </p:nvPicPr>
         <p:blipFill>
-          <a:blip r:embed="rId4"/>
+          <a:blip r:embed="rId3"/>
           <a:stretch>
             <a:fillRect/>
           </a:stretch>
         </p:blipFill>
         <p:spPr>
           <a:xfrm>
-            <a:off x="926483" y="3369449"/>
-            <a:ext cx="2359136" cy="538932"/>
+            <a:off x="6926726" y="614503"/>
+            <a:ext cx="1745673" cy="398790"/>
           </a:xfrm>
           <a:prstGeom prst="rect">
             <a:avLst/>
           </a:prstGeom>
         </p:spPr>
       </p:pic>
+      <p:sp>
+        <p:nvSpPr>
+          <p:cNvPr id="3" name="Flowchart: Process 2">
+            <a:extLst>
+              <a:ext uri="{FF2B5EF4-FFF2-40B4-BE49-F238E27FC236}">
+                <a16:creationId xmlns:a16="http://schemas.microsoft.com/office/drawing/2014/main" id="{F8183204-4E4B-7B56-7B2B-3F31B77B5F17}"/>
+              </a:ext>
+            </a:extLst>
+          </p:cNvPr>
+          <p:cNvSpPr/>
+          <p:nvPr/>
+        </p:nvSpPr>
+        <p:spPr>
+          <a:xfrm>
+            <a:off x="112014" y="4042063"/>
+            <a:ext cx="2983884" cy="2074025"/>
+          </a:xfrm>
+          <a:prstGeom prst="flowChartProcess">
+            <a:avLst/>
+          </a:prstGeom>
+          <a:solidFill>
+            <a:schemeClr val="bg1"/>
+          </a:solidFill>
+          <a:ln w="38100">
+            <a:solidFill>
+              <a:schemeClr val="tx1">
+                <a:lumMod val="50000"/>
+                <a:lumOff val="50000"/>
+              </a:schemeClr>
+            </a:solidFill>
+          </a:ln>
+        </p:spPr>
+        <p:style>
+          <a:lnRef idx="2">
+            <a:schemeClr val="accent1">
+              <a:shade val="50000"/>
+            </a:schemeClr>
+          </a:lnRef>
+          <a:fillRef idx="1">
+            <a:schemeClr val="accent1"/>
+          </a:fillRef>
+          <a:effectRef idx="0">
+            <a:schemeClr val="accent1"/>
+          </a:effectRef>
+          <a:fontRef idx="minor">
+            <a:schemeClr val="lt1"/>
+          </a:fontRef>
+        </p:style>
+        <p:txBody>
+          <a:bodyPr rtlCol="0" anchor="ctr"/>
+          <a:lstStyle/>
+          <a:p>
+            <a:pPr algn="ctr"/>
+            <a:r>
+              <a:rPr lang="en-US" b="1" dirty="0">
+                <a:solidFill>
+                  <a:schemeClr val="tx1"/>
+                </a:solidFill>
+              </a:rPr>
+              <a:t>history.py</a:t>
+            </a:r>
+          </a:p>
+          <a:p>
+            <a:r>
+              <a:rPr lang="en-US" sz="1600" dirty="0">
+                <a:solidFill>
+                  <a:schemeClr val="tx1"/>
+                </a:solidFill>
+              </a:rPr>
+              <a:t>Logging, processing, and simulation histories.</a:t>
+            </a:r>
+          </a:p>
+          <a:p>
+            <a:pPr marL="285750" indent="-285750">
+              <a:buFontTx/>
+              <a:buChar char="-"/>
+            </a:pPr>
+            <a:r>
+              <a:rPr lang="en-US" sz="1600" b="1" dirty="0">
+                <a:solidFill>
+                  <a:schemeClr val="tx1"/>
+                </a:solidFill>
+              </a:rPr>
+              <a:t>History</a:t>
+            </a:r>
+            <a:r>
+              <a:rPr lang="en-US" sz="1600" dirty="0">
+                <a:solidFill>
+                  <a:schemeClr val="tx1"/>
+                </a:solidFill>
+              </a:rPr>
+              <a:t>: Class for logging and analyzing results from a simulation specified by tracking options.</a:t>
+            </a:r>
+          </a:p>
+        </p:txBody>
+      </p:sp>
+      <p:sp>
+        <p:nvSpPr>
+          <p:cNvPr id="4" name="Flowchart: Process 3">
+            <a:extLst>
+              <a:ext uri="{FF2B5EF4-FFF2-40B4-BE49-F238E27FC236}">
+                <a16:creationId xmlns:a16="http://schemas.microsoft.com/office/drawing/2014/main" id="{64E68D44-CB30-B882-061B-B957F2F5E7F9}"/>
+              </a:ext>
+            </a:extLst>
+          </p:cNvPr>
+          <p:cNvSpPr/>
+          <p:nvPr/>
+        </p:nvSpPr>
+        <p:spPr>
+          <a:xfrm>
+            <a:off x="6351496" y="1525889"/>
+            <a:ext cx="2570566" cy="2929732"/>
+          </a:xfrm>
+          <a:prstGeom prst="flowChartProcess">
+            <a:avLst/>
+          </a:prstGeom>
+          <a:solidFill>
+            <a:schemeClr val="bg1"/>
+          </a:solidFill>
+          <a:ln w="38100">
+            <a:solidFill>
+              <a:schemeClr val="tx1">
+                <a:lumMod val="50000"/>
+                <a:lumOff val="50000"/>
+              </a:schemeClr>
+            </a:solidFill>
+          </a:ln>
+        </p:spPr>
+        <p:style>
+          <a:lnRef idx="2">
+            <a:schemeClr val="accent1">
+              <a:shade val="50000"/>
+            </a:schemeClr>
+          </a:lnRef>
+          <a:fillRef idx="1">
+            <a:schemeClr val="accent1"/>
+          </a:fillRef>
+          <a:effectRef idx="0">
+            <a:schemeClr val="accent1"/>
+          </a:effectRef>
+          <a:fontRef idx="minor">
+            <a:schemeClr val="lt1"/>
+          </a:fontRef>
+        </p:style>
+        <p:txBody>
+          <a:bodyPr rtlCol="0" anchor="t"/>
+          <a:lstStyle/>
+          <a:p>
+            <a:pPr algn="ctr"/>
+            <a:r>
+              <a:rPr lang="en-US" b="1" dirty="0">
+                <a:solidFill>
+                  <a:schemeClr val="tx1"/>
+                </a:solidFill>
+              </a:rPr>
+              <a:t>phases.py</a:t>
+            </a:r>
+            <a:br>
+              <a:rPr lang="en-US" sz="1600" dirty="0">
+                <a:solidFill>
+                  <a:schemeClr val="tx1"/>
+                </a:solidFill>
+              </a:rPr>
+            </a:br>
+            <a:r>
+              <a:rPr lang="en-US" sz="1600" dirty="0">
+                <a:solidFill>
+                  <a:schemeClr val="tx1"/>
+                </a:solidFill>
+              </a:rPr>
+              <a:t>Analysis of phases of operation in the system</a:t>
+            </a:r>
+          </a:p>
+          <a:p>
+            <a:pPr marL="285750" indent="-285750">
+              <a:buFontTx/>
+              <a:buChar char="-"/>
+            </a:pPr>
+            <a:r>
+              <a:rPr lang="en-US" sz="1600" b="1" dirty="0" err="1">
+                <a:solidFill>
+                  <a:schemeClr val="tx1"/>
+                </a:solidFill>
+              </a:rPr>
+              <a:t>PhaseMap</a:t>
+            </a:r>
+            <a:r>
+              <a:rPr lang="en-US" sz="1600" b="1" dirty="0">
+                <a:solidFill>
+                  <a:schemeClr val="tx1"/>
+                </a:solidFill>
+              </a:rPr>
+              <a:t>: </a:t>
+            </a:r>
+            <a:r>
+              <a:rPr lang="en-US" sz="1600" dirty="0">
+                <a:solidFill>
+                  <a:schemeClr val="tx1"/>
+                </a:solidFill>
+              </a:rPr>
+              <a:t>Class for interacting with model phases of operation for sampling and analysis.</a:t>
+            </a:r>
+          </a:p>
+          <a:p>
+            <a:pPr marL="285750" indent="-285750">
+              <a:buFontTx/>
+              <a:buChar char="-"/>
+            </a:pPr>
+            <a:r>
+              <a:rPr lang="en-US" sz="1600" b="1" dirty="0" err="1">
+                <a:solidFill>
+                  <a:schemeClr val="tx1"/>
+                </a:solidFill>
+              </a:rPr>
+              <a:t>from_hist</a:t>
+            </a:r>
+            <a:r>
+              <a:rPr lang="en-US" sz="1600" b="1" dirty="0">
+                <a:solidFill>
+                  <a:schemeClr val="tx1"/>
+                </a:solidFill>
+              </a:rPr>
+              <a:t>(): </a:t>
+            </a:r>
+            <a:r>
+              <a:rPr lang="en-US" sz="1600" dirty="0">
+                <a:solidFill>
+                  <a:schemeClr val="tx1"/>
+                </a:solidFill>
+              </a:rPr>
+              <a:t>method for generating </a:t>
+            </a:r>
+            <a:r>
+              <a:rPr lang="en-US" sz="1600" dirty="0" err="1">
+                <a:solidFill>
+                  <a:schemeClr val="tx1"/>
+                </a:solidFill>
+              </a:rPr>
+              <a:t>PhaseMaps</a:t>
+            </a:r>
+            <a:r>
+              <a:rPr lang="en-US" sz="1600" dirty="0">
+                <a:solidFill>
+                  <a:schemeClr val="tx1"/>
+                </a:solidFill>
+              </a:rPr>
+              <a:t> from throughout a model.</a:t>
+            </a:r>
+          </a:p>
+          <a:p>
+            <a:endParaRPr lang="en-US" sz="1600" dirty="0">
+              <a:solidFill>
+                <a:schemeClr val="tx1"/>
+              </a:solidFill>
+            </a:endParaRPr>
+          </a:p>
+        </p:txBody>
+      </p:sp>
+      <p:pic>
+        <p:nvPicPr>
+          <p:cNvPr id="1026" name="Picture 2">
+            <a:extLst>
+              <a:ext uri="{FF2B5EF4-FFF2-40B4-BE49-F238E27FC236}">
+                <a16:creationId xmlns:a16="http://schemas.microsoft.com/office/drawing/2014/main" id="{DD557C6E-272A-E11E-08CB-25C971DB0612}"/>
+              </a:ext>
+            </a:extLst>
+          </p:cNvPr>
+          <p:cNvPicPr>
+            <a:picLocks noChangeAspect="1" noChangeArrowheads="1"/>
+          </p:cNvPicPr>
+          <p:nvPr/>
+        </p:nvPicPr>
+        <p:blipFill>
+          <a:blip r:embed="rId4">
+            <a:extLst>
+              <a:ext uri="{28A0092B-C50C-407E-A947-70E740481C1C}">
+                <a14:useLocalDpi xmlns:a14="http://schemas.microsoft.com/office/drawing/2010/main" val="0"/>
+              </a:ext>
+            </a:extLst>
+          </a:blip>
+          <a:srcRect/>
+          <a:stretch>
+            <a:fillRect/>
+          </a:stretch>
+        </p:blipFill>
+        <p:spPr bwMode="auto">
+          <a:xfrm>
+            <a:off x="8793786" y="441593"/>
+            <a:ext cx="1399404" cy="629732"/>
+          </a:xfrm>
+          <a:prstGeom prst="rect">
+            <a:avLst/>
+          </a:prstGeom>
+          <a:noFill/>
+          <a:extLst>
+            <a:ext uri="{909E8E84-426E-40DD-AFC4-6F175D3DCCD1}">
+              <a14:hiddenFill xmlns:a14="http://schemas.microsoft.com/office/drawing/2010/main">
+                <a:solidFill>
+                  <a:srgbClr val="FFFFFF"/>
+                </a:solidFill>
+              </a14:hiddenFill>
+            </a:ext>
+          </a:extLst>
+        </p:spPr>
+      </p:pic>
+      <p:pic>
+        <p:nvPicPr>
+          <p:cNvPr id="9" name="Picture 6" descr="pandas (software) - Wikipedia">
+            <a:extLst>
+              <a:ext uri="{FF2B5EF4-FFF2-40B4-BE49-F238E27FC236}">
+                <a16:creationId xmlns:a16="http://schemas.microsoft.com/office/drawing/2014/main" id="{CDB94E6C-B997-7EC8-724A-FEEE544B1C67}"/>
+              </a:ext>
+            </a:extLst>
+          </p:cNvPr>
+          <p:cNvPicPr>
+            <a:picLocks noChangeAspect="1" noChangeArrowheads="1"/>
+          </p:cNvPicPr>
+          <p:nvPr/>
+        </p:nvPicPr>
+        <p:blipFill>
+          <a:blip r:embed="rId5">
+            <a:extLst>
+              <a:ext uri="{28A0092B-C50C-407E-A947-70E740481C1C}">
+                <a14:useLocalDpi xmlns:a14="http://schemas.microsoft.com/office/drawing/2010/main" val="0"/>
+              </a:ext>
+            </a:extLst>
+          </a:blip>
+          <a:srcRect/>
+          <a:stretch>
+            <a:fillRect/>
+          </a:stretch>
+        </p:blipFill>
+        <p:spPr bwMode="auto">
+          <a:xfrm>
+            <a:off x="10175085" y="504865"/>
+            <a:ext cx="1529234" cy="618065"/>
+          </a:xfrm>
+          <a:prstGeom prst="rect">
+            <a:avLst/>
+          </a:prstGeom>
+          <a:noFill/>
+          <a:extLst>
+            <a:ext uri="{909E8E84-426E-40DD-AFC4-6F175D3DCCD1}">
+              <a14:hiddenFill xmlns:a14="http://schemas.microsoft.com/office/drawing/2010/main">
+                <a:solidFill>
+                  <a:srgbClr val="FFFFFF"/>
+                </a:solidFill>
+              </a14:hiddenFill>
+            </a:ext>
+          </a:extLst>
+        </p:spPr>
+      </p:pic>
+      <p:cxnSp>
+        <p:nvCxnSpPr>
+          <p:cNvPr id="14" name="Straight Arrow Connector 13">
+            <a:extLst>
+              <a:ext uri="{FF2B5EF4-FFF2-40B4-BE49-F238E27FC236}">
+                <a16:creationId xmlns:a16="http://schemas.microsoft.com/office/drawing/2014/main" id="{4A2119A8-D698-909E-D2E5-9508E7CCF5B0}"/>
+              </a:ext>
+            </a:extLst>
+          </p:cNvPr>
+          <p:cNvCxnSpPr>
+            <a:cxnSpLocks/>
+            <a:stCxn id="7" idx="0"/>
+          </p:cNvCxnSpPr>
+          <p:nvPr/>
+        </p:nvCxnSpPr>
+        <p:spPr>
+          <a:xfrm flipV="1">
+            <a:off x="1598018" y="1071325"/>
+            <a:ext cx="0" cy="454565"/>
+          </a:xfrm>
+          <a:prstGeom prst="straightConnector1">
+            <a:avLst/>
+          </a:prstGeom>
+          <a:ln w="38100">
+            <a:solidFill>
+              <a:schemeClr val="accent6"/>
+            </a:solidFill>
+            <a:prstDash val="solid"/>
+            <a:tailEnd type="triangle"/>
+          </a:ln>
+        </p:spPr>
+        <p:style>
+          <a:lnRef idx="1">
+            <a:schemeClr val="accent1"/>
+          </a:lnRef>
+          <a:fillRef idx="0">
+            <a:schemeClr val="accent1"/>
+          </a:fillRef>
+          <a:effectRef idx="0">
+            <a:schemeClr val="accent1"/>
+          </a:effectRef>
+          <a:fontRef idx="minor">
+            <a:schemeClr val="tx1"/>
+          </a:fontRef>
+        </p:style>
+      </p:cxnSp>
+      <p:cxnSp>
+        <p:nvCxnSpPr>
+          <p:cNvPr id="19" name="Straight Arrow Connector 18">
+            <a:extLst>
+              <a:ext uri="{FF2B5EF4-FFF2-40B4-BE49-F238E27FC236}">
+                <a16:creationId xmlns:a16="http://schemas.microsoft.com/office/drawing/2014/main" id="{8E7DEE9E-9CD5-A418-7DE6-54DC87DBDECE}"/>
+              </a:ext>
+            </a:extLst>
+          </p:cNvPr>
+          <p:cNvCxnSpPr>
+            <a:cxnSpLocks/>
+          </p:cNvCxnSpPr>
+          <p:nvPr/>
+        </p:nvCxnSpPr>
+        <p:spPr>
+          <a:xfrm flipV="1">
+            <a:off x="4716550" y="1071324"/>
+            <a:ext cx="0" cy="454565"/>
+          </a:xfrm>
+          <a:prstGeom prst="straightConnector1">
+            <a:avLst/>
+          </a:prstGeom>
+          <a:ln w="38100">
+            <a:solidFill>
+              <a:schemeClr val="accent6"/>
+            </a:solidFill>
+            <a:prstDash val="solid"/>
+            <a:tailEnd type="triangle"/>
+          </a:ln>
+        </p:spPr>
+        <p:style>
+          <a:lnRef idx="1">
+            <a:schemeClr val="accent1"/>
+          </a:lnRef>
+          <a:fillRef idx="0">
+            <a:schemeClr val="accent1"/>
+          </a:fillRef>
+          <a:effectRef idx="0">
+            <a:schemeClr val="accent1"/>
+          </a:effectRef>
+          <a:fontRef idx="minor">
+            <a:schemeClr val="tx1"/>
+          </a:fontRef>
+        </p:style>
+      </p:cxnSp>
+      <p:cxnSp>
+        <p:nvCxnSpPr>
+          <p:cNvPr id="20" name="Straight Arrow Connector 19">
+            <a:extLst>
+              <a:ext uri="{FF2B5EF4-FFF2-40B4-BE49-F238E27FC236}">
+                <a16:creationId xmlns:a16="http://schemas.microsoft.com/office/drawing/2014/main" id="{608A6D77-39E5-E0D2-3362-41F2D037FA64}"/>
+              </a:ext>
+            </a:extLst>
+          </p:cNvPr>
+          <p:cNvCxnSpPr>
+            <a:cxnSpLocks/>
+          </p:cNvCxnSpPr>
+          <p:nvPr/>
+        </p:nvCxnSpPr>
+        <p:spPr>
+          <a:xfrm flipV="1">
+            <a:off x="7624899" y="1071323"/>
+            <a:ext cx="0" cy="454565"/>
+          </a:xfrm>
+          <a:prstGeom prst="straightConnector1">
+            <a:avLst/>
+          </a:prstGeom>
+          <a:ln w="38100">
+            <a:solidFill>
+              <a:schemeClr val="accent6"/>
+            </a:solidFill>
+            <a:prstDash val="solid"/>
+            <a:tailEnd type="triangle"/>
+          </a:ln>
+        </p:spPr>
+        <p:style>
+          <a:lnRef idx="1">
+            <a:schemeClr val="accent1"/>
+          </a:lnRef>
+          <a:fillRef idx="0">
+            <a:schemeClr val="accent1"/>
+          </a:fillRef>
+          <a:effectRef idx="0">
+            <a:schemeClr val="accent1"/>
+          </a:effectRef>
+          <a:fontRef idx="minor">
+            <a:schemeClr val="tx1"/>
+          </a:fontRef>
+        </p:style>
+      </p:cxnSp>
+      <p:cxnSp>
+        <p:nvCxnSpPr>
+          <p:cNvPr id="21" name="Straight Arrow Connector 20">
+            <a:extLst>
+              <a:ext uri="{FF2B5EF4-FFF2-40B4-BE49-F238E27FC236}">
+                <a16:creationId xmlns:a16="http://schemas.microsoft.com/office/drawing/2014/main" id="{F84440F6-58FA-B609-7BBD-EF997BE1457C}"/>
+              </a:ext>
+            </a:extLst>
+          </p:cNvPr>
+          <p:cNvCxnSpPr>
+            <a:cxnSpLocks/>
+          </p:cNvCxnSpPr>
+          <p:nvPr/>
+        </p:nvCxnSpPr>
+        <p:spPr>
+          <a:xfrm flipV="1">
+            <a:off x="1501036" y="3599915"/>
+            <a:ext cx="0" cy="454565"/>
+          </a:xfrm>
+          <a:prstGeom prst="straightConnector1">
+            <a:avLst/>
+          </a:prstGeom>
+          <a:ln w="38100">
+            <a:solidFill>
+              <a:schemeClr val="accent6"/>
+            </a:solidFill>
+            <a:prstDash val="solid"/>
+            <a:tailEnd type="triangle"/>
+          </a:ln>
+        </p:spPr>
+        <p:style>
+          <a:lnRef idx="1">
+            <a:schemeClr val="accent1"/>
+          </a:lnRef>
+          <a:fillRef idx="0">
+            <a:schemeClr val="accent1"/>
+          </a:fillRef>
+          <a:effectRef idx="0">
+            <a:schemeClr val="accent1"/>
+          </a:effectRef>
+          <a:fontRef idx="minor">
+            <a:schemeClr val="tx1"/>
+          </a:fontRef>
+        </p:style>
+      </p:cxnSp>
+      <p:cxnSp>
+        <p:nvCxnSpPr>
+          <p:cNvPr id="24" name="Straight Arrow Connector 23">
+            <a:extLst>
+              <a:ext uri="{FF2B5EF4-FFF2-40B4-BE49-F238E27FC236}">
+                <a16:creationId xmlns:a16="http://schemas.microsoft.com/office/drawing/2014/main" id="{12F081A5-594D-F87A-A434-1549C23E144B}"/>
+              </a:ext>
+            </a:extLst>
+          </p:cNvPr>
+          <p:cNvCxnSpPr>
+            <a:cxnSpLocks/>
+          </p:cNvCxnSpPr>
+          <p:nvPr/>
+        </p:nvCxnSpPr>
+        <p:spPr>
+          <a:xfrm flipV="1">
+            <a:off x="10497026" y="1071322"/>
+            <a:ext cx="0" cy="454565"/>
+          </a:xfrm>
+          <a:prstGeom prst="straightConnector1">
+            <a:avLst/>
+          </a:prstGeom>
+          <a:ln w="38100">
+            <a:solidFill>
+              <a:schemeClr val="accent6"/>
+            </a:solidFill>
+            <a:prstDash val="solid"/>
+            <a:tailEnd type="triangle"/>
+          </a:ln>
+        </p:spPr>
+        <p:style>
+          <a:lnRef idx="1">
+            <a:schemeClr val="accent1"/>
+          </a:lnRef>
+          <a:fillRef idx="0">
+            <a:schemeClr val="accent1"/>
+          </a:fillRef>
+          <a:effectRef idx="0">
+            <a:schemeClr val="accent1"/>
+          </a:effectRef>
+          <a:fontRef idx="minor">
+            <a:schemeClr val="tx1"/>
+          </a:fontRef>
+        </p:style>
+      </p:cxnSp>
     </p:spTree>
     <p:extLst>
       <p:ext uri="{BB962C8B-B14F-4D97-AF65-F5344CB8AC3E}">
@@ -16495,7 +16608,7 @@
                   <a:schemeClr val="tx1"/>
                 </a:solidFill>
               </a:rPr>
-              <a:t>plot.hist</a:t>
+              <a:t>History.plot_line</a:t>
             </a:r>
             <a:r>
               <a:rPr lang="en-US" dirty="0">
@@ -16503,7 +16616,7 @@
                   <a:schemeClr val="tx1"/>
                 </a:solidFill>
               </a:rPr>
-              <a:t>(history)</a:t>
+              <a:t>(‘value’)</a:t>
             </a:r>
           </a:p>
           <a:p>
@@ -16611,7 +16724,7 @@
                   <a:schemeClr val="tx1"/>
                 </a:solidFill>
               </a:rPr>
-              <a:t>/sim/approach.py</a:t>
+              <a:t>/sim/sample.py</a:t>
             </a:r>
           </a:p>
           <a:p>
@@ -16641,7 +16754,7 @@
         </p:nvSpPr>
         <p:spPr>
           <a:xfrm>
-            <a:off x="8465308" y="4865914"/>
+            <a:off x="8440370" y="4912807"/>
             <a:ext cx="2538707" cy="1300389"/>
           </a:xfrm>
           <a:prstGeom prst="flowChartProcess">
@@ -16697,7 +16810,7 @@
                   <a:schemeClr val="tx1"/>
                 </a:solidFill>
               </a:rPr>
-              <a:t>/analyze/plot.py</a:t>
+              <a:t>/analyze/graph.py</a:t>
             </a:r>
           </a:p>
           <a:p>
@@ -16708,7 +16821,7 @@
                   <a:schemeClr val="tx1"/>
                 </a:solidFill>
               </a:rPr>
-              <a:t>/analyze/graph.py</a:t>
+              <a:t>/analyze/tabulate.py</a:t>
             </a:r>
           </a:p>
           <a:p>
@@ -16719,7 +16832,7 @@
                   <a:schemeClr val="tx1"/>
                 </a:solidFill>
               </a:rPr>
-              <a:t>/analyze/tabulate.py</a:t>
+              <a:t>/analyze/phases.py …</a:t>
             </a:r>
           </a:p>
         </p:txBody>
@@ -16957,7 +17070,7 @@
         </p:nvCxnSpPr>
         <p:spPr>
           <a:xfrm flipV="1">
-            <a:off x="9734662" y="3156857"/>
+            <a:off x="9709724" y="3203750"/>
             <a:ext cx="0" cy="1709057"/>
           </a:xfrm>
           <a:prstGeom prst="straightConnector1">
@@ -17017,7 +17130,7 @@
           <a:p>
             <a:r>
               <a:rPr lang="en-US" dirty="0" err="1"/>
-              <a:t>SampleApproach</a:t>
+              <a:t>ParameterSample</a:t>
             </a:r>
             <a:r>
               <a:rPr lang="en-US" dirty="0"/>
@@ -17075,10 +17188,6 @@
           </a:bodyPr>
           <a:lstStyle/>
           <a:p>
-            <a:r>
-              <a:rPr lang="en-US" dirty="0"/>
-              <a:t>hist(), </a:t>
-            </a:r>
             <a:r>
               <a:rPr lang="en-US" dirty="0" err="1"/>
               <a:t>ModelGraph</a:t>
@@ -19517,7 +19626,7 @@
           <a:p>
             <a:fld id="{5B2B2ECE-C27A-4FBC-A5B7-24ADD502157D}" type="datetime1">
               <a:rPr lang="en-US" smtClean="0"/>
-              <a:t>6/21/2023</a:t>
+              <a:t>11/2/2023</a:t>
             </a:fld>
             <a:endParaRPr lang="en-US"/>
           </a:p>
@@ -19737,7 +19846,7 @@
           <a:p>
             <a:fld id="{C8D67213-7DC7-4566-B4E8-39CBEF03CE40}" type="datetime1">
               <a:rPr lang="en-US" smtClean="0"/>
-              <a:t>6/21/2023</a:t>
+              <a:t>11/2/2023</a:t>
             </a:fld>
             <a:endParaRPr lang="en-US"/>
           </a:p>
@@ -20064,7 +20173,7 @@
           <a:p>
             <a:fld id="{7DBF9849-58D3-4F19-9398-5C19541DD8B5}" type="datetime1">
               <a:rPr lang="en-US" smtClean="0"/>
-              <a:t>6/21/2023</a:t>
+              <a:t>11/2/2023</a:t>
             </a:fld>
             <a:endParaRPr lang="en-US"/>
           </a:p>
@@ -21452,7 +21561,7 @@
           <a:p>
             <a:fld id="{97B5B71A-C210-4A41-9D4A-E72BF6E30274}" type="datetime1">
               <a:rPr lang="en-US" smtClean="0"/>
-              <a:t>6/21/2023</a:t>
+              <a:t>11/2/2023</a:t>
             </a:fld>
             <a:endParaRPr lang="en-US"/>
           </a:p>
@@ -22091,15 +22200,6 @@
 </file>
 
 <file path=customXml/item1.xml><?xml version="1.0" encoding="utf-8"?>
-<?mso-contentType ?>
-<FormTemplates xmlns="http://schemas.microsoft.com/sharepoint/v3/contenttype/forms">
-  <Display>DocumentLibraryForm</Display>
-  <Edit>DocumentLibraryForm</Edit>
-  <New>DocumentLibraryForm</New>
-</FormTemplates>
-</file>
-
-<file path=customXml/item2.xml><?xml version="1.0" encoding="utf-8"?>
 <ct:contentTypeSchema xmlns:ct="http://schemas.microsoft.com/office/2006/metadata/contentType" xmlns:ma="http://schemas.microsoft.com/office/2006/metadata/properties/metaAttributes" ct:_="" ma:_="" ma:contentTypeName="Document" ma:contentTypeID="0x0101002F0B4413AAFFE34B9A5E0B87EBB2BF4F" ma:contentTypeVersion="0" ma:contentTypeDescription="Create a new document." ma:contentTypeScope="" ma:versionID="9632435baf965c6c093711282b9a8698">
   <xsd:schema xmlns:xsd="http://www.w3.org/2001/XMLSchema" xmlns:xs="http://www.w3.org/2001/XMLSchema" xmlns:p="http://schemas.microsoft.com/office/2006/metadata/properties" targetNamespace="http://schemas.microsoft.com/office/2006/metadata/properties" ma:root="true" ma:fieldsID="ad47a0f10127d9e30d85633090e6731d">
     <xsd:element name="properties">
@@ -22213,6 +22313,15 @@
 </ct:contentTypeSchema>
 </file>
 
+<file path=customXml/item2.xml><?xml version="1.0" encoding="utf-8"?>
+<?mso-contentType ?>
+<FormTemplates xmlns="http://schemas.microsoft.com/sharepoint/v3/contenttype/forms">
+  <Display>DocumentLibraryForm</Display>
+  <Edit>DocumentLibraryForm</Edit>
+  <New>DocumentLibraryForm</New>
+</FormTemplates>
+</file>
+
 <file path=customXml/item3.xml><?xml version="1.0" encoding="utf-8"?>
 <p:properties xmlns:p="http://schemas.microsoft.com/office/2006/metadata/properties" xmlns:xsi="http://www.w3.org/2001/XMLSchema-instance" xmlns:pc="http://schemas.microsoft.com/office/infopath/2007/PartnerControls">
   <documentManagement/>
@@ -22220,14 +22329,6 @@
 </file>
 
 <file path=customXml/itemProps1.xml><?xml version="1.0" encoding="utf-8"?>
-<ds:datastoreItem xmlns:ds="http://schemas.openxmlformats.org/officeDocument/2006/customXml" ds:itemID="{D3728C9A-7C9B-4A99-A7F5-4857043C7DB3}">
-  <ds:schemaRefs>
-    <ds:schemaRef ds:uri="http://schemas.microsoft.com/sharepoint/v3/contenttype/forms"/>
-  </ds:schemaRefs>
-</ds:datastoreItem>
-</file>
-
-<file path=customXml/itemProps2.xml><?xml version="1.0" encoding="utf-8"?>
 <ds:datastoreItem xmlns:ds="http://schemas.openxmlformats.org/officeDocument/2006/customXml" ds:itemID="{8807AEC1-3868-4489-99AA-F6101CBA6951}">
   <ds:schemaRefs>
     <ds:schemaRef ds:uri="http://schemas.microsoft.com/office/2006/metadata/contentType"/>
@@ -22243,17 +22344,25 @@
 </ds:datastoreItem>
 </file>
 
+<file path=customXml/itemProps2.xml><?xml version="1.0" encoding="utf-8"?>
+<ds:datastoreItem xmlns:ds="http://schemas.openxmlformats.org/officeDocument/2006/customXml" ds:itemID="{D3728C9A-7C9B-4A99-A7F5-4857043C7DB3}">
+  <ds:schemaRefs>
+    <ds:schemaRef ds:uri="http://schemas.microsoft.com/sharepoint/v3/contenttype/forms"/>
+  </ds:schemaRefs>
+</ds:datastoreItem>
+</file>
+
 <file path=customXml/itemProps3.xml><?xml version="1.0" encoding="utf-8"?>
 <ds:datastoreItem xmlns:ds="http://schemas.openxmlformats.org/officeDocument/2006/customXml" ds:itemID="{92B7266E-DF44-460A-A16F-F5ABEAF9A56A}">
   <ds:schemaRefs>
+    <ds:schemaRef ds:uri="http://schemas.microsoft.com/office/2006/metadata/properties"/>
     <ds:schemaRef ds:uri="http://schemas.microsoft.com/office/2006/documentManagement/types"/>
+    <ds:schemaRef ds:uri="http://purl.org/dc/terms/"/>
+    <ds:schemaRef ds:uri="http://schemas.openxmlformats.org/package/2006/metadata/core-properties"/>
+    <ds:schemaRef ds:uri="http://purl.org/dc/dcmitype/"/>
+    <ds:schemaRef ds:uri="http://schemas.microsoft.com/office/infopath/2007/PartnerControls"/>
     <ds:schemaRef ds:uri="http://purl.org/dc/elements/1.1/"/>
-    <ds:schemaRef ds:uri="http://purl.org/dc/dcmitype/"/>
     <ds:schemaRef ds:uri="http://www.w3.org/XML/1998/namespace"/>
-    <ds:schemaRef ds:uri="http://schemas.openxmlformats.org/package/2006/metadata/core-properties"/>
-    <ds:schemaRef ds:uri="http://schemas.microsoft.com/office/infopath/2007/PartnerControls"/>
-    <ds:schemaRef ds:uri="http://schemas.microsoft.com/office/2006/metadata/properties"/>
-    <ds:schemaRef ds:uri="http://purl.org/dc/terms/"/>
   </ds:schemaRefs>
 </ds:datastoreItem>
 </file>
</xml_diff>